<commit_message>
hierarchical module agent is implemented \n a graph plot function added
</commit_message>
<xml_diff>
--- a/FPGA_AGI_v2.pptx
+++ b/FPGA_AGI_v2.pptx
@@ -104,6 +104,11 @@
       </a:defRPr>
     </a:lvl9pPr>
   </p:defaultTextStyle>
+  <p:extLst>
+    <p:ext uri="{EFAFB233-063F-42B5-8137-9DF3F51BA10A}">
+      <p15:sldGuideLst xmlns:p15="http://schemas.microsoft.com/office/powerpoint/2012/main"/>
+    </p:ext>
+  </p:extLst>
 </p:presentation>
 </file>
 
@@ -256,7 +261,7 @@
           <a:p>
             <a:fld id="{8FF62803-A023-4C1F-8117-2FD5501C70F4}" type="datetimeFigureOut">
               <a:rPr lang="en-CA" smtClean="0"/>
-              <a:t>2024-03-02</a:t>
+              <a:t>2024-03-10</a:t>
             </a:fld>
             <a:endParaRPr lang="en-CA"/>
           </a:p>
@@ -456,7 +461,7 @@
           <a:p>
             <a:fld id="{8FF62803-A023-4C1F-8117-2FD5501C70F4}" type="datetimeFigureOut">
               <a:rPr lang="en-CA" smtClean="0"/>
-              <a:t>2024-03-02</a:t>
+              <a:t>2024-03-10</a:t>
             </a:fld>
             <a:endParaRPr lang="en-CA"/>
           </a:p>
@@ -666,7 +671,7 @@
           <a:p>
             <a:fld id="{8FF62803-A023-4C1F-8117-2FD5501C70F4}" type="datetimeFigureOut">
               <a:rPr lang="en-CA" smtClean="0"/>
-              <a:t>2024-03-02</a:t>
+              <a:t>2024-03-10</a:t>
             </a:fld>
             <a:endParaRPr lang="en-CA"/>
           </a:p>
@@ -866,7 +871,7 @@
           <a:p>
             <a:fld id="{8FF62803-A023-4C1F-8117-2FD5501C70F4}" type="datetimeFigureOut">
               <a:rPr lang="en-CA" smtClean="0"/>
-              <a:t>2024-03-02</a:t>
+              <a:t>2024-03-10</a:t>
             </a:fld>
             <a:endParaRPr lang="en-CA"/>
           </a:p>
@@ -1142,7 +1147,7 @@
           <a:p>
             <a:fld id="{8FF62803-A023-4C1F-8117-2FD5501C70F4}" type="datetimeFigureOut">
               <a:rPr lang="en-CA" smtClean="0"/>
-              <a:t>2024-03-02</a:t>
+              <a:t>2024-03-10</a:t>
             </a:fld>
             <a:endParaRPr lang="en-CA"/>
           </a:p>
@@ -1410,7 +1415,7 @@
           <a:p>
             <a:fld id="{8FF62803-A023-4C1F-8117-2FD5501C70F4}" type="datetimeFigureOut">
               <a:rPr lang="en-CA" smtClean="0"/>
-              <a:t>2024-03-02</a:t>
+              <a:t>2024-03-10</a:t>
             </a:fld>
             <a:endParaRPr lang="en-CA"/>
           </a:p>
@@ -1825,7 +1830,7 @@
           <a:p>
             <a:fld id="{8FF62803-A023-4C1F-8117-2FD5501C70F4}" type="datetimeFigureOut">
               <a:rPr lang="en-CA" smtClean="0"/>
-              <a:t>2024-03-02</a:t>
+              <a:t>2024-03-10</a:t>
             </a:fld>
             <a:endParaRPr lang="en-CA"/>
           </a:p>
@@ -1967,7 +1972,7 @@
           <a:p>
             <a:fld id="{8FF62803-A023-4C1F-8117-2FD5501C70F4}" type="datetimeFigureOut">
               <a:rPr lang="en-CA" smtClean="0"/>
-              <a:t>2024-03-02</a:t>
+              <a:t>2024-03-10</a:t>
             </a:fld>
             <a:endParaRPr lang="en-CA"/>
           </a:p>
@@ -2080,7 +2085,7 @@
           <a:p>
             <a:fld id="{8FF62803-A023-4C1F-8117-2FD5501C70F4}" type="datetimeFigureOut">
               <a:rPr lang="en-CA" smtClean="0"/>
-              <a:t>2024-03-02</a:t>
+              <a:t>2024-03-10</a:t>
             </a:fld>
             <a:endParaRPr lang="en-CA"/>
           </a:p>
@@ -2393,7 +2398,7 @@
           <a:p>
             <a:fld id="{8FF62803-A023-4C1F-8117-2FD5501C70F4}" type="datetimeFigureOut">
               <a:rPr lang="en-CA" smtClean="0"/>
-              <a:t>2024-03-02</a:t>
+              <a:t>2024-03-10</a:t>
             </a:fld>
             <a:endParaRPr lang="en-CA"/>
           </a:p>
@@ -2682,7 +2687,7 @@
           <a:p>
             <a:fld id="{8FF62803-A023-4C1F-8117-2FD5501C70F4}" type="datetimeFigureOut">
               <a:rPr lang="en-CA" smtClean="0"/>
-              <a:t>2024-03-02</a:t>
+              <a:t>2024-03-10</a:t>
             </a:fld>
             <a:endParaRPr lang="en-CA"/>
           </a:p>
@@ -2925,7 +2930,7 @@
           <a:p>
             <a:fld id="{8FF62803-A023-4C1F-8117-2FD5501C70F4}" type="datetimeFigureOut">
               <a:rPr lang="en-CA" smtClean="0"/>
-              <a:t>2024-03-02</a:t>
+              <a:t>2024-03-10</a:t>
             </a:fld>
             <a:endParaRPr lang="en-CA"/>
           </a:p>
@@ -4868,7 +4873,7 @@
           <a:prstGeom prst="curvedConnector4">
             <a:avLst>
               <a:gd name="adj1" fmla="val 1066"/>
-              <a:gd name="adj2" fmla="val 1170282"/>
+              <a:gd name="adj2" fmla="val 1033473"/>
             </a:avLst>
           </a:prstGeom>
           <a:ln>
@@ -5331,20 +5336,18 @@
             </a:extLst>
           </p:cNvPr>
           <p:cNvCxnSpPr>
-            <a:stCxn id="8" idx="2"/>
+            <a:cxnSpLocks/>
             <a:endCxn id="103" idx="1"/>
           </p:cNvCxnSpPr>
           <p:nvPr/>
         </p:nvCxnSpPr>
         <p:spPr>
-          <a:xfrm rot="16200000" flipH="1">
-            <a:off x="4536270" y="-1186641"/>
-            <a:ext cx="1445937" cy="7406029"/>
-          </a:xfrm>
-          <a:prstGeom prst="curvedConnector3">
-            <a:avLst>
-              <a:gd name="adj1" fmla="val 483"/>
-            </a:avLst>
+          <a:xfrm>
+            <a:off x="1564257" y="1915064"/>
+            <a:ext cx="7397996" cy="1324279"/>
+          </a:xfrm>
+          <a:prstGeom prst="curvedConnector2">
+            <a:avLst/>
           </a:prstGeom>
           <a:ln>
             <a:prstDash val="lgDashDot"/>
@@ -5624,18 +5627,19 @@
             </a:extLst>
           </p:cNvPr>
           <p:cNvCxnSpPr>
+            <a:cxnSpLocks/>
             <a:endCxn id="87" idx="1"/>
           </p:cNvCxnSpPr>
           <p:nvPr/>
         </p:nvCxnSpPr>
         <p:spPr>
           <a:xfrm rot="16200000" flipH="1">
-            <a:off x="7172508" y="2471823"/>
-            <a:ext cx="1091366" cy="443673"/>
+            <a:off x="7312630" y="2611944"/>
+            <a:ext cx="775079" cy="479717"/>
           </a:xfrm>
           <a:prstGeom prst="curvedConnector3">
             <a:avLst>
-              <a:gd name="adj1" fmla="val 49210"/>
+              <a:gd name="adj1" fmla="val 50000"/>
             </a:avLst>
           </a:prstGeom>
           <a:ln>
@@ -6387,7 +6391,8 @@
           </a:prstGeom>
           <a:ln>
             <a:prstDash val="lgDashDotDot"/>
-            <a:tailEnd type="triangle"/>
+            <a:headEnd type="none" w="med" len="med"/>
+            <a:tailEnd type="none" w="med" len="med"/>
           </a:ln>
         </p:spPr>
         <p:style>
@@ -6430,7 +6435,8 @@
           </a:prstGeom>
           <a:ln>
             <a:prstDash val="lgDashDotDot"/>
-            <a:tailEnd type="triangle"/>
+            <a:headEnd type="none" w="med" len="med"/>
+            <a:tailEnd type="none" w="med" len="med"/>
           </a:ln>
         </p:spPr>
         <p:style>

</xml_diff>

<commit_message>
the block diagram is now updates
</commit_message>
<xml_diff>
--- a/FPGA_AGI_v2.pptx
+++ b/FPGA_AGI_v2.pptx
@@ -6,6 +6,7 @@
   </p:sldMasterIdLst>
   <p:sldIdLst>
     <p:sldId id="256" r:id="rId2"/>
+    <p:sldId id="257" r:id="rId3"/>
   </p:sldIdLst>
   <p:sldSz cx="12192000" cy="6858000"/>
   <p:notesSz cx="6858000" cy="9144000"/>
@@ -261,7 +262,7 @@
           <a:p>
             <a:fld id="{8FF62803-A023-4C1F-8117-2FD5501C70F4}" type="datetimeFigureOut">
               <a:rPr lang="en-CA" smtClean="0"/>
-              <a:t>2024-03-10</a:t>
+              <a:t>2024-04-20</a:t>
             </a:fld>
             <a:endParaRPr lang="en-CA"/>
           </a:p>
@@ -461,7 +462,7 @@
           <a:p>
             <a:fld id="{8FF62803-A023-4C1F-8117-2FD5501C70F4}" type="datetimeFigureOut">
               <a:rPr lang="en-CA" smtClean="0"/>
-              <a:t>2024-03-10</a:t>
+              <a:t>2024-04-20</a:t>
             </a:fld>
             <a:endParaRPr lang="en-CA"/>
           </a:p>
@@ -671,7 +672,7 @@
           <a:p>
             <a:fld id="{8FF62803-A023-4C1F-8117-2FD5501C70F4}" type="datetimeFigureOut">
               <a:rPr lang="en-CA" smtClean="0"/>
-              <a:t>2024-03-10</a:t>
+              <a:t>2024-04-20</a:t>
             </a:fld>
             <a:endParaRPr lang="en-CA"/>
           </a:p>
@@ -871,7 +872,7 @@
           <a:p>
             <a:fld id="{8FF62803-A023-4C1F-8117-2FD5501C70F4}" type="datetimeFigureOut">
               <a:rPr lang="en-CA" smtClean="0"/>
-              <a:t>2024-03-10</a:t>
+              <a:t>2024-04-20</a:t>
             </a:fld>
             <a:endParaRPr lang="en-CA"/>
           </a:p>
@@ -1147,7 +1148,7 @@
           <a:p>
             <a:fld id="{8FF62803-A023-4C1F-8117-2FD5501C70F4}" type="datetimeFigureOut">
               <a:rPr lang="en-CA" smtClean="0"/>
-              <a:t>2024-03-10</a:t>
+              <a:t>2024-04-20</a:t>
             </a:fld>
             <a:endParaRPr lang="en-CA"/>
           </a:p>
@@ -1415,7 +1416,7 @@
           <a:p>
             <a:fld id="{8FF62803-A023-4C1F-8117-2FD5501C70F4}" type="datetimeFigureOut">
               <a:rPr lang="en-CA" smtClean="0"/>
-              <a:t>2024-03-10</a:t>
+              <a:t>2024-04-20</a:t>
             </a:fld>
             <a:endParaRPr lang="en-CA"/>
           </a:p>
@@ -1830,7 +1831,7 @@
           <a:p>
             <a:fld id="{8FF62803-A023-4C1F-8117-2FD5501C70F4}" type="datetimeFigureOut">
               <a:rPr lang="en-CA" smtClean="0"/>
-              <a:t>2024-03-10</a:t>
+              <a:t>2024-04-20</a:t>
             </a:fld>
             <a:endParaRPr lang="en-CA"/>
           </a:p>
@@ -1972,7 +1973,7 @@
           <a:p>
             <a:fld id="{8FF62803-A023-4C1F-8117-2FD5501C70F4}" type="datetimeFigureOut">
               <a:rPr lang="en-CA" smtClean="0"/>
-              <a:t>2024-03-10</a:t>
+              <a:t>2024-04-20</a:t>
             </a:fld>
             <a:endParaRPr lang="en-CA"/>
           </a:p>
@@ -2085,7 +2086,7 @@
           <a:p>
             <a:fld id="{8FF62803-A023-4C1F-8117-2FD5501C70F4}" type="datetimeFigureOut">
               <a:rPr lang="en-CA" smtClean="0"/>
-              <a:t>2024-03-10</a:t>
+              <a:t>2024-04-20</a:t>
             </a:fld>
             <a:endParaRPr lang="en-CA"/>
           </a:p>
@@ -2398,7 +2399,7 @@
           <a:p>
             <a:fld id="{8FF62803-A023-4C1F-8117-2FD5501C70F4}" type="datetimeFigureOut">
               <a:rPr lang="en-CA" smtClean="0"/>
-              <a:t>2024-03-10</a:t>
+              <a:t>2024-04-20</a:t>
             </a:fld>
             <a:endParaRPr lang="en-CA"/>
           </a:p>
@@ -2687,7 +2688,7 @@
           <a:p>
             <a:fld id="{8FF62803-A023-4C1F-8117-2FD5501C70F4}" type="datetimeFigureOut">
               <a:rPr lang="en-CA" smtClean="0"/>
-              <a:t>2024-03-10</a:t>
+              <a:t>2024-04-20</a:t>
             </a:fld>
             <a:endParaRPr lang="en-CA"/>
           </a:p>
@@ -2930,7 +2931,7 @@
           <a:p>
             <a:fld id="{8FF62803-A023-4C1F-8117-2FD5501C70F4}" type="datetimeFigureOut">
               <a:rPr lang="en-CA" smtClean="0"/>
-              <a:t>2024-03-10</a:t>
+              <a:t>2024-04-20</a:t>
             </a:fld>
             <a:endParaRPr lang="en-CA"/>
           </a:p>
@@ -4850,52 +4851,6 @@
           </a:fontRef>
         </p:style>
       </p:cxnSp>
-      <p:cxnSp>
-        <p:nvCxnSpPr>
-          <p:cNvPr id="80" name="Connector: Curved 79">
-            <a:extLst>
-              <a:ext uri="{FF2B5EF4-FFF2-40B4-BE49-F238E27FC236}">
-                <a16:creationId xmlns:a16="http://schemas.microsoft.com/office/drawing/2014/main" id="{76B91357-10C9-F9E6-7BDE-C61F04F5C368}"/>
-              </a:ext>
-            </a:extLst>
-          </p:cNvPr>
-          <p:cNvCxnSpPr>
-            <a:stCxn id="23" idx="3"/>
-            <a:endCxn id="43" idx="1"/>
-          </p:cNvCxnSpPr>
-          <p:nvPr/>
-        </p:nvCxnSpPr>
-        <p:spPr>
-          <a:xfrm flipV="1">
-            <a:off x="1119995" y="3302891"/>
-            <a:ext cx="3900439" cy="126109"/>
-          </a:xfrm>
-          <a:prstGeom prst="curvedConnector4">
-            <a:avLst>
-              <a:gd name="adj1" fmla="val 1066"/>
-              <a:gd name="adj2" fmla="val 1033473"/>
-            </a:avLst>
-          </a:prstGeom>
-          <a:ln>
-            <a:prstDash val="solid"/>
-            <a:tailEnd type="triangle"/>
-          </a:ln>
-        </p:spPr>
-        <p:style>
-          <a:lnRef idx="2">
-            <a:schemeClr val="accent1"/>
-          </a:lnRef>
-          <a:fillRef idx="0">
-            <a:schemeClr val="accent1"/>
-          </a:fillRef>
-          <a:effectRef idx="1">
-            <a:schemeClr val="accent1"/>
-          </a:effectRef>
-          <a:fontRef idx="minor">
-            <a:schemeClr val="tx1"/>
-          </a:fontRef>
-        </p:style>
-      </p:cxnSp>
       <p:sp>
         <p:nvSpPr>
           <p:cNvPr id="87" name="Oval 86">
@@ -5077,6 +5032,7 @@
             </a:extLst>
           </p:cNvPr>
           <p:cNvCxnSpPr>
+            <a:cxnSpLocks/>
             <a:stCxn id="32" idx="2"/>
             <a:endCxn id="87" idx="2"/>
           </p:cNvCxnSpPr>
@@ -5089,8 +5045,8 @@
           </a:xfrm>
           <a:prstGeom prst="bentConnector4">
             <a:avLst>
-              <a:gd name="adj1" fmla="val -1129846"/>
-              <a:gd name="adj2" fmla="val 93200"/>
+              <a:gd name="adj1" fmla="val -839535"/>
+              <a:gd name="adj2" fmla="val 90414"/>
             </a:avLst>
           </a:prstGeom>
           <a:ln>
@@ -5562,45 +5518,6 @@
           <a:ln>
             <a:tailEnd type="triangle"/>
           </a:ln>
-        </p:spPr>
-        <p:style>
-          <a:lnRef idx="2">
-            <a:schemeClr val="accent1"/>
-          </a:lnRef>
-          <a:fillRef idx="0">
-            <a:schemeClr val="accent1"/>
-          </a:fillRef>
-          <a:effectRef idx="1">
-            <a:schemeClr val="accent1"/>
-          </a:effectRef>
-          <a:fontRef idx="minor">
-            <a:schemeClr val="tx1"/>
-          </a:fontRef>
-        </p:style>
-      </p:cxnSp>
-      <p:cxnSp>
-        <p:nvCxnSpPr>
-          <p:cNvPr id="131" name="Straight Connector 130">
-            <a:extLst>
-              <a:ext uri="{FF2B5EF4-FFF2-40B4-BE49-F238E27FC236}">
-                <a16:creationId xmlns:a16="http://schemas.microsoft.com/office/drawing/2014/main" id="{886136BF-E0FF-2E5C-C5D0-BAFB91872F5C}"/>
-              </a:ext>
-            </a:extLst>
-          </p:cNvPr>
-          <p:cNvCxnSpPr>
-            <a:cxnSpLocks/>
-            <a:stCxn id="120" idx="2"/>
-          </p:cNvCxnSpPr>
-          <p:nvPr/>
-        </p:nvCxnSpPr>
-        <p:spPr>
-          <a:xfrm flipH="1">
-            <a:off x="7585075" y="4097416"/>
-            <a:ext cx="2033187" cy="0"/>
-          </a:xfrm>
-          <a:prstGeom prst="line">
-            <a:avLst/>
-          </a:prstGeom>
         </p:spPr>
         <p:style>
           <a:lnRef idx="2">
@@ -6562,10 +6479,3181 @@
           </a:p>
         </p:txBody>
       </p:sp>
+      <p:cxnSp>
+        <p:nvCxnSpPr>
+          <p:cNvPr id="16" name="Connector: Elbow 15">
+            <a:extLst>
+              <a:ext uri="{FF2B5EF4-FFF2-40B4-BE49-F238E27FC236}">
+                <a16:creationId xmlns:a16="http://schemas.microsoft.com/office/drawing/2014/main" id="{DCC325E0-E065-5DED-AA11-9063920B739A}"/>
+              </a:ext>
+            </a:extLst>
+          </p:cNvPr>
+          <p:cNvCxnSpPr>
+            <a:cxnSpLocks/>
+            <a:stCxn id="120" idx="2"/>
+            <a:endCxn id="103" idx="2"/>
+          </p:cNvCxnSpPr>
+          <p:nvPr/>
+        </p:nvCxnSpPr>
+        <p:spPr>
+          <a:xfrm rot="10800000">
+            <a:off x="8909194" y="3370490"/>
+            <a:ext cx="709068" cy="726927"/>
+          </a:xfrm>
+          <a:prstGeom prst="bentConnector3">
+            <a:avLst>
+              <a:gd name="adj1" fmla="val 160222"/>
+            </a:avLst>
+          </a:prstGeom>
+          <a:ln>
+            <a:tailEnd type="triangle"/>
+          </a:ln>
+        </p:spPr>
+        <p:style>
+          <a:lnRef idx="2">
+            <a:schemeClr val="accent1"/>
+          </a:lnRef>
+          <a:fillRef idx="0">
+            <a:schemeClr val="accent1"/>
+          </a:fillRef>
+          <a:effectRef idx="1">
+            <a:schemeClr val="accent1"/>
+          </a:effectRef>
+          <a:fontRef idx="minor">
+            <a:schemeClr val="tx1"/>
+          </a:fontRef>
+        </p:style>
+      </p:cxnSp>
+      <p:cxnSp>
+        <p:nvCxnSpPr>
+          <p:cNvPr id="30" name="Connector: Curved 29">
+            <a:extLst>
+              <a:ext uri="{FF2B5EF4-FFF2-40B4-BE49-F238E27FC236}">
+                <a16:creationId xmlns:a16="http://schemas.microsoft.com/office/drawing/2014/main" id="{DDC8E44C-E932-042E-192B-C9F317C8141E}"/>
+              </a:ext>
+            </a:extLst>
+          </p:cNvPr>
+          <p:cNvCxnSpPr>
+            <a:cxnSpLocks/>
+            <a:endCxn id="137" idx="1"/>
+          </p:cNvCxnSpPr>
+          <p:nvPr/>
+        </p:nvCxnSpPr>
+        <p:spPr>
+          <a:xfrm>
+            <a:off x="7477707" y="2490679"/>
+            <a:ext cx="3036393" cy="757147"/>
+          </a:xfrm>
+          <a:prstGeom prst="curvedConnector2">
+            <a:avLst/>
+          </a:prstGeom>
+          <a:ln>
+            <a:prstDash val="lgDashDot"/>
+          </a:ln>
+        </p:spPr>
+        <p:style>
+          <a:lnRef idx="2">
+            <a:schemeClr val="accent1"/>
+          </a:lnRef>
+          <a:fillRef idx="0">
+            <a:schemeClr val="accent1"/>
+          </a:fillRef>
+          <a:effectRef idx="1">
+            <a:schemeClr val="accent1"/>
+          </a:effectRef>
+          <a:fontRef idx="minor">
+            <a:schemeClr val="tx1"/>
+          </a:fontRef>
+        </p:style>
+      </p:cxnSp>
     </p:spTree>
     <p:extLst>
       <p:ext uri="{BB962C8B-B14F-4D97-AF65-F5344CB8AC3E}">
         <p14:creationId xmlns:p14="http://schemas.microsoft.com/office/powerpoint/2010/main" val="3961893226"/>
+      </p:ext>
+    </p:extLst>
+  </p:cSld>
+  <p:clrMapOvr>
+    <a:masterClrMapping/>
+  </p:clrMapOvr>
+</p:sld>
+</file>
+
+<file path=ppt/slides/slide2.xml><?xml version="1.0" encoding="utf-8"?>
+<p:sld xmlns:a="http://schemas.openxmlformats.org/drawingml/2006/main" xmlns:r="http://schemas.openxmlformats.org/officeDocument/2006/relationships" xmlns:p="http://schemas.openxmlformats.org/presentationml/2006/main">
+  <p:cSld>
+    <p:spTree>
+      <p:nvGrpSpPr>
+        <p:cNvPr id="1" name=""/>
+        <p:cNvGrpSpPr/>
+        <p:nvPr/>
+      </p:nvGrpSpPr>
+      <p:grpSpPr>
+        <a:xfrm>
+          <a:off x="0" y="0"/>
+          <a:ext cx="0" cy="0"/>
+          <a:chOff x="0" y="0"/>
+          <a:chExt cx="0" cy="0"/>
+        </a:xfrm>
+      </p:grpSpPr>
+      <p:sp>
+        <p:nvSpPr>
+          <p:cNvPr id="66" name="Rectangle 65">
+            <a:extLst>
+              <a:ext uri="{FF2B5EF4-FFF2-40B4-BE49-F238E27FC236}">
+                <a16:creationId xmlns:a16="http://schemas.microsoft.com/office/drawing/2014/main" id="{4C8F35AB-B81B-8390-7AE7-D57E917AFAC6}"/>
+              </a:ext>
+            </a:extLst>
+          </p:cNvPr>
+          <p:cNvSpPr/>
+          <p:nvPr/>
+        </p:nvSpPr>
+        <p:spPr>
+          <a:xfrm>
+            <a:off x="10215868" y="2958859"/>
+            <a:ext cx="1602318" cy="2526461"/>
+          </a:xfrm>
+          <a:prstGeom prst="rect">
+            <a:avLst/>
+          </a:prstGeom>
+          <a:ln>
+            <a:prstDash val="sysDash"/>
+          </a:ln>
+        </p:spPr>
+        <p:style>
+          <a:lnRef idx="2">
+            <a:schemeClr val="dk1"/>
+          </a:lnRef>
+          <a:fillRef idx="1">
+            <a:schemeClr val="lt1"/>
+          </a:fillRef>
+          <a:effectRef idx="0">
+            <a:schemeClr val="dk1"/>
+          </a:effectRef>
+          <a:fontRef idx="minor">
+            <a:schemeClr val="dk1"/>
+          </a:fontRef>
+        </p:style>
+        <p:txBody>
+          <a:bodyPr rtlCol="0" anchor="ctr"/>
+          <a:lstStyle/>
+          <a:p>
+            <a:pPr algn="ctr"/>
+            <a:endParaRPr lang="en-CA"/>
+          </a:p>
+        </p:txBody>
+      </p:sp>
+      <p:sp>
+        <p:nvSpPr>
+          <p:cNvPr id="64" name="Rectangle 63">
+            <a:extLst>
+              <a:ext uri="{FF2B5EF4-FFF2-40B4-BE49-F238E27FC236}">
+                <a16:creationId xmlns:a16="http://schemas.microsoft.com/office/drawing/2014/main" id="{DA6D15B7-3060-4AD6-9064-075D2C606C4B}"/>
+              </a:ext>
+            </a:extLst>
+          </p:cNvPr>
+          <p:cNvSpPr/>
+          <p:nvPr/>
+        </p:nvSpPr>
+        <p:spPr>
+          <a:xfrm>
+            <a:off x="9054557" y="318148"/>
+            <a:ext cx="2466796" cy="1429833"/>
+          </a:xfrm>
+          <a:prstGeom prst="rect">
+            <a:avLst/>
+          </a:prstGeom>
+        </p:spPr>
+        <p:style>
+          <a:lnRef idx="2">
+            <a:schemeClr val="accent1"/>
+          </a:lnRef>
+          <a:fillRef idx="1">
+            <a:schemeClr val="lt1"/>
+          </a:fillRef>
+          <a:effectRef idx="0">
+            <a:schemeClr val="accent1"/>
+          </a:effectRef>
+          <a:fontRef idx="minor">
+            <a:schemeClr val="dk1"/>
+          </a:fontRef>
+        </p:style>
+        <p:txBody>
+          <a:bodyPr rtlCol="0" anchor="ctr"/>
+          <a:lstStyle/>
+          <a:p>
+            <a:pPr algn="ctr"/>
+            <a:endParaRPr lang="en-CA"/>
+          </a:p>
+        </p:txBody>
+      </p:sp>
+      <p:sp>
+        <p:nvSpPr>
+          <p:cNvPr id="13" name="Rectangle 12">
+            <a:extLst>
+              <a:ext uri="{FF2B5EF4-FFF2-40B4-BE49-F238E27FC236}">
+                <a16:creationId xmlns:a16="http://schemas.microsoft.com/office/drawing/2014/main" id="{F6216BF4-A2CA-76C6-859D-DD4C5617C1E7}"/>
+              </a:ext>
+            </a:extLst>
+          </p:cNvPr>
+          <p:cNvSpPr/>
+          <p:nvPr/>
+        </p:nvSpPr>
+        <p:spPr>
+          <a:xfrm>
+            <a:off x="3328116" y="268857"/>
+            <a:ext cx="3961247" cy="1429833"/>
+          </a:xfrm>
+          <a:prstGeom prst="rect">
+            <a:avLst/>
+          </a:prstGeom>
+        </p:spPr>
+        <p:style>
+          <a:lnRef idx="2">
+            <a:schemeClr val="accent1"/>
+          </a:lnRef>
+          <a:fillRef idx="1">
+            <a:schemeClr val="lt1"/>
+          </a:fillRef>
+          <a:effectRef idx="0">
+            <a:schemeClr val="accent1"/>
+          </a:effectRef>
+          <a:fontRef idx="minor">
+            <a:schemeClr val="dk1"/>
+          </a:fontRef>
+        </p:style>
+        <p:txBody>
+          <a:bodyPr rtlCol="0" anchor="ctr"/>
+          <a:lstStyle/>
+          <a:p>
+            <a:pPr algn="ctr"/>
+            <a:endParaRPr lang="en-CA"/>
+          </a:p>
+        </p:txBody>
+      </p:sp>
+      <p:sp>
+        <p:nvSpPr>
+          <p:cNvPr id="4" name="Oval 3">
+            <a:extLst>
+              <a:ext uri="{FF2B5EF4-FFF2-40B4-BE49-F238E27FC236}">
+                <a16:creationId xmlns:a16="http://schemas.microsoft.com/office/drawing/2014/main" id="{05012E47-DD13-FA48-EC02-C04C2C3EF92F}"/>
+              </a:ext>
+            </a:extLst>
+          </p:cNvPr>
+          <p:cNvSpPr/>
+          <p:nvPr/>
+        </p:nvSpPr>
+        <p:spPr>
+          <a:xfrm>
+            <a:off x="334271" y="5527741"/>
+            <a:ext cx="362309" cy="370936"/>
+          </a:xfrm>
+          <a:prstGeom prst="ellipse">
+            <a:avLst/>
+          </a:prstGeom>
+          <a:solidFill>
+            <a:srgbClr val="FFFF00"/>
+          </a:solidFill>
+          <a:ln>
+            <a:solidFill>
+              <a:srgbClr val="FFC000"/>
+            </a:solidFill>
+          </a:ln>
+        </p:spPr>
+        <p:style>
+          <a:lnRef idx="2">
+            <a:schemeClr val="accent2">
+              <a:shade val="15000"/>
+            </a:schemeClr>
+          </a:lnRef>
+          <a:fillRef idx="1">
+            <a:schemeClr val="accent2"/>
+          </a:fillRef>
+          <a:effectRef idx="0">
+            <a:schemeClr val="accent2"/>
+          </a:effectRef>
+          <a:fontRef idx="minor">
+            <a:schemeClr val="lt1"/>
+          </a:fontRef>
+        </p:style>
+        <p:txBody>
+          <a:bodyPr rtlCol="0" anchor="ctr"/>
+          <a:lstStyle/>
+          <a:p>
+            <a:pPr algn="ctr"/>
+            <a:endParaRPr lang="en-CA"/>
+          </a:p>
+        </p:txBody>
+      </p:sp>
+      <p:sp>
+        <p:nvSpPr>
+          <p:cNvPr id="5" name="Oval 4">
+            <a:extLst>
+              <a:ext uri="{FF2B5EF4-FFF2-40B4-BE49-F238E27FC236}">
+                <a16:creationId xmlns:a16="http://schemas.microsoft.com/office/drawing/2014/main" id="{B3C8729B-B255-B27D-7AB4-9ABBA5F5A75E}"/>
+              </a:ext>
+            </a:extLst>
+          </p:cNvPr>
+          <p:cNvSpPr/>
+          <p:nvPr/>
+        </p:nvSpPr>
+        <p:spPr>
+          <a:xfrm>
+            <a:off x="339363" y="4890139"/>
+            <a:ext cx="362309" cy="370936"/>
+          </a:xfrm>
+          <a:prstGeom prst="ellipse">
+            <a:avLst/>
+          </a:prstGeom>
+        </p:spPr>
+        <p:style>
+          <a:lnRef idx="2">
+            <a:schemeClr val="accent1">
+              <a:shade val="15000"/>
+            </a:schemeClr>
+          </a:lnRef>
+          <a:fillRef idx="1">
+            <a:schemeClr val="accent1"/>
+          </a:fillRef>
+          <a:effectRef idx="0">
+            <a:schemeClr val="accent1"/>
+          </a:effectRef>
+          <a:fontRef idx="minor">
+            <a:schemeClr val="lt1"/>
+          </a:fontRef>
+        </p:style>
+        <p:txBody>
+          <a:bodyPr rtlCol="0" anchor="ctr"/>
+          <a:lstStyle/>
+          <a:p>
+            <a:pPr algn="ctr"/>
+            <a:endParaRPr lang="en-CA"/>
+          </a:p>
+        </p:txBody>
+      </p:sp>
+      <p:pic>
+        <p:nvPicPr>
+          <p:cNvPr id="7" name="Graphic 6" descr="Database outline">
+            <a:extLst>
+              <a:ext uri="{FF2B5EF4-FFF2-40B4-BE49-F238E27FC236}">
+                <a16:creationId xmlns:a16="http://schemas.microsoft.com/office/drawing/2014/main" id="{0E824BB0-A48D-F347-0E22-17B7DF1A6177}"/>
+              </a:ext>
+            </a:extLst>
+          </p:cNvPr>
+          <p:cNvPicPr>
+            <a:picLocks noChangeAspect="1"/>
+          </p:cNvPicPr>
+          <p:nvPr/>
+        </p:nvPicPr>
+        <p:blipFill>
+          <a:blip r:embed="rId2">
+            <a:extLst>
+              <a:ext uri="{28A0092B-C50C-407E-A947-70E740481C1C}">
+                <a14:useLocalDpi xmlns:a14="http://schemas.microsoft.com/office/drawing/2010/main" val="0"/>
+              </a:ext>
+              <a:ext uri="{96DAC541-7B7A-43D3-8B79-37D633B846F1}">
+                <asvg:svgBlip xmlns:asvg="http://schemas.microsoft.com/office/drawing/2016/SVG/main" r:embed="rId3"/>
+              </a:ext>
+            </a:extLst>
+          </a:blip>
+          <a:stretch>
+            <a:fillRect/>
+          </a:stretch>
+        </p:blipFill>
+        <p:spPr>
+          <a:xfrm>
+            <a:off x="4954806" y="970308"/>
+            <a:ext cx="618226" cy="618226"/>
+          </a:xfrm>
+          <a:prstGeom prst="rect">
+            <a:avLst/>
+          </a:prstGeom>
+        </p:spPr>
+      </p:pic>
+      <p:pic>
+        <p:nvPicPr>
+          <p:cNvPr id="8" name="Graphic 7" descr="Database outline">
+            <a:extLst>
+              <a:ext uri="{FF2B5EF4-FFF2-40B4-BE49-F238E27FC236}">
+                <a16:creationId xmlns:a16="http://schemas.microsoft.com/office/drawing/2014/main" id="{C72B8ED9-24F6-31A4-39BB-B0C511B4EF5C}"/>
+              </a:ext>
+            </a:extLst>
+          </p:cNvPr>
+          <p:cNvPicPr>
+            <a:picLocks noChangeAspect="1"/>
+          </p:cNvPicPr>
+          <p:nvPr/>
+        </p:nvPicPr>
+        <p:blipFill>
+          <a:blip r:embed="rId4">
+            <a:extLst>
+              <a:ext uri="{28A0092B-C50C-407E-A947-70E740481C1C}">
+                <a14:useLocalDpi xmlns:a14="http://schemas.microsoft.com/office/drawing/2010/main" val="0"/>
+              </a:ext>
+              <a:ext uri="{96DAC541-7B7A-43D3-8B79-37D633B846F1}">
+                <asvg:svgBlip xmlns:asvg="http://schemas.microsoft.com/office/drawing/2016/SVG/main" r:embed="rId5"/>
+              </a:ext>
+            </a:extLst>
+          </a:blip>
+          <a:stretch>
+            <a:fillRect/>
+          </a:stretch>
+        </p:blipFill>
+        <p:spPr>
+          <a:xfrm>
+            <a:off x="1247111" y="1977431"/>
+            <a:ext cx="618226" cy="618226"/>
+          </a:xfrm>
+          <a:prstGeom prst="rect">
+            <a:avLst/>
+          </a:prstGeom>
+        </p:spPr>
+      </p:pic>
+      <p:sp>
+        <p:nvSpPr>
+          <p:cNvPr id="9" name="Oval 8">
+            <a:extLst>
+              <a:ext uri="{FF2B5EF4-FFF2-40B4-BE49-F238E27FC236}">
+                <a16:creationId xmlns:a16="http://schemas.microsoft.com/office/drawing/2014/main" id="{C66D25F2-D0EB-8A26-239E-A7155E4AB268}"/>
+              </a:ext>
+            </a:extLst>
+          </p:cNvPr>
+          <p:cNvSpPr/>
+          <p:nvPr/>
+        </p:nvSpPr>
+        <p:spPr>
+          <a:xfrm>
+            <a:off x="1375912" y="3243532"/>
+            <a:ext cx="362309" cy="370936"/>
+          </a:xfrm>
+          <a:prstGeom prst="ellipse">
+            <a:avLst/>
+          </a:prstGeom>
+          <a:solidFill>
+            <a:srgbClr val="FFFF00"/>
+          </a:solidFill>
+          <a:ln>
+            <a:solidFill>
+              <a:srgbClr val="FFC000"/>
+            </a:solidFill>
+          </a:ln>
+        </p:spPr>
+        <p:style>
+          <a:lnRef idx="2">
+            <a:schemeClr val="accent2">
+              <a:shade val="15000"/>
+            </a:schemeClr>
+          </a:lnRef>
+          <a:fillRef idx="1">
+            <a:schemeClr val="accent2"/>
+          </a:fillRef>
+          <a:effectRef idx="0">
+            <a:schemeClr val="accent2"/>
+          </a:effectRef>
+          <a:fontRef idx="minor">
+            <a:schemeClr val="lt1"/>
+          </a:fontRef>
+        </p:style>
+        <p:txBody>
+          <a:bodyPr rtlCol="0" anchor="ctr"/>
+          <a:lstStyle/>
+          <a:p>
+            <a:pPr algn="ctr"/>
+            <a:endParaRPr lang="en-CA" dirty="0"/>
+          </a:p>
+        </p:txBody>
+      </p:sp>
+      <p:sp>
+        <p:nvSpPr>
+          <p:cNvPr id="10" name="TextBox 9">
+            <a:extLst>
+              <a:ext uri="{FF2B5EF4-FFF2-40B4-BE49-F238E27FC236}">
+                <a16:creationId xmlns:a16="http://schemas.microsoft.com/office/drawing/2014/main" id="{2EA0943F-B351-42A6-78F5-8F93693A814A}"/>
+              </a:ext>
+            </a:extLst>
+          </p:cNvPr>
+          <p:cNvSpPr txBox="1"/>
+          <p:nvPr/>
+        </p:nvSpPr>
+        <p:spPr>
+          <a:xfrm>
+            <a:off x="1030518" y="3614468"/>
+            <a:ext cx="941717" cy="461665"/>
+          </a:xfrm>
+          <a:prstGeom prst="rect">
+            <a:avLst/>
+          </a:prstGeom>
+          <a:noFill/>
+        </p:spPr>
+        <p:txBody>
+          <a:bodyPr wrap="square" rtlCol="0">
+            <a:spAutoFit/>
+          </a:bodyPr>
+          <a:lstStyle/>
+          <a:p>
+            <a:pPr algn="ctr"/>
+            <a:r>
+              <a:rPr lang="en-CA" sz="1200" dirty="0"/>
+              <a:t>Input prompt</a:t>
+            </a:r>
+          </a:p>
+        </p:txBody>
+      </p:sp>
+      <p:sp>
+        <p:nvSpPr>
+          <p:cNvPr id="11" name="Diamond 10">
+            <a:extLst>
+              <a:ext uri="{FF2B5EF4-FFF2-40B4-BE49-F238E27FC236}">
+                <a16:creationId xmlns:a16="http://schemas.microsoft.com/office/drawing/2014/main" id="{908F9936-EFCC-88C6-87C4-ECA5A6FAB862}"/>
+              </a:ext>
+            </a:extLst>
+          </p:cNvPr>
+          <p:cNvSpPr/>
+          <p:nvPr/>
+        </p:nvSpPr>
+        <p:spPr>
+          <a:xfrm>
+            <a:off x="381717" y="6159468"/>
+            <a:ext cx="267419" cy="253917"/>
+          </a:xfrm>
+          <a:prstGeom prst="diamond">
+            <a:avLst/>
+          </a:prstGeom>
+        </p:spPr>
+        <p:style>
+          <a:lnRef idx="1">
+            <a:schemeClr val="accent5"/>
+          </a:lnRef>
+          <a:fillRef idx="2">
+            <a:schemeClr val="accent5"/>
+          </a:fillRef>
+          <a:effectRef idx="1">
+            <a:schemeClr val="accent5"/>
+          </a:effectRef>
+          <a:fontRef idx="minor">
+            <a:schemeClr val="dk1"/>
+          </a:fontRef>
+        </p:style>
+        <p:txBody>
+          <a:bodyPr rtlCol="0" anchor="ctr"/>
+          <a:lstStyle/>
+          <a:p>
+            <a:pPr algn="ctr"/>
+            <a:endParaRPr lang="en-CA"/>
+          </a:p>
+        </p:txBody>
+      </p:sp>
+      <p:sp>
+        <p:nvSpPr>
+          <p:cNvPr id="17" name="TextBox 16">
+            <a:extLst>
+              <a:ext uri="{FF2B5EF4-FFF2-40B4-BE49-F238E27FC236}">
+                <a16:creationId xmlns:a16="http://schemas.microsoft.com/office/drawing/2014/main" id="{B07D9BD7-3933-A831-4E31-CC96B4159E88}"/>
+              </a:ext>
+            </a:extLst>
+          </p:cNvPr>
+          <p:cNvSpPr txBox="1"/>
+          <p:nvPr/>
+        </p:nvSpPr>
+        <p:spPr>
+          <a:xfrm>
+            <a:off x="4628723" y="526336"/>
+            <a:ext cx="1321280" cy="461665"/>
+          </a:xfrm>
+          <a:prstGeom prst="rect">
+            <a:avLst/>
+          </a:prstGeom>
+          <a:noFill/>
+        </p:spPr>
+        <p:txBody>
+          <a:bodyPr wrap="square" rtlCol="0">
+            <a:spAutoFit/>
+          </a:bodyPr>
+          <a:lstStyle/>
+          <a:p>
+            <a:pPr algn="ctr"/>
+            <a:r>
+              <a:rPr lang="en-CA" sz="1200" dirty="0"/>
+              <a:t>Generic Knowledge-base</a:t>
+            </a:r>
+          </a:p>
+        </p:txBody>
+      </p:sp>
+      <p:sp>
+        <p:nvSpPr>
+          <p:cNvPr id="19" name="TextBox 18">
+            <a:extLst>
+              <a:ext uri="{FF2B5EF4-FFF2-40B4-BE49-F238E27FC236}">
+                <a16:creationId xmlns:a16="http://schemas.microsoft.com/office/drawing/2014/main" id="{E30BDC8E-1629-D442-EEE0-125BA3128E25}"/>
+              </a:ext>
+            </a:extLst>
+          </p:cNvPr>
+          <p:cNvSpPr txBox="1"/>
+          <p:nvPr/>
+        </p:nvSpPr>
+        <p:spPr>
+          <a:xfrm>
+            <a:off x="1085365" y="1446357"/>
+            <a:ext cx="941717" cy="646331"/>
+          </a:xfrm>
+          <a:prstGeom prst="rect">
+            <a:avLst/>
+          </a:prstGeom>
+          <a:noFill/>
+        </p:spPr>
+        <p:txBody>
+          <a:bodyPr wrap="square" rtlCol="0">
+            <a:spAutoFit/>
+          </a:bodyPr>
+          <a:lstStyle/>
+          <a:p>
+            <a:pPr algn="ctr"/>
+            <a:r>
+              <a:rPr lang="en-CA" sz="1200" dirty="0"/>
+              <a:t>Project specific context</a:t>
+            </a:r>
+          </a:p>
+        </p:txBody>
+      </p:sp>
+      <p:cxnSp>
+        <p:nvCxnSpPr>
+          <p:cNvPr id="20" name="Straight Arrow Connector 19">
+            <a:extLst>
+              <a:ext uri="{FF2B5EF4-FFF2-40B4-BE49-F238E27FC236}">
+                <a16:creationId xmlns:a16="http://schemas.microsoft.com/office/drawing/2014/main" id="{0B52063A-6704-4123-0C36-AE0DFACD4B12}"/>
+              </a:ext>
+            </a:extLst>
+          </p:cNvPr>
+          <p:cNvCxnSpPr>
+            <a:cxnSpLocks/>
+            <a:endCxn id="9" idx="2"/>
+          </p:cNvCxnSpPr>
+          <p:nvPr/>
+        </p:nvCxnSpPr>
+        <p:spPr>
+          <a:xfrm>
+            <a:off x="992038" y="3429000"/>
+            <a:ext cx="383874" cy="0"/>
+          </a:xfrm>
+          <a:prstGeom prst="straightConnector1">
+            <a:avLst/>
+          </a:prstGeom>
+          <a:ln>
+            <a:tailEnd type="triangle"/>
+          </a:ln>
+        </p:spPr>
+        <p:style>
+          <a:lnRef idx="2">
+            <a:schemeClr val="accent1"/>
+          </a:lnRef>
+          <a:fillRef idx="0">
+            <a:schemeClr val="accent1"/>
+          </a:fillRef>
+          <a:effectRef idx="1">
+            <a:schemeClr val="accent1"/>
+          </a:effectRef>
+          <a:fontRef idx="minor">
+            <a:schemeClr val="tx1"/>
+          </a:fontRef>
+        </p:style>
+      </p:cxnSp>
+      <p:sp>
+        <p:nvSpPr>
+          <p:cNvPr id="23" name="TextBox 22">
+            <a:extLst>
+              <a:ext uri="{FF2B5EF4-FFF2-40B4-BE49-F238E27FC236}">
+                <a16:creationId xmlns:a16="http://schemas.microsoft.com/office/drawing/2014/main" id="{73B3FDCA-09E4-C2D8-1EAE-F5C45C01E04C}"/>
+              </a:ext>
+            </a:extLst>
+          </p:cNvPr>
+          <p:cNvSpPr txBox="1"/>
+          <p:nvPr/>
+        </p:nvSpPr>
+        <p:spPr>
+          <a:xfrm>
+            <a:off x="178278" y="3302042"/>
+            <a:ext cx="941717" cy="276999"/>
+          </a:xfrm>
+          <a:prstGeom prst="rect">
+            <a:avLst/>
+          </a:prstGeom>
+          <a:noFill/>
+        </p:spPr>
+        <p:txBody>
+          <a:bodyPr wrap="square" rtlCol="0">
+            <a:spAutoFit/>
+          </a:bodyPr>
+          <a:lstStyle/>
+          <a:p>
+            <a:pPr algn="ctr"/>
+            <a:r>
+              <a:rPr lang="en-CA" sz="1200" dirty="0"/>
+              <a:t>Objective</a:t>
+            </a:r>
+          </a:p>
+        </p:txBody>
+      </p:sp>
+      <p:sp>
+        <p:nvSpPr>
+          <p:cNvPr id="24" name="Oval 23">
+            <a:extLst>
+              <a:ext uri="{FF2B5EF4-FFF2-40B4-BE49-F238E27FC236}">
+                <a16:creationId xmlns:a16="http://schemas.microsoft.com/office/drawing/2014/main" id="{5178E12F-11DC-6F13-93AC-9CE6156DCB16}"/>
+              </a:ext>
+            </a:extLst>
+          </p:cNvPr>
+          <p:cNvSpPr/>
+          <p:nvPr/>
+        </p:nvSpPr>
+        <p:spPr>
+          <a:xfrm>
+            <a:off x="2334543" y="3243532"/>
+            <a:ext cx="362309" cy="370936"/>
+          </a:xfrm>
+          <a:prstGeom prst="ellipse">
+            <a:avLst/>
+          </a:prstGeom>
+        </p:spPr>
+        <p:style>
+          <a:lnRef idx="2">
+            <a:schemeClr val="accent1">
+              <a:shade val="15000"/>
+            </a:schemeClr>
+          </a:lnRef>
+          <a:fillRef idx="1">
+            <a:schemeClr val="accent1"/>
+          </a:fillRef>
+          <a:effectRef idx="0">
+            <a:schemeClr val="accent1"/>
+          </a:effectRef>
+          <a:fontRef idx="minor">
+            <a:schemeClr val="lt1"/>
+          </a:fontRef>
+        </p:style>
+        <p:txBody>
+          <a:bodyPr rtlCol="0" anchor="ctr"/>
+          <a:lstStyle/>
+          <a:p>
+            <a:pPr algn="ctr"/>
+            <a:endParaRPr lang="en-CA"/>
+          </a:p>
+        </p:txBody>
+      </p:sp>
+      <p:cxnSp>
+        <p:nvCxnSpPr>
+          <p:cNvPr id="25" name="Straight Arrow Connector 24">
+            <a:extLst>
+              <a:ext uri="{FF2B5EF4-FFF2-40B4-BE49-F238E27FC236}">
+                <a16:creationId xmlns:a16="http://schemas.microsoft.com/office/drawing/2014/main" id="{E646251F-54B7-C4D5-F40B-174FFE23C6A1}"/>
+              </a:ext>
+            </a:extLst>
+          </p:cNvPr>
+          <p:cNvCxnSpPr>
+            <a:cxnSpLocks/>
+            <a:stCxn id="9" idx="6"/>
+            <a:endCxn id="24" idx="2"/>
+          </p:cNvCxnSpPr>
+          <p:nvPr/>
+        </p:nvCxnSpPr>
+        <p:spPr>
+          <a:xfrm>
+            <a:off x="1738221" y="3429000"/>
+            <a:ext cx="596322" cy="0"/>
+          </a:xfrm>
+          <a:prstGeom prst="straightConnector1">
+            <a:avLst/>
+          </a:prstGeom>
+          <a:ln>
+            <a:tailEnd type="triangle"/>
+          </a:ln>
+        </p:spPr>
+        <p:style>
+          <a:lnRef idx="2">
+            <a:schemeClr val="accent1"/>
+          </a:lnRef>
+          <a:fillRef idx="0">
+            <a:schemeClr val="accent1"/>
+          </a:fillRef>
+          <a:effectRef idx="1">
+            <a:schemeClr val="accent1"/>
+          </a:effectRef>
+          <a:fontRef idx="minor">
+            <a:schemeClr val="tx1"/>
+          </a:fontRef>
+        </p:style>
+      </p:cxnSp>
+      <p:sp>
+        <p:nvSpPr>
+          <p:cNvPr id="29" name="TextBox 28">
+            <a:extLst>
+              <a:ext uri="{FF2B5EF4-FFF2-40B4-BE49-F238E27FC236}">
+                <a16:creationId xmlns:a16="http://schemas.microsoft.com/office/drawing/2014/main" id="{6479010A-4A4B-F713-A765-5AD753FFD1C3}"/>
+              </a:ext>
+            </a:extLst>
+          </p:cNvPr>
+          <p:cNvSpPr txBox="1"/>
+          <p:nvPr/>
+        </p:nvSpPr>
+        <p:spPr>
+          <a:xfrm>
+            <a:off x="1994138" y="3609447"/>
+            <a:ext cx="1022227" cy="830997"/>
+          </a:xfrm>
+          <a:prstGeom prst="rect">
+            <a:avLst/>
+          </a:prstGeom>
+          <a:noFill/>
+        </p:spPr>
+        <p:txBody>
+          <a:bodyPr wrap="square" rtlCol="0">
+            <a:spAutoFit/>
+          </a:bodyPr>
+          <a:lstStyle/>
+          <a:p>
+            <a:pPr algn="ctr"/>
+            <a:r>
+              <a:rPr lang="en-CA" sz="1200" dirty="0"/>
+              <a:t>Generate literature review questions</a:t>
+            </a:r>
+          </a:p>
+        </p:txBody>
+      </p:sp>
+      <p:sp>
+        <p:nvSpPr>
+          <p:cNvPr id="31" name="Rectangle 30">
+            <a:extLst>
+              <a:ext uri="{FF2B5EF4-FFF2-40B4-BE49-F238E27FC236}">
+                <a16:creationId xmlns:a16="http://schemas.microsoft.com/office/drawing/2014/main" id="{A7631CBF-E114-EB31-6FB1-020DE8AA0B6D}"/>
+              </a:ext>
+            </a:extLst>
+          </p:cNvPr>
+          <p:cNvSpPr/>
+          <p:nvPr/>
+        </p:nvSpPr>
+        <p:spPr>
+          <a:xfrm>
+            <a:off x="3328116" y="2667000"/>
+            <a:ext cx="3961247" cy="1614488"/>
+          </a:xfrm>
+          <a:prstGeom prst="rect">
+            <a:avLst/>
+          </a:prstGeom>
+          <a:ln>
+            <a:prstDash val="sysDash"/>
+          </a:ln>
+        </p:spPr>
+        <p:style>
+          <a:lnRef idx="2">
+            <a:schemeClr val="dk1"/>
+          </a:lnRef>
+          <a:fillRef idx="1">
+            <a:schemeClr val="lt1"/>
+          </a:fillRef>
+          <a:effectRef idx="0">
+            <a:schemeClr val="dk1"/>
+          </a:effectRef>
+          <a:fontRef idx="minor">
+            <a:schemeClr val="dk1"/>
+          </a:fontRef>
+        </p:style>
+        <p:txBody>
+          <a:bodyPr rtlCol="0" anchor="ctr"/>
+          <a:lstStyle/>
+          <a:p>
+            <a:pPr algn="ctr"/>
+            <a:endParaRPr lang="en-CA"/>
+          </a:p>
+        </p:txBody>
+      </p:sp>
+      <p:sp>
+        <p:nvSpPr>
+          <p:cNvPr id="32" name="Diamond 31">
+            <a:extLst>
+              <a:ext uri="{FF2B5EF4-FFF2-40B4-BE49-F238E27FC236}">
+                <a16:creationId xmlns:a16="http://schemas.microsoft.com/office/drawing/2014/main" id="{F9F1B89B-833C-0714-F7C2-8221929E74CA}"/>
+              </a:ext>
+            </a:extLst>
+          </p:cNvPr>
+          <p:cNvSpPr/>
+          <p:nvPr/>
+        </p:nvSpPr>
+        <p:spPr>
+          <a:xfrm>
+            <a:off x="2933911" y="3309658"/>
+            <a:ext cx="267419" cy="253917"/>
+          </a:xfrm>
+          <a:prstGeom prst="diamond">
+            <a:avLst/>
+          </a:prstGeom>
+        </p:spPr>
+        <p:style>
+          <a:lnRef idx="1">
+            <a:schemeClr val="accent5"/>
+          </a:lnRef>
+          <a:fillRef idx="2">
+            <a:schemeClr val="accent5"/>
+          </a:fillRef>
+          <a:effectRef idx="1">
+            <a:schemeClr val="accent5"/>
+          </a:effectRef>
+          <a:fontRef idx="minor">
+            <a:schemeClr val="dk1"/>
+          </a:fontRef>
+        </p:style>
+        <p:txBody>
+          <a:bodyPr rtlCol="0" anchor="ctr"/>
+          <a:lstStyle/>
+          <a:p>
+            <a:pPr algn="ctr"/>
+            <a:endParaRPr lang="en-CA"/>
+          </a:p>
+        </p:txBody>
+      </p:sp>
+      <p:cxnSp>
+        <p:nvCxnSpPr>
+          <p:cNvPr id="33" name="Straight Arrow Connector 32">
+            <a:extLst>
+              <a:ext uri="{FF2B5EF4-FFF2-40B4-BE49-F238E27FC236}">
+                <a16:creationId xmlns:a16="http://schemas.microsoft.com/office/drawing/2014/main" id="{A3E7963A-E9C8-C596-E7A6-2E87E95A10FE}"/>
+              </a:ext>
+            </a:extLst>
+          </p:cNvPr>
+          <p:cNvCxnSpPr>
+            <a:cxnSpLocks/>
+            <a:stCxn id="24" idx="6"/>
+            <a:endCxn id="32" idx="1"/>
+          </p:cNvCxnSpPr>
+          <p:nvPr/>
+        </p:nvCxnSpPr>
+        <p:spPr>
+          <a:xfrm>
+            <a:off x="2696852" y="3429000"/>
+            <a:ext cx="237059" cy="7617"/>
+          </a:xfrm>
+          <a:prstGeom prst="straightConnector1">
+            <a:avLst/>
+          </a:prstGeom>
+          <a:ln>
+            <a:tailEnd type="triangle"/>
+          </a:ln>
+        </p:spPr>
+        <p:style>
+          <a:lnRef idx="2">
+            <a:schemeClr val="accent1"/>
+          </a:lnRef>
+          <a:fillRef idx="0">
+            <a:schemeClr val="accent1"/>
+          </a:fillRef>
+          <a:effectRef idx="1">
+            <a:schemeClr val="accent1"/>
+          </a:effectRef>
+          <a:fontRef idx="minor">
+            <a:schemeClr val="tx1"/>
+          </a:fontRef>
+        </p:style>
+      </p:cxnSp>
+      <p:sp>
+        <p:nvSpPr>
+          <p:cNvPr id="37" name="TextBox 36">
+            <a:extLst>
+              <a:ext uri="{FF2B5EF4-FFF2-40B4-BE49-F238E27FC236}">
+                <a16:creationId xmlns:a16="http://schemas.microsoft.com/office/drawing/2014/main" id="{9DD61443-34FA-0DA6-FC41-29C5D9673726}"/>
+              </a:ext>
+            </a:extLst>
+          </p:cNvPr>
+          <p:cNvSpPr txBox="1"/>
+          <p:nvPr/>
+        </p:nvSpPr>
+        <p:spPr>
+          <a:xfrm>
+            <a:off x="4395624" y="4320623"/>
+            <a:ext cx="2290763" cy="461665"/>
+          </a:xfrm>
+          <a:prstGeom prst="rect">
+            <a:avLst/>
+          </a:prstGeom>
+          <a:noFill/>
+        </p:spPr>
+        <p:txBody>
+          <a:bodyPr wrap="square" rtlCol="0">
+            <a:spAutoFit/>
+          </a:bodyPr>
+          <a:lstStyle/>
+          <a:p>
+            <a:pPr algn="ctr"/>
+            <a:r>
+              <a:rPr lang="en-CA" sz="1200" dirty="0"/>
+              <a:t>Augmenting the requirements with more knowledge</a:t>
+            </a:r>
+          </a:p>
+        </p:txBody>
+      </p:sp>
+      <p:pic>
+        <p:nvPicPr>
+          <p:cNvPr id="40" name="Graphic 39" descr="Internet Of Things outline">
+            <a:extLst>
+              <a:ext uri="{FF2B5EF4-FFF2-40B4-BE49-F238E27FC236}">
+                <a16:creationId xmlns:a16="http://schemas.microsoft.com/office/drawing/2014/main" id="{648270A1-0D83-89B3-B3A3-DBB57A505603}"/>
+              </a:ext>
+            </a:extLst>
+          </p:cNvPr>
+          <p:cNvPicPr>
+            <a:picLocks noChangeAspect="1"/>
+          </p:cNvPicPr>
+          <p:nvPr/>
+        </p:nvPicPr>
+        <p:blipFill>
+          <a:blip r:embed="rId6">
+            <a:extLst>
+              <a:ext uri="{28A0092B-C50C-407E-A947-70E740481C1C}">
+                <a14:useLocalDpi xmlns:a14="http://schemas.microsoft.com/office/drawing/2010/main" val="0"/>
+              </a:ext>
+              <a:ext uri="{96DAC541-7B7A-43D3-8B79-37D633B846F1}">
+                <asvg:svgBlip xmlns:asvg="http://schemas.microsoft.com/office/drawing/2016/SVG/main" r:embed="rId7"/>
+              </a:ext>
+            </a:extLst>
+          </a:blip>
+          <a:stretch>
+            <a:fillRect/>
+          </a:stretch>
+        </p:blipFill>
+        <p:spPr>
+          <a:xfrm>
+            <a:off x="6314427" y="989548"/>
+            <a:ext cx="618226" cy="618226"/>
+          </a:xfrm>
+          <a:prstGeom prst="rect">
+            <a:avLst/>
+          </a:prstGeom>
+        </p:spPr>
+      </p:pic>
+      <p:sp>
+        <p:nvSpPr>
+          <p:cNvPr id="41" name="TextBox 40">
+            <a:extLst>
+              <a:ext uri="{FF2B5EF4-FFF2-40B4-BE49-F238E27FC236}">
+                <a16:creationId xmlns:a16="http://schemas.microsoft.com/office/drawing/2014/main" id="{A1635085-F802-EF3B-791A-69A10C04ECAD}"/>
+              </a:ext>
+            </a:extLst>
+          </p:cNvPr>
+          <p:cNvSpPr txBox="1"/>
+          <p:nvPr/>
+        </p:nvSpPr>
+        <p:spPr>
+          <a:xfrm>
+            <a:off x="5953400" y="693930"/>
+            <a:ext cx="1321280" cy="276999"/>
+          </a:xfrm>
+          <a:prstGeom prst="rect">
+            <a:avLst/>
+          </a:prstGeom>
+          <a:noFill/>
+        </p:spPr>
+        <p:txBody>
+          <a:bodyPr wrap="square" rtlCol="0">
+            <a:spAutoFit/>
+          </a:bodyPr>
+          <a:lstStyle/>
+          <a:p>
+            <a:pPr algn="ctr"/>
+            <a:r>
+              <a:rPr lang="en-CA" sz="1200" dirty="0"/>
+              <a:t>Internet search</a:t>
+            </a:r>
+          </a:p>
+        </p:txBody>
+      </p:sp>
+      <p:sp>
+        <p:nvSpPr>
+          <p:cNvPr id="42" name="Oval 41">
+            <a:extLst>
+              <a:ext uri="{FF2B5EF4-FFF2-40B4-BE49-F238E27FC236}">
+                <a16:creationId xmlns:a16="http://schemas.microsoft.com/office/drawing/2014/main" id="{1D272201-1478-F78D-1689-64CFC692BEFA}"/>
+              </a:ext>
+            </a:extLst>
+          </p:cNvPr>
+          <p:cNvSpPr/>
+          <p:nvPr/>
+        </p:nvSpPr>
+        <p:spPr>
+          <a:xfrm>
+            <a:off x="4249986" y="3243532"/>
+            <a:ext cx="362309" cy="370936"/>
+          </a:xfrm>
+          <a:prstGeom prst="ellipse">
+            <a:avLst/>
+          </a:prstGeom>
+        </p:spPr>
+        <p:style>
+          <a:lnRef idx="2">
+            <a:schemeClr val="accent1">
+              <a:shade val="15000"/>
+            </a:schemeClr>
+          </a:lnRef>
+          <a:fillRef idx="1">
+            <a:schemeClr val="accent1"/>
+          </a:fillRef>
+          <a:effectRef idx="0">
+            <a:schemeClr val="accent1"/>
+          </a:effectRef>
+          <a:fontRef idx="minor">
+            <a:schemeClr val="lt1"/>
+          </a:fontRef>
+        </p:style>
+        <p:txBody>
+          <a:bodyPr rtlCol="0" anchor="ctr"/>
+          <a:lstStyle/>
+          <a:p>
+            <a:pPr algn="ctr"/>
+            <a:endParaRPr lang="en-CA"/>
+          </a:p>
+        </p:txBody>
+      </p:sp>
+      <p:sp>
+        <p:nvSpPr>
+          <p:cNvPr id="43" name="Oval 42">
+            <a:extLst>
+              <a:ext uri="{FF2B5EF4-FFF2-40B4-BE49-F238E27FC236}">
+                <a16:creationId xmlns:a16="http://schemas.microsoft.com/office/drawing/2014/main" id="{28C4886B-A097-DB45-95E5-5716F729823D}"/>
+              </a:ext>
+            </a:extLst>
+          </p:cNvPr>
+          <p:cNvSpPr/>
+          <p:nvPr/>
+        </p:nvSpPr>
+        <p:spPr>
+          <a:xfrm>
+            <a:off x="4967375" y="3248569"/>
+            <a:ext cx="362309" cy="370936"/>
+          </a:xfrm>
+          <a:prstGeom prst="ellipse">
+            <a:avLst/>
+          </a:prstGeom>
+        </p:spPr>
+        <p:style>
+          <a:lnRef idx="2">
+            <a:schemeClr val="accent1">
+              <a:shade val="15000"/>
+            </a:schemeClr>
+          </a:lnRef>
+          <a:fillRef idx="1">
+            <a:schemeClr val="accent1"/>
+          </a:fillRef>
+          <a:effectRef idx="0">
+            <a:schemeClr val="accent1"/>
+          </a:effectRef>
+          <a:fontRef idx="minor">
+            <a:schemeClr val="lt1"/>
+          </a:fontRef>
+        </p:style>
+        <p:txBody>
+          <a:bodyPr rtlCol="0" anchor="ctr"/>
+          <a:lstStyle/>
+          <a:p>
+            <a:pPr algn="ctr"/>
+            <a:endParaRPr lang="en-CA"/>
+          </a:p>
+        </p:txBody>
+      </p:sp>
+      <p:sp>
+        <p:nvSpPr>
+          <p:cNvPr id="44" name="Oval 43">
+            <a:extLst>
+              <a:ext uri="{FF2B5EF4-FFF2-40B4-BE49-F238E27FC236}">
+                <a16:creationId xmlns:a16="http://schemas.microsoft.com/office/drawing/2014/main" id="{98D5D6D5-7638-D4FD-7452-F254A7FAFAE2}"/>
+              </a:ext>
+            </a:extLst>
+          </p:cNvPr>
+          <p:cNvSpPr/>
+          <p:nvPr/>
+        </p:nvSpPr>
+        <p:spPr>
+          <a:xfrm>
+            <a:off x="6505233" y="2868735"/>
+            <a:ext cx="362309" cy="370936"/>
+          </a:xfrm>
+          <a:prstGeom prst="ellipse">
+            <a:avLst/>
+          </a:prstGeom>
+        </p:spPr>
+        <p:style>
+          <a:lnRef idx="2">
+            <a:schemeClr val="accent1">
+              <a:shade val="15000"/>
+            </a:schemeClr>
+          </a:lnRef>
+          <a:fillRef idx="1">
+            <a:schemeClr val="accent1"/>
+          </a:fillRef>
+          <a:effectRef idx="0">
+            <a:schemeClr val="accent1"/>
+          </a:effectRef>
+          <a:fontRef idx="minor">
+            <a:schemeClr val="lt1"/>
+          </a:fontRef>
+        </p:style>
+        <p:txBody>
+          <a:bodyPr rtlCol="0" anchor="ctr"/>
+          <a:lstStyle/>
+          <a:p>
+            <a:pPr algn="ctr"/>
+            <a:endParaRPr lang="en-CA"/>
+          </a:p>
+        </p:txBody>
+      </p:sp>
+      <p:cxnSp>
+        <p:nvCxnSpPr>
+          <p:cNvPr id="50" name="Straight Arrow Connector 49">
+            <a:extLst>
+              <a:ext uri="{FF2B5EF4-FFF2-40B4-BE49-F238E27FC236}">
+                <a16:creationId xmlns:a16="http://schemas.microsoft.com/office/drawing/2014/main" id="{6C8B0291-816F-E506-556E-561F86737079}"/>
+              </a:ext>
+            </a:extLst>
+          </p:cNvPr>
+          <p:cNvCxnSpPr>
+            <a:cxnSpLocks/>
+            <a:stCxn id="32" idx="3"/>
+            <a:endCxn id="35" idx="2"/>
+          </p:cNvCxnSpPr>
+          <p:nvPr/>
+        </p:nvCxnSpPr>
+        <p:spPr>
+          <a:xfrm flipV="1">
+            <a:off x="3201330" y="3434037"/>
+            <a:ext cx="346695" cy="2580"/>
+          </a:xfrm>
+          <a:prstGeom prst="straightConnector1">
+            <a:avLst/>
+          </a:prstGeom>
+          <a:ln>
+            <a:tailEnd type="triangle"/>
+          </a:ln>
+        </p:spPr>
+        <p:style>
+          <a:lnRef idx="2">
+            <a:schemeClr val="accent1"/>
+          </a:lnRef>
+          <a:fillRef idx="0">
+            <a:schemeClr val="accent1"/>
+          </a:fillRef>
+          <a:effectRef idx="1">
+            <a:schemeClr val="accent1"/>
+          </a:effectRef>
+          <a:fontRef idx="minor">
+            <a:schemeClr val="tx1"/>
+          </a:fontRef>
+        </p:style>
+      </p:cxnSp>
+      <p:sp>
+        <p:nvSpPr>
+          <p:cNvPr id="51" name="TextBox 50">
+            <a:extLst>
+              <a:ext uri="{FF2B5EF4-FFF2-40B4-BE49-F238E27FC236}">
+                <a16:creationId xmlns:a16="http://schemas.microsoft.com/office/drawing/2014/main" id="{9C864CD8-7017-44D7-6DA2-6018CD7F51B6}"/>
+              </a:ext>
+            </a:extLst>
+          </p:cNvPr>
+          <p:cNvSpPr txBox="1"/>
+          <p:nvPr/>
+        </p:nvSpPr>
+        <p:spPr>
+          <a:xfrm>
+            <a:off x="3930144" y="3619061"/>
+            <a:ext cx="1022227" cy="276999"/>
+          </a:xfrm>
+          <a:prstGeom prst="rect">
+            <a:avLst/>
+          </a:prstGeom>
+          <a:noFill/>
+        </p:spPr>
+        <p:txBody>
+          <a:bodyPr wrap="square" rtlCol="0">
+            <a:spAutoFit/>
+          </a:bodyPr>
+          <a:lstStyle/>
+          <a:p>
+            <a:pPr algn="ctr"/>
+            <a:r>
+              <a:rPr lang="en-CA" sz="1200" dirty="0"/>
+              <a:t>RAG</a:t>
+            </a:r>
+          </a:p>
+        </p:txBody>
+      </p:sp>
+      <p:sp>
+        <p:nvSpPr>
+          <p:cNvPr id="52" name="TextBox 51">
+            <a:extLst>
+              <a:ext uri="{FF2B5EF4-FFF2-40B4-BE49-F238E27FC236}">
+                <a16:creationId xmlns:a16="http://schemas.microsoft.com/office/drawing/2014/main" id="{58CB7EDF-1973-1863-AC47-8A0361FB19F6}"/>
+              </a:ext>
+            </a:extLst>
+          </p:cNvPr>
+          <p:cNvSpPr txBox="1"/>
+          <p:nvPr/>
+        </p:nvSpPr>
+        <p:spPr>
+          <a:xfrm>
+            <a:off x="4637415" y="3624098"/>
+            <a:ext cx="1022227" cy="276999"/>
+          </a:xfrm>
+          <a:prstGeom prst="rect">
+            <a:avLst/>
+          </a:prstGeom>
+          <a:noFill/>
+        </p:spPr>
+        <p:txBody>
+          <a:bodyPr wrap="square" rtlCol="0">
+            <a:spAutoFit/>
+          </a:bodyPr>
+          <a:lstStyle/>
+          <a:p>
+            <a:pPr algn="ctr"/>
+            <a:r>
+              <a:rPr lang="en-CA" sz="1200" dirty="0"/>
+              <a:t>Evaluator</a:t>
+            </a:r>
+          </a:p>
+        </p:txBody>
+      </p:sp>
+      <p:cxnSp>
+        <p:nvCxnSpPr>
+          <p:cNvPr id="54" name="Straight Arrow Connector 53">
+            <a:extLst>
+              <a:ext uri="{FF2B5EF4-FFF2-40B4-BE49-F238E27FC236}">
+                <a16:creationId xmlns:a16="http://schemas.microsoft.com/office/drawing/2014/main" id="{93D5DF48-025F-0514-2737-8816372E9EBF}"/>
+              </a:ext>
+            </a:extLst>
+          </p:cNvPr>
+          <p:cNvCxnSpPr>
+            <a:stCxn id="42" idx="6"/>
+            <a:endCxn id="43" idx="2"/>
+          </p:cNvCxnSpPr>
+          <p:nvPr/>
+        </p:nvCxnSpPr>
+        <p:spPr>
+          <a:xfrm>
+            <a:off x="4612295" y="3429000"/>
+            <a:ext cx="355080" cy="5037"/>
+          </a:xfrm>
+          <a:prstGeom prst="straightConnector1">
+            <a:avLst/>
+          </a:prstGeom>
+          <a:ln>
+            <a:tailEnd type="triangle"/>
+          </a:ln>
+        </p:spPr>
+        <p:style>
+          <a:lnRef idx="2">
+            <a:schemeClr val="accent1"/>
+          </a:lnRef>
+          <a:fillRef idx="0">
+            <a:schemeClr val="accent1"/>
+          </a:fillRef>
+          <a:effectRef idx="1">
+            <a:schemeClr val="accent1"/>
+          </a:effectRef>
+          <a:fontRef idx="minor">
+            <a:schemeClr val="tx1"/>
+          </a:fontRef>
+        </p:style>
+      </p:cxnSp>
+      <p:sp>
+        <p:nvSpPr>
+          <p:cNvPr id="57" name="Diamond 56">
+            <a:extLst>
+              <a:ext uri="{FF2B5EF4-FFF2-40B4-BE49-F238E27FC236}">
+                <a16:creationId xmlns:a16="http://schemas.microsoft.com/office/drawing/2014/main" id="{0C4ADE68-66C5-2F3F-EC4D-D855CC2B4BB2}"/>
+              </a:ext>
+            </a:extLst>
+          </p:cNvPr>
+          <p:cNvSpPr/>
+          <p:nvPr/>
+        </p:nvSpPr>
+        <p:spPr>
+          <a:xfrm>
+            <a:off x="5783749" y="3309658"/>
+            <a:ext cx="267419" cy="253917"/>
+          </a:xfrm>
+          <a:prstGeom prst="diamond">
+            <a:avLst/>
+          </a:prstGeom>
+        </p:spPr>
+        <p:style>
+          <a:lnRef idx="1">
+            <a:schemeClr val="accent5"/>
+          </a:lnRef>
+          <a:fillRef idx="2">
+            <a:schemeClr val="accent5"/>
+          </a:fillRef>
+          <a:effectRef idx="1">
+            <a:schemeClr val="accent5"/>
+          </a:effectRef>
+          <a:fontRef idx="minor">
+            <a:schemeClr val="dk1"/>
+          </a:fontRef>
+        </p:style>
+        <p:txBody>
+          <a:bodyPr rtlCol="0" anchor="ctr"/>
+          <a:lstStyle/>
+          <a:p>
+            <a:pPr algn="ctr"/>
+            <a:endParaRPr lang="en-CA"/>
+          </a:p>
+        </p:txBody>
+      </p:sp>
+      <p:cxnSp>
+        <p:nvCxnSpPr>
+          <p:cNvPr id="61" name="Straight Arrow Connector 60">
+            <a:extLst>
+              <a:ext uri="{FF2B5EF4-FFF2-40B4-BE49-F238E27FC236}">
+                <a16:creationId xmlns:a16="http://schemas.microsoft.com/office/drawing/2014/main" id="{26AB39C8-EEAF-7156-34A1-B67846B0EDBA}"/>
+              </a:ext>
+            </a:extLst>
+          </p:cNvPr>
+          <p:cNvCxnSpPr>
+            <a:stCxn id="43" idx="6"/>
+            <a:endCxn id="57" idx="1"/>
+          </p:cNvCxnSpPr>
+          <p:nvPr/>
+        </p:nvCxnSpPr>
+        <p:spPr>
+          <a:xfrm>
+            <a:off x="5329684" y="3434037"/>
+            <a:ext cx="454065" cy="2580"/>
+          </a:xfrm>
+          <a:prstGeom prst="straightConnector1">
+            <a:avLst/>
+          </a:prstGeom>
+          <a:ln>
+            <a:tailEnd type="triangle"/>
+          </a:ln>
+        </p:spPr>
+        <p:style>
+          <a:lnRef idx="2">
+            <a:schemeClr val="accent1"/>
+          </a:lnRef>
+          <a:fillRef idx="0">
+            <a:schemeClr val="accent1"/>
+          </a:fillRef>
+          <a:effectRef idx="1">
+            <a:schemeClr val="accent1"/>
+          </a:effectRef>
+          <a:fontRef idx="minor">
+            <a:schemeClr val="tx1"/>
+          </a:fontRef>
+        </p:style>
+      </p:cxnSp>
+      <p:cxnSp>
+        <p:nvCxnSpPr>
+          <p:cNvPr id="65" name="Connector: Elbow 64">
+            <a:extLst>
+              <a:ext uri="{FF2B5EF4-FFF2-40B4-BE49-F238E27FC236}">
+                <a16:creationId xmlns:a16="http://schemas.microsoft.com/office/drawing/2014/main" id="{FE7144D1-F3BD-1D62-8030-79228BD4A1F6}"/>
+              </a:ext>
+            </a:extLst>
+          </p:cNvPr>
+          <p:cNvCxnSpPr>
+            <a:stCxn id="57" idx="0"/>
+            <a:endCxn id="44" idx="2"/>
+          </p:cNvCxnSpPr>
+          <p:nvPr/>
+        </p:nvCxnSpPr>
+        <p:spPr>
+          <a:xfrm rot="5400000" flipH="1" flipV="1">
+            <a:off x="6083619" y="2888044"/>
+            <a:ext cx="255455" cy="587774"/>
+          </a:xfrm>
+          <a:prstGeom prst="bentConnector2">
+            <a:avLst/>
+          </a:prstGeom>
+          <a:ln>
+            <a:tailEnd type="triangle"/>
+          </a:ln>
+        </p:spPr>
+        <p:style>
+          <a:lnRef idx="2">
+            <a:schemeClr val="accent1"/>
+          </a:lnRef>
+          <a:fillRef idx="0">
+            <a:schemeClr val="accent1"/>
+          </a:fillRef>
+          <a:effectRef idx="1">
+            <a:schemeClr val="accent1"/>
+          </a:effectRef>
+          <a:fontRef idx="minor">
+            <a:schemeClr val="tx1"/>
+          </a:fontRef>
+        </p:style>
+      </p:cxnSp>
+      <p:sp>
+        <p:nvSpPr>
+          <p:cNvPr id="68" name="TextBox 67">
+            <a:extLst>
+              <a:ext uri="{FF2B5EF4-FFF2-40B4-BE49-F238E27FC236}">
+                <a16:creationId xmlns:a16="http://schemas.microsoft.com/office/drawing/2014/main" id="{32151224-5FFA-131B-4E55-2EF58798F8E3}"/>
+              </a:ext>
+            </a:extLst>
+          </p:cNvPr>
+          <p:cNvSpPr txBox="1"/>
+          <p:nvPr/>
+        </p:nvSpPr>
+        <p:spPr>
+          <a:xfrm>
+            <a:off x="6175274" y="3177597"/>
+            <a:ext cx="1022227" cy="276999"/>
+          </a:xfrm>
+          <a:prstGeom prst="rect">
+            <a:avLst/>
+          </a:prstGeom>
+          <a:noFill/>
+        </p:spPr>
+        <p:txBody>
+          <a:bodyPr wrap="square" rtlCol="0">
+            <a:spAutoFit/>
+          </a:bodyPr>
+          <a:lstStyle/>
+          <a:p>
+            <a:pPr algn="ctr"/>
+            <a:r>
+              <a:rPr lang="en-CA" sz="1200" dirty="0"/>
+              <a:t>Web search</a:t>
+            </a:r>
+          </a:p>
+        </p:txBody>
+      </p:sp>
+      <p:sp>
+        <p:nvSpPr>
+          <p:cNvPr id="87" name="Oval 86">
+            <a:extLst>
+              <a:ext uri="{FF2B5EF4-FFF2-40B4-BE49-F238E27FC236}">
+                <a16:creationId xmlns:a16="http://schemas.microsoft.com/office/drawing/2014/main" id="{A9292609-78E6-6DE3-5AD7-06C2C70B1F24}"/>
+              </a:ext>
+            </a:extLst>
+          </p:cNvPr>
+          <p:cNvSpPr/>
+          <p:nvPr/>
+        </p:nvSpPr>
+        <p:spPr>
+          <a:xfrm>
+            <a:off x="7886969" y="3185021"/>
+            <a:ext cx="362309" cy="370936"/>
+          </a:xfrm>
+          <a:prstGeom prst="ellipse">
+            <a:avLst/>
+          </a:prstGeom>
+        </p:spPr>
+        <p:style>
+          <a:lnRef idx="2">
+            <a:schemeClr val="accent1">
+              <a:shade val="15000"/>
+            </a:schemeClr>
+          </a:lnRef>
+          <a:fillRef idx="1">
+            <a:schemeClr val="accent1"/>
+          </a:fillRef>
+          <a:effectRef idx="0">
+            <a:schemeClr val="accent1"/>
+          </a:effectRef>
+          <a:fontRef idx="minor">
+            <a:schemeClr val="lt1"/>
+          </a:fontRef>
+        </p:style>
+        <p:txBody>
+          <a:bodyPr rtlCol="0" anchor="ctr"/>
+          <a:lstStyle/>
+          <a:p>
+            <a:pPr algn="ctr"/>
+            <a:endParaRPr lang="en-CA"/>
+          </a:p>
+        </p:txBody>
+      </p:sp>
+      <p:sp>
+        <p:nvSpPr>
+          <p:cNvPr id="88" name="TextBox 87">
+            <a:extLst>
+              <a:ext uri="{FF2B5EF4-FFF2-40B4-BE49-F238E27FC236}">
+                <a16:creationId xmlns:a16="http://schemas.microsoft.com/office/drawing/2014/main" id="{19E26E08-F8E7-57D6-000E-91C0D78634F9}"/>
+              </a:ext>
+            </a:extLst>
+          </p:cNvPr>
+          <p:cNvSpPr txBox="1"/>
+          <p:nvPr/>
+        </p:nvSpPr>
+        <p:spPr>
+          <a:xfrm>
+            <a:off x="7557009" y="3538704"/>
+            <a:ext cx="1022227" cy="461665"/>
+          </a:xfrm>
+          <a:prstGeom prst="rect">
+            <a:avLst/>
+          </a:prstGeom>
+          <a:noFill/>
+        </p:spPr>
+        <p:txBody>
+          <a:bodyPr wrap="square" rtlCol="0">
+            <a:spAutoFit/>
+          </a:bodyPr>
+          <a:lstStyle/>
+          <a:p>
+            <a:pPr algn="ctr"/>
+            <a:r>
+              <a:rPr lang="en-CA" sz="1200" dirty="0"/>
+              <a:t>Hierarchical design</a:t>
+            </a:r>
+          </a:p>
+        </p:txBody>
+      </p:sp>
+      <p:cxnSp>
+        <p:nvCxnSpPr>
+          <p:cNvPr id="90" name="Connector: Elbow 89">
+            <a:extLst>
+              <a:ext uri="{FF2B5EF4-FFF2-40B4-BE49-F238E27FC236}">
+                <a16:creationId xmlns:a16="http://schemas.microsoft.com/office/drawing/2014/main" id="{CE6BDC38-70B5-6648-51D6-D4CAE7E09202}"/>
+              </a:ext>
+            </a:extLst>
+          </p:cNvPr>
+          <p:cNvCxnSpPr>
+            <a:stCxn id="57" idx="2"/>
+            <a:endCxn id="87" idx="2"/>
+          </p:cNvCxnSpPr>
+          <p:nvPr/>
+        </p:nvCxnSpPr>
+        <p:spPr>
+          <a:xfrm rot="5400000" flipH="1" flipV="1">
+            <a:off x="6805671" y="2482277"/>
+            <a:ext cx="193086" cy="1969510"/>
+          </a:xfrm>
+          <a:prstGeom prst="bentConnector4">
+            <a:avLst>
+              <a:gd name="adj1" fmla="val -130726"/>
+              <a:gd name="adj2" fmla="val 65819"/>
+            </a:avLst>
+          </a:prstGeom>
+          <a:ln>
+            <a:tailEnd type="triangle"/>
+          </a:ln>
+        </p:spPr>
+        <p:style>
+          <a:lnRef idx="2">
+            <a:schemeClr val="accent1"/>
+          </a:lnRef>
+          <a:fillRef idx="0">
+            <a:schemeClr val="accent1"/>
+          </a:fillRef>
+          <a:effectRef idx="1">
+            <a:schemeClr val="accent1"/>
+          </a:effectRef>
+          <a:fontRef idx="minor">
+            <a:schemeClr val="tx1"/>
+          </a:fontRef>
+        </p:style>
+      </p:cxnSp>
+      <p:cxnSp>
+        <p:nvCxnSpPr>
+          <p:cNvPr id="93" name="Connector: Elbow 92">
+            <a:extLst>
+              <a:ext uri="{FF2B5EF4-FFF2-40B4-BE49-F238E27FC236}">
+                <a16:creationId xmlns:a16="http://schemas.microsoft.com/office/drawing/2014/main" id="{9089C421-0CFD-2AC1-4F6D-95D71F7CC4B5}"/>
+              </a:ext>
+            </a:extLst>
+          </p:cNvPr>
+          <p:cNvCxnSpPr>
+            <a:stCxn id="44" idx="6"/>
+            <a:endCxn id="87" idx="2"/>
+          </p:cNvCxnSpPr>
+          <p:nvPr/>
+        </p:nvCxnSpPr>
+        <p:spPr>
+          <a:xfrm>
+            <a:off x="6867542" y="3054203"/>
+            <a:ext cx="1019427" cy="316286"/>
+          </a:xfrm>
+          <a:prstGeom prst="bentConnector3">
+            <a:avLst>
+              <a:gd name="adj1" fmla="val 33556"/>
+            </a:avLst>
+          </a:prstGeom>
+          <a:ln>
+            <a:tailEnd type="triangle"/>
+          </a:ln>
+        </p:spPr>
+        <p:style>
+          <a:lnRef idx="2">
+            <a:schemeClr val="accent1"/>
+          </a:lnRef>
+          <a:fillRef idx="0">
+            <a:schemeClr val="accent1"/>
+          </a:fillRef>
+          <a:effectRef idx="1">
+            <a:schemeClr val="accent1"/>
+          </a:effectRef>
+          <a:fontRef idx="minor">
+            <a:schemeClr val="tx1"/>
+          </a:fontRef>
+        </p:style>
+      </p:cxnSp>
+      <p:cxnSp>
+        <p:nvCxnSpPr>
+          <p:cNvPr id="100" name="Connector: Elbow 99">
+            <a:extLst>
+              <a:ext uri="{FF2B5EF4-FFF2-40B4-BE49-F238E27FC236}">
+                <a16:creationId xmlns:a16="http://schemas.microsoft.com/office/drawing/2014/main" id="{3C949086-40CE-D4B3-34D8-DA0B0F938CCB}"/>
+              </a:ext>
+            </a:extLst>
+          </p:cNvPr>
+          <p:cNvCxnSpPr>
+            <a:cxnSpLocks/>
+            <a:stCxn id="32" idx="2"/>
+            <a:endCxn id="87" idx="2"/>
+          </p:cNvCxnSpPr>
+          <p:nvPr/>
+        </p:nvCxnSpPr>
+        <p:spPr>
+          <a:xfrm rot="5400000" flipH="1" flipV="1">
+            <a:off x="5380752" y="1057358"/>
+            <a:ext cx="193086" cy="4819348"/>
+          </a:xfrm>
+          <a:prstGeom prst="bentConnector4">
+            <a:avLst>
+              <a:gd name="adj1" fmla="val -989585"/>
+              <a:gd name="adj2" fmla="val 93988"/>
+            </a:avLst>
+          </a:prstGeom>
+          <a:ln>
+            <a:tailEnd type="triangle"/>
+          </a:ln>
+        </p:spPr>
+        <p:style>
+          <a:lnRef idx="2">
+            <a:schemeClr val="accent1"/>
+          </a:lnRef>
+          <a:fillRef idx="0">
+            <a:schemeClr val="accent1"/>
+          </a:fillRef>
+          <a:effectRef idx="1">
+            <a:schemeClr val="accent1"/>
+          </a:effectRef>
+          <a:fontRef idx="minor">
+            <a:schemeClr val="tx1"/>
+          </a:fontRef>
+        </p:style>
+      </p:cxnSp>
+      <p:sp>
+        <p:nvSpPr>
+          <p:cNvPr id="103" name="Oval 102">
+            <a:extLst>
+              <a:ext uri="{FF2B5EF4-FFF2-40B4-BE49-F238E27FC236}">
+                <a16:creationId xmlns:a16="http://schemas.microsoft.com/office/drawing/2014/main" id="{61E0AD75-9A38-F780-6CFF-1AFD1387F4FB}"/>
+              </a:ext>
+            </a:extLst>
+          </p:cNvPr>
+          <p:cNvSpPr/>
+          <p:nvPr/>
+        </p:nvSpPr>
+        <p:spPr>
+          <a:xfrm>
+            <a:off x="8909194" y="3185021"/>
+            <a:ext cx="362309" cy="370936"/>
+          </a:xfrm>
+          <a:prstGeom prst="ellipse">
+            <a:avLst/>
+          </a:prstGeom>
+        </p:spPr>
+        <p:style>
+          <a:lnRef idx="2">
+            <a:schemeClr val="accent1">
+              <a:shade val="15000"/>
+            </a:schemeClr>
+          </a:lnRef>
+          <a:fillRef idx="1">
+            <a:schemeClr val="accent1"/>
+          </a:fillRef>
+          <a:effectRef idx="0">
+            <a:schemeClr val="accent1"/>
+          </a:effectRef>
+          <a:fontRef idx="minor">
+            <a:schemeClr val="lt1"/>
+          </a:fontRef>
+        </p:style>
+        <p:txBody>
+          <a:bodyPr rtlCol="0" anchor="ctr"/>
+          <a:lstStyle/>
+          <a:p>
+            <a:pPr algn="ctr"/>
+            <a:endParaRPr lang="en-CA"/>
+          </a:p>
+        </p:txBody>
+      </p:sp>
+      <p:sp>
+        <p:nvSpPr>
+          <p:cNvPr id="104" name="TextBox 103">
+            <a:extLst>
+              <a:ext uri="{FF2B5EF4-FFF2-40B4-BE49-F238E27FC236}">
+                <a16:creationId xmlns:a16="http://schemas.microsoft.com/office/drawing/2014/main" id="{59D42B88-0651-3E2D-20F9-2DA9A5A9BD28}"/>
+              </a:ext>
+            </a:extLst>
+          </p:cNvPr>
+          <p:cNvSpPr txBox="1"/>
+          <p:nvPr/>
+        </p:nvSpPr>
+        <p:spPr>
+          <a:xfrm>
+            <a:off x="8618506" y="3534108"/>
+            <a:ext cx="1022227" cy="461665"/>
+          </a:xfrm>
+          <a:prstGeom prst="rect">
+            <a:avLst/>
+          </a:prstGeom>
+          <a:noFill/>
+        </p:spPr>
+        <p:txBody>
+          <a:bodyPr wrap="square" rtlCol="0">
+            <a:spAutoFit/>
+          </a:bodyPr>
+          <a:lstStyle/>
+          <a:p>
+            <a:pPr algn="ctr"/>
+            <a:r>
+              <a:rPr lang="en-CA" sz="1200" dirty="0"/>
+              <a:t>Design evaluation</a:t>
+            </a:r>
+          </a:p>
+        </p:txBody>
+      </p:sp>
+      <p:cxnSp>
+        <p:nvCxnSpPr>
+          <p:cNvPr id="106" name="Straight Arrow Connector 105">
+            <a:extLst>
+              <a:ext uri="{FF2B5EF4-FFF2-40B4-BE49-F238E27FC236}">
+                <a16:creationId xmlns:a16="http://schemas.microsoft.com/office/drawing/2014/main" id="{C676D56E-184A-25C2-508C-2976E45F4EA6}"/>
+              </a:ext>
+            </a:extLst>
+          </p:cNvPr>
+          <p:cNvCxnSpPr>
+            <a:stCxn id="87" idx="6"/>
+            <a:endCxn id="103" idx="2"/>
+          </p:cNvCxnSpPr>
+          <p:nvPr/>
+        </p:nvCxnSpPr>
+        <p:spPr>
+          <a:xfrm>
+            <a:off x="8249278" y="3370489"/>
+            <a:ext cx="659916" cy="0"/>
+          </a:xfrm>
+          <a:prstGeom prst="straightConnector1">
+            <a:avLst/>
+          </a:prstGeom>
+          <a:ln>
+            <a:tailEnd type="triangle"/>
+          </a:ln>
+        </p:spPr>
+        <p:style>
+          <a:lnRef idx="2">
+            <a:schemeClr val="accent1"/>
+          </a:lnRef>
+          <a:fillRef idx="0">
+            <a:schemeClr val="accent1"/>
+          </a:fillRef>
+          <a:effectRef idx="1">
+            <a:schemeClr val="accent1"/>
+          </a:effectRef>
+          <a:fontRef idx="minor">
+            <a:schemeClr val="tx1"/>
+          </a:fontRef>
+        </p:style>
+      </p:cxnSp>
+      <p:sp>
+        <p:nvSpPr>
+          <p:cNvPr id="119" name="Diamond 118">
+            <a:extLst>
+              <a:ext uri="{FF2B5EF4-FFF2-40B4-BE49-F238E27FC236}">
+                <a16:creationId xmlns:a16="http://schemas.microsoft.com/office/drawing/2014/main" id="{05BECCD7-860C-3801-B059-7F35718156C2}"/>
+              </a:ext>
+            </a:extLst>
+          </p:cNvPr>
+          <p:cNvSpPr/>
+          <p:nvPr/>
+        </p:nvSpPr>
+        <p:spPr>
+          <a:xfrm>
+            <a:off x="9665708" y="3243529"/>
+            <a:ext cx="267419" cy="253917"/>
+          </a:xfrm>
+          <a:prstGeom prst="diamond">
+            <a:avLst/>
+          </a:prstGeom>
+        </p:spPr>
+        <p:style>
+          <a:lnRef idx="1">
+            <a:schemeClr val="accent5"/>
+          </a:lnRef>
+          <a:fillRef idx="2">
+            <a:schemeClr val="accent5"/>
+          </a:fillRef>
+          <a:effectRef idx="1">
+            <a:schemeClr val="accent5"/>
+          </a:effectRef>
+          <a:fontRef idx="minor">
+            <a:schemeClr val="dk1"/>
+          </a:fontRef>
+        </p:style>
+        <p:txBody>
+          <a:bodyPr rtlCol="0" anchor="ctr"/>
+          <a:lstStyle/>
+          <a:p>
+            <a:pPr algn="ctr"/>
+            <a:endParaRPr lang="en-CA"/>
+          </a:p>
+        </p:txBody>
+      </p:sp>
+      <p:sp>
+        <p:nvSpPr>
+          <p:cNvPr id="120" name="Oval 119">
+            <a:extLst>
+              <a:ext uri="{FF2B5EF4-FFF2-40B4-BE49-F238E27FC236}">
+                <a16:creationId xmlns:a16="http://schemas.microsoft.com/office/drawing/2014/main" id="{6A5D3AB7-5530-A697-77A8-ECF4BCC19BED}"/>
+              </a:ext>
+            </a:extLst>
+          </p:cNvPr>
+          <p:cNvSpPr/>
+          <p:nvPr/>
+        </p:nvSpPr>
+        <p:spPr>
+          <a:xfrm>
+            <a:off x="9618262" y="3911948"/>
+            <a:ext cx="362309" cy="370936"/>
+          </a:xfrm>
+          <a:prstGeom prst="ellipse">
+            <a:avLst/>
+          </a:prstGeom>
+        </p:spPr>
+        <p:style>
+          <a:lnRef idx="2">
+            <a:schemeClr val="accent1">
+              <a:shade val="15000"/>
+            </a:schemeClr>
+          </a:lnRef>
+          <a:fillRef idx="1">
+            <a:schemeClr val="accent1"/>
+          </a:fillRef>
+          <a:effectRef idx="0">
+            <a:schemeClr val="accent1"/>
+          </a:effectRef>
+          <a:fontRef idx="minor">
+            <a:schemeClr val="lt1"/>
+          </a:fontRef>
+        </p:style>
+        <p:txBody>
+          <a:bodyPr rtlCol="0" anchor="ctr"/>
+          <a:lstStyle/>
+          <a:p>
+            <a:pPr algn="ctr"/>
+            <a:endParaRPr lang="en-CA"/>
+          </a:p>
+        </p:txBody>
+      </p:sp>
+      <p:sp>
+        <p:nvSpPr>
+          <p:cNvPr id="121" name="TextBox 120">
+            <a:extLst>
+              <a:ext uri="{FF2B5EF4-FFF2-40B4-BE49-F238E27FC236}">
+                <a16:creationId xmlns:a16="http://schemas.microsoft.com/office/drawing/2014/main" id="{CA37ED72-5D42-21E7-BD7A-ED81B08B714B}"/>
+              </a:ext>
+            </a:extLst>
+          </p:cNvPr>
+          <p:cNvSpPr txBox="1"/>
+          <p:nvPr/>
+        </p:nvSpPr>
+        <p:spPr>
+          <a:xfrm>
+            <a:off x="9306089" y="4269411"/>
+            <a:ext cx="1022227" cy="276999"/>
+          </a:xfrm>
+          <a:prstGeom prst="rect">
+            <a:avLst/>
+          </a:prstGeom>
+          <a:noFill/>
+        </p:spPr>
+        <p:txBody>
+          <a:bodyPr wrap="square" rtlCol="0">
+            <a:spAutoFit/>
+          </a:bodyPr>
+          <a:lstStyle/>
+          <a:p>
+            <a:pPr algn="ctr"/>
+            <a:r>
+              <a:rPr lang="en-CA" sz="1200" dirty="0"/>
+              <a:t>Redesign</a:t>
+            </a:r>
+          </a:p>
+        </p:txBody>
+      </p:sp>
+      <p:cxnSp>
+        <p:nvCxnSpPr>
+          <p:cNvPr id="123" name="Straight Arrow Connector 122">
+            <a:extLst>
+              <a:ext uri="{FF2B5EF4-FFF2-40B4-BE49-F238E27FC236}">
+                <a16:creationId xmlns:a16="http://schemas.microsoft.com/office/drawing/2014/main" id="{4ED590A0-2B1B-9896-A15B-4C65A7485868}"/>
+              </a:ext>
+            </a:extLst>
+          </p:cNvPr>
+          <p:cNvCxnSpPr>
+            <a:stCxn id="119" idx="2"/>
+            <a:endCxn id="120" idx="0"/>
+          </p:cNvCxnSpPr>
+          <p:nvPr/>
+        </p:nvCxnSpPr>
+        <p:spPr>
+          <a:xfrm flipH="1">
+            <a:off x="9799417" y="3497446"/>
+            <a:ext cx="1" cy="414502"/>
+          </a:xfrm>
+          <a:prstGeom prst="straightConnector1">
+            <a:avLst/>
+          </a:prstGeom>
+          <a:ln>
+            <a:tailEnd type="triangle"/>
+          </a:ln>
+        </p:spPr>
+        <p:style>
+          <a:lnRef idx="2">
+            <a:schemeClr val="accent1"/>
+          </a:lnRef>
+          <a:fillRef idx="0">
+            <a:schemeClr val="accent1"/>
+          </a:fillRef>
+          <a:effectRef idx="1">
+            <a:schemeClr val="accent1"/>
+          </a:effectRef>
+          <a:fontRef idx="minor">
+            <a:schemeClr val="tx1"/>
+          </a:fontRef>
+        </p:style>
+      </p:cxnSp>
+      <p:cxnSp>
+        <p:nvCxnSpPr>
+          <p:cNvPr id="126" name="Straight Arrow Connector 125">
+            <a:extLst>
+              <a:ext uri="{FF2B5EF4-FFF2-40B4-BE49-F238E27FC236}">
+                <a16:creationId xmlns:a16="http://schemas.microsoft.com/office/drawing/2014/main" id="{86210747-5D61-1425-64EC-0CEFF3DC29D3}"/>
+              </a:ext>
+            </a:extLst>
+          </p:cNvPr>
+          <p:cNvCxnSpPr>
+            <a:stCxn id="103" idx="6"/>
+            <a:endCxn id="119" idx="1"/>
+          </p:cNvCxnSpPr>
+          <p:nvPr/>
+        </p:nvCxnSpPr>
+        <p:spPr>
+          <a:xfrm flipV="1">
+            <a:off x="9271503" y="3370488"/>
+            <a:ext cx="394205" cy="1"/>
+          </a:xfrm>
+          <a:prstGeom prst="straightConnector1">
+            <a:avLst/>
+          </a:prstGeom>
+          <a:ln>
+            <a:tailEnd type="triangle"/>
+          </a:ln>
+        </p:spPr>
+        <p:style>
+          <a:lnRef idx="2">
+            <a:schemeClr val="accent1"/>
+          </a:lnRef>
+          <a:fillRef idx="0">
+            <a:schemeClr val="accent1"/>
+          </a:fillRef>
+          <a:effectRef idx="1">
+            <a:schemeClr val="accent1"/>
+          </a:effectRef>
+          <a:fontRef idx="minor">
+            <a:schemeClr val="tx1"/>
+          </a:fontRef>
+        </p:style>
+      </p:cxnSp>
+      <p:sp>
+        <p:nvSpPr>
+          <p:cNvPr id="137" name="Oval 136">
+            <a:extLst>
+              <a:ext uri="{FF2B5EF4-FFF2-40B4-BE49-F238E27FC236}">
+                <a16:creationId xmlns:a16="http://schemas.microsoft.com/office/drawing/2014/main" id="{289ADFF2-5B68-B456-0DFE-8460E3064E8E}"/>
+              </a:ext>
+            </a:extLst>
+          </p:cNvPr>
+          <p:cNvSpPr/>
+          <p:nvPr/>
+        </p:nvSpPr>
+        <p:spPr>
+          <a:xfrm>
+            <a:off x="10461041" y="3193504"/>
+            <a:ext cx="362309" cy="370936"/>
+          </a:xfrm>
+          <a:prstGeom prst="ellipse">
+            <a:avLst/>
+          </a:prstGeom>
+        </p:spPr>
+        <p:style>
+          <a:lnRef idx="2">
+            <a:schemeClr val="accent1">
+              <a:shade val="15000"/>
+            </a:schemeClr>
+          </a:lnRef>
+          <a:fillRef idx="1">
+            <a:schemeClr val="accent1"/>
+          </a:fillRef>
+          <a:effectRef idx="0">
+            <a:schemeClr val="accent1"/>
+          </a:effectRef>
+          <a:fontRef idx="minor">
+            <a:schemeClr val="lt1"/>
+          </a:fontRef>
+        </p:style>
+        <p:txBody>
+          <a:bodyPr rtlCol="0" anchor="ctr"/>
+          <a:lstStyle/>
+          <a:p>
+            <a:pPr algn="ctr"/>
+            <a:endParaRPr lang="en-CA"/>
+          </a:p>
+        </p:txBody>
+      </p:sp>
+      <p:sp>
+        <p:nvSpPr>
+          <p:cNvPr id="138" name="TextBox 137">
+            <a:extLst>
+              <a:ext uri="{FF2B5EF4-FFF2-40B4-BE49-F238E27FC236}">
+                <a16:creationId xmlns:a16="http://schemas.microsoft.com/office/drawing/2014/main" id="{00123505-35F6-9F46-29A7-E2ED11C36283}"/>
+              </a:ext>
+            </a:extLst>
+          </p:cNvPr>
+          <p:cNvSpPr txBox="1"/>
+          <p:nvPr/>
+        </p:nvSpPr>
+        <p:spPr>
+          <a:xfrm>
+            <a:off x="10139255" y="3547648"/>
+            <a:ext cx="1022227" cy="646331"/>
+          </a:xfrm>
+          <a:prstGeom prst="rect">
+            <a:avLst/>
+          </a:prstGeom>
+          <a:noFill/>
+        </p:spPr>
+        <p:txBody>
+          <a:bodyPr wrap="square" rtlCol="0">
+            <a:spAutoFit/>
+          </a:bodyPr>
+          <a:lstStyle/>
+          <a:p>
+            <a:pPr algn="ctr"/>
+            <a:r>
+              <a:rPr lang="en-CA" sz="1200" dirty="0"/>
+              <a:t>Single Module design</a:t>
+            </a:r>
+          </a:p>
+        </p:txBody>
+      </p:sp>
+      <p:sp>
+        <p:nvSpPr>
+          <p:cNvPr id="139" name="Oval 138">
+            <a:extLst>
+              <a:ext uri="{FF2B5EF4-FFF2-40B4-BE49-F238E27FC236}">
+                <a16:creationId xmlns:a16="http://schemas.microsoft.com/office/drawing/2014/main" id="{DDBC1417-88DF-8275-70B8-4C9A1DBCBCAE}"/>
+              </a:ext>
+            </a:extLst>
+          </p:cNvPr>
+          <p:cNvSpPr/>
+          <p:nvPr/>
+        </p:nvSpPr>
+        <p:spPr>
+          <a:xfrm>
+            <a:off x="11011430" y="4774891"/>
+            <a:ext cx="362309" cy="370936"/>
+          </a:xfrm>
+          <a:prstGeom prst="ellipse">
+            <a:avLst/>
+          </a:prstGeom>
+        </p:spPr>
+        <p:style>
+          <a:lnRef idx="2">
+            <a:schemeClr val="accent1">
+              <a:shade val="15000"/>
+            </a:schemeClr>
+          </a:lnRef>
+          <a:fillRef idx="1">
+            <a:schemeClr val="accent1"/>
+          </a:fillRef>
+          <a:effectRef idx="0">
+            <a:schemeClr val="accent1"/>
+          </a:effectRef>
+          <a:fontRef idx="minor">
+            <a:schemeClr val="lt1"/>
+          </a:fontRef>
+        </p:style>
+        <p:txBody>
+          <a:bodyPr rtlCol="0" anchor="ctr"/>
+          <a:lstStyle/>
+          <a:p>
+            <a:pPr algn="ctr"/>
+            <a:endParaRPr lang="en-CA"/>
+          </a:p>
+        </p:txBody>
+      </p:sp>
+      <p:sp>
+        <p:nvSpPr>
+          <p:cNvPr id="140" name="TextBox 139">
+            <a:extLst>
+              <a:ext uri="{FF2B5EF4-FFF2-40B4-BE49-F238E27FC236}">
+                <a16:creationId xmlns:a16="http://schemas.microsoft.com/office/drawing/2014/main" id="{9EB03D17-6861-59E9-F1A1-8EE810EABF85}"/>
+              </a:ext>
+            </a:extLst>
+          </p:cNvPr>
+          <p:cNvSpPr txBox="1"/>
+          <p:nvPr/>
+        </p:nvSpPr>
+        <p:spPr>
+          <a:xfrm>
+            <a:off x="10188922" y="4715783"/>
+            <a:ext cx="1022227" cy="646331"/>
+          </a:xfrm>
+          <a:prstGeom prst="rect">
+            <a:avLst/>
+          </a:prstGeom>
+          <a:noFill/>
+        </p:spPr>
+        <p:txBody>
+          <a:bodyPr wrap="square" rtlCol="0">
+            <a:spAutoFit/>
+          </a:bodyPr>
+          <a:lstStyle/>
+          <a:p>
+            <a:pPr algn="ctr"/>
+            <a:r>
+              <a:rPr lang="en-CA" sz="1200" dirty="0"/>
+              <a:t>Single </a:t>
+            </a:r>
+          </a:p>
+          <a:p>
+            <a:pPr algn="ctr"/>
+            <a:r>
+              <a:rPr lang="en-CA" sz="1200" dirty="0"/>
+              <a:t>module evaluation</a:t>
+            </a:r>
+          </a:p>
+        </p:txBody>
+      </p:sp>
+      <p:sp>
+        <p:nvSpPr>
+          <p:cNvPr id="141" name="Oval 140">
+            <a:extLst>
+              <a:ext uri="{FF2B5EF4-FFF2-40B4-BE49-F238E27FC236}">
+                <a16:creationId xmlns:a16="http://schemas.microsoft.com/office/drawing/2014/main" id="{1786C034-5956-D40F-FAED-065932303AB9}"/>
+              </a:ext>
+            </a:extLst>
+          </p:cNvPr>
+          <p:cNvSpPr/>
+          <p:nvPr/>
+        </p:nvSpPr>
+        <p:spPr>
+          <a:xfrm>
+            <a:off x="11017783" y="5898677"/>
+            <a:ext cx="362309" cy="370936"/>
+          </a:xfrm>
+          <a:prstGeom prst="ellipse">
+            <a:avLst/>
+          </a:prstGeom>
+          <a:solidFill>
+            <a:srgbClr val="FFFF00"/>
+          </a:solidFill>
+          <a:ln>
+            <a:solidFill>
+              <a:srgbClr val="FFC000"/>
+            </a:solidFill>
+          </a:ln>
+        </p:spPr>
+        <p:style>
+          <a:lnRef idx="2">
+            <a:schemeClr val="accent2">
+              <a:shade val="15000"/>
+            </a:schemeClr>
+          </a:lnRef>
+          <a:fillRef idx="1">
+            <a:schemeClr val="accent2"/>
+          </a:fillRef>
+          <a:effectRef idx="0">
+            <a:schemeClr val="accent2"/>
+          </a:effectRef>
+          <a:fontRef idx="minor">
+            <a:schemeClr val="lt1"/>
+          </a:fontRef>
+        </p:style>
+        <p:txBody>
+          <a:bodyPr rtlCol="0" anchor="ctr"/>
+          <a:lstStyle/>
+          <a:p>
+            <a:pPr algn="ctr"/>
+            <a:endParaRPr lang="en-CA" dirty="0"/>
+          </a:p>
+        </p:txBody>
+      </p:sp>
+      <p:sp>
+        <p:nvSpPr>
+          <p:cNvPr id="142" name="TextBox 141">
+            <a:extLst>
+              <a:ext uri="{FF2B5EF4-FFF2-40B4-BE49-F238E27FC236}">
+                <a16:creationId xmlns:a16="http://schemas.microsoft.com/office/drawing/2014/main" id="{095A5798-74DA-A90D-F202-9B1089374FA3}"/>
+              </a:ext>
+            </a:extLst>
+          </p:cNvPr>
+          <p:cNvSpPr txBox="1"/>
+          <p:nvPr/>
+        </p:nvSpPr>
+        <p:spPr>
+          <a:xfrm>
+            <a:off x="10721725" y="6264685"/>
+            <a:ext cx="941717" cy="276999"/>
+          </a:xfrm>
+          <a:prstGeom prst="rect">
+            <a:avLst/>
+          </a:prstGeom>
+          <a:noFill/>
+        </p:spPr>
+        <p:txBody>
+          <a:bodyPr wrap="square" rtlCol="0">
+            <a:spAutoFit/>
+          </a:bodyPr>
+          <a:lstStyle/>
+          <a:p>
+            <a:pPr algn="ctr"/>
+            <a:r>
+              <a:rPr lang="en-CA" sz="1200" dirty="0"/>
+              <a:t>To file</a:t>
+            </a:r>
+          </a:p>
+        </p:txBody>
+      </p:sp>
+      <p:cxnSp>
+        <p:nvCxnSpPr>
+          <p:cNvPr id="144" name="Straight Arrow Connector 143">
+            <a:extLst>
+              <a:ext uri="{FF2B5EF4-FFF2-40B4-BE49-F238E27FC236}">
+                <a16:creationId xmlns:a16="http://schemas.microsoft.com/office/drawing/2014/main" id="{CEB794B4-7BFF-F88B-F0B8-3888AAA0066D}"/>
+              </a:ext>
+            </a:extLst>
+          </p:cNvPr>
+          <p:cNvCxnSpPr>
+            <a:stCxn id="119" idx="3"/>
+            <a:endCxn id="137" idx="2"/>
+          </p:cNvCxnSpPr>
+          <p:nvPr/>
+        </p:nvCxnSpPr>
+        <p:spPr>
+          <a:xfrm>
+            <a:off x="9933127" y="3370488"/>
+            <a:ext cx="527914" cy="8484"/>
+          </a:xfrm>
+          <a:prstGeom prst="straightConnector1">
+            <a:avLst/>
+          </a:prstGeom>
+          <a:ln>
+            <a:tailEnd type="triangle"/>
+          </a:ln>
+        </p:spPr>
+        <p:style>
+          <a:lnRef idx="2">
+            <a:schemeClr val="accent1"/>
+          </a:lnRef>
+          <a:fillRef idx="0">
+            <a:schemeClr val="accent1"/>
+          </a:fillRef>
+          <a:effectRef idx="1">
+            <a:schemeClr val="accent1"/>
+          </a:effectRef>
+          <a:fontRef idx="minor">
+            <a:schemeClr val="tx1"/>
+          </a:fontRef>
+        </p:style>
+      </p:cxnSp>
+      <p:cxnSp>
+        <p:nvCxnSpPr>
+          <p:cNvPr id="146" name="Connector: Elbow 145">
+            <a:extLst>
+              <a:ext uri="{FF2B5EF4-FFF2-40B4-BE49-F238E27FC236}">
+                <a16:creationId xmlns:a16="http://schemas.microsoft.com/office/drawing/2014/main" id="{10CB7C63-F508-3971-C446-0AB840224EC1}"/>
+              </a:ext>
+            </a:extLst>
+          </p:cNvPr>
+          <p:cNvCxnSpPr>
+            <a:cxnSpLocks/>
+            <a:stCxn id="137" idx="6"/>
+            <a:endCxn id="139" idx="0"/>
+          </p:cNvCxnSpPr>
+          <p:nvPr/>
+        </p:nvCxnSpPr>
+        <p:spPr>
+          <a:xfrm>
+            <a:off x="10823350" y="3378972"/>
+            <a:ext cx="369235" cy="1395919"/>
+          </a:xfrm>
+          <a:prstGeom prst="bentConnector2">
+            <a:avLst/>
+          </a:prstGeom>
+          <a:ln>
+            <a:tailEnd type="triangle"/>
+          </a:ln>
+        </p:spPr>
+        <p:style>
+          <a:lnRef idx="2">
+            <a:schemeClr val="accent1"/>
+          </a:lnRef>
+          <a:fillRef idx="0">
+            <a:schemeClr val="accent1"/>
+          </a:fillRef>
+          <a:effectRef idx="1">
+            <a:schemeClr val="accent1"/>
+          </a:effectRef>
+          <a:fontRef idx="minor">
+            <a:schemeClr val="tx1"/>
+          </a:fontRef>
+        </p:style>
+      </p:cxnSp>
+      <p:cxnSp>
+        <p:nvCxnSpPr>
+          <p:cNvPr id="149" name="Straight Arrow Connector 148">
+            <a:extLst>
+              <a:ext uri="{FF2B5EF4-FFF2-40B4-BE49-F238E27FC236}">
+                <a16:creationId xmlns:a16="http://schemas.microsoft.com/office/drawing/2014/main" id="{893673F4-F467-98D6-A52A-30F0D81B0EF9}"/>
+              </a:ext>
+            </a:extLst>
+          </p:cNvPr>
+          <p:cNvCxnSpPr>
+            <a:stCxn id="139" idx="4"/>
+            <a:endCxn id="141" idx="0"/>
+          </p:cNvCxnSpPr>
+          <p:nvPr/>
+        </p:nvCxnSpPr>
+        <p:spPr>
+          <a:xfrm>
+            <a:off x="11192585" y="5145827"/>
+            <a:ext cx="6353" cy="752850"/>
+          </a:xfrm>
+          <a:prstGeom prst="straightConnector1">
+            <a:avLst/>
+          </a:prstGeom>
+          <a:ln>
+            <a:tailEnd type="triangle"/>
+          </a:ln>
+        </p:spPr>
+        <p:style>
+          <a:lnRef idx="2">
+            <a:schemeClr val="accent1"/>
+          </a:lnRef>
+          <a:fillRef idx="0">
+            <a:schemeClr val="accent1"/>
+          </a:fillRef>
+          <a:effectRef idx="1">
+            <a:schemeClr val="accent1"/>
+          </a:effectRef>
+          <a:fontRef idx="minor">
+            <a:schemeClr val="tx1"/>
+          </a:fontRef>
+        </p:style>
+      </p:cxnSp>
+      <p:pic>
+        <p:nvPicPr>
+          <p:cNvPr id="151" name="Graphic 150" descr="Database outline">
+            <a:extLst>
+              <a:ext uri="{FF2B5EF4-FFF2-40B4-BE49-F238E27FC236}">
+                <a16:creationId xmlns:a16="http://schemas.microsoft.com/office/drawing/2014/main" id="{80C1A3D0-9470-E73D-9EFE-8EBC899C2D6D}"/>
+              </a:ext>
+            </a:extLst>
+          </p:cNvPr>
+          <p:cNvPicPr>
+            <a:picLocks noChangeAspect="1"/>
+          </p:cNvPicPr>
+          <p:nvPr/>
+        </p:nvPicPr>
+        <p:blipFill>
+          <a:blip r:embed="rId8">
+            <a:extLst>
+              <a:ext uri="{28A0092B-C50C-407E-A947-70E740481C1C}">
+                <a14:useLocalDpi xmlns:a14="http://schemas.microsoft.com/office/drawing/2010/main" val="0"/>
+              </a:ext>
+              <a:ext uri="{96DAC541-7B7A-43D3-8B79-37D633B846F1}">
+                <asvg:svgBlip xmlns:asvg="http://schemas.microsoft.com/office/drawing/2016/SVG/main" r:embed="rId9"/>
+              </a:ext>
+            </a:extLst>
+          </a:blip>
+          <a:stretch>
+            <a:fillRect/>
+          </a:stretch>
+        </p:blipFill>
+        <p:spPr>
+          <a:xfrm>
+            <a:off x="10617475" y="991103"/>
+            <a:ext cx="618226" cy="618226"/>
+          </a:xfrm>
+          <a:prstGeom prst="rect">
+            <a:avLst/>
+          </a:prstGeom>
+        </p:spPr>
+      </p:pic>
+      <p:sp>
+        <p:nvSpPr>
+          <p:cNvPr id="152" name="TextBox 151">
+            <a:extLst>
+              <a:ext uri="{FF2B5EF4-FFF2-40B4-BE49-F238E27FC236}">
+                <a16:creationId xmlns:a16="http://schemas.microsoft.com/office/drawing/2014/main" id="{2861CCA1-C422-30D8-947C-67795005EA93}"/>
+              </a:ext>
+            </a:extLst>
+          </p:cNvPr>
+          <p:cNvSpPr txBox="1"/>
+          <p:nvPr/>
+        </p:nvSpPr>
+        <p:spPr>
+          <a:xfrm>
+            <a:off x="10265948" y="460414"/>
+            <a:ext cx="1321280" cy="646331"/>
+          </a:xfrm>
+          <a:prstGeom prst="rect">
+            <a:avLst/>
+          </a:prstGeom>
+          <a:noFill/>
+        </p:spPr>
+        <p:txBody>
+          <a:bodyPr wrap="square" rtlCol="0">
+            <a:spAutoFit/>
+          </a:bodyPr>
+          <a:lstStyle/>
+          <a:p>
+            <a:pPr algn="ctr"/>
+            <a:r>
+              <a:rPr lang="en-CA" sz="1200" dirty="0"/>
+              <a:t>Language specific</a:t>
+            </a:r>
+          </a:p>
+          <a:p>
+            <a:pPr algn="ctr"/>
+            <a:r>
+              <a:rPr lang="en-CA" sz="1200" dirty="0"/>
+              <a:t>manuals </a:t>
+            </a:r>
+          </a:p>
+        </p:txBody>
+      </p:sp>
+      <p:pic>
+        <p:nvPicPr>
+          <p:cNvPr id="154" name="Graphic 153" descr="Cmd Terminal outline">
+            <a:extLst>
+              <a:ext uri="{FF2B5EF4-FFF2-40B4-BE49-F238E27FC236}">
+                <a16:creationId xmlns:a16="http://schemas.microsoft.com/office/drawing/2014/main" id="{240A592A-1E66-B601-10FC-190DF79C62AC}"/>
+              </a:ext>
+            </a:extLst>
+          </p:cNvPr>
+          <p:cNvPicPr>
+            <a:picLocks noChangeAspect="1"/>
+          </p:cNvPicPr>
+          <p:nvPr/>
+        </p:nvPicPr>
+        <p:blipFill>
+          <a:blip r:embed="rId10">
+            <a:extLst>
+              <a:ext uri="{28A0092B-C50C-407E-A947-70E740481C1C}">
+                <a14:useLocalDpi xmlns:a14="http://schemas.microsoft.com/office/drawing/2010/main" val="0"/>
+              </a:ext>
+              <a:ext uri="{96DAC541-7B7A-43D3-8B79-37D633B846F1}">
+                <asvg:svgBlip xmlns:asvg="http://schemas.microsoft.com/office/drawing/2016/SVG/main" r:embed="rId11"/>
+              </a:ext>
+            </a:extLst>
+          </a:blip>
+          <a:stretch>
+            <a:fillRect/>
+          </a:stretch>
+        </p:blipFill>
+        <p:spPr>
+          <a:xfrm>
+            <a:off x="9471959" y="1000004"/>
+            <a:ext cx="618226" cy="618226"/>
+          </a:xfrm>
+          <a:prstGeom prst="rect">
+            <a:avLst/>
+          </a:prstGeom>
+        </p:spPr>
+      </p:pic>
+      <p:sp>
+        <p:nvSpPr>
+          <p:cNvPr id="155" name="TextBox 154">
+            <a:extLst>
+              <a:ext uri="{FF2B5EF4-FFF2-40B4-BE49-F238E27FC236}">
+                <a16:creationId xmlns:a16="http://schemas.microsoft.com/office/drawing/2014/main" id="{0A1FE9F1-4468-BC94-3372-4F5FE7842F93}"/>
+              </a:ext>
+            </a:extLst>
+          </p:cNvPr>
+          <p:cNvSpPr txBox="1"/>
+          <p:nvPr/>
+        </p:nvSpPr>
+        <p:spPr>
+          <a:xfrm>
+            <a:off x="9120432" y="630990"/>
+            <a:ext cx="1321280" cy="461665"/>
+          </a:xfrm>
+          <a:prstGeom prst="rect">
+            <a:avLst/>
+          </a:prstGeom>
+          <a:noFill/>
+        </p:spPr>
+        <p:txBody>
+          <a:bodyPr wrap="square" rtlCol="0">
+            <a:spAutoFit/>
+          </a:bodyPr>
+          <a:lstStyle/>
+          <a:p>
+            <a:pPr algn="ctr"/>
+            <a:r>
+              <a:rPr lang="en-CA" sz="1200" dirty="0"/>
+              <a:t>Computation (python shell)</a:t>
+            </a:r>
+          </a:p>
+        </p:txBody>
+      </p:sp>
+      <p:sp>
+        <p:nvSpPr>
+          <p:cNvPr id="181" name="TextBox 180">
+            <a:extLst>
+              <a:ext uri="{FF2B5EF4-FFF2-40B4-BE49-F238E27FC236}">
+                <a16:creationId xmlns:a16="http://schemas.microsoft.com/office/drawing/2014/main" id="{3C409BA8-5B9A-40B5-A6F6-966FF9A9C1E1}"/>
+              </a:ext>
+            </a:extLst>
+          </p:cNvPr>
+          <p:cNvSpPr txBox="1"/>
+          <p:nvPr/>
+        </p:nvSpPr>
+        <p:spPr>
+          <a:xfrm>
+            <a:off x="558555" y="6156149"/>
+            <a:ext cx="1407542" cy="276999"/>
+          </a:xfrm>
+          <a:prstGeom prst="rect">
+            <a:avLst/>
+          </a:prstGeom>
+          <a:noFill/>
+        </p:spPr>
+        <p:txBody>
+          <a:bodyPr wrap="square" rtlCol="0">
+            <a:spAutoFit/>
+          </a:bodyPr>
+          <a:lstStyle/>
+          <a:p>
+            <a:pPr algn="ctr"/>
+            <a:r>
+              <a:rPr lang="en-CA" sz="1200" dirty="0"/>
+              <a:t>Decision junction</a:t>
+            </a:r>
+          </a:p>
+        </p:txBody>
+      </p:sp>
+      <p:sp>
+        <p:nvSpPr>
+          <p:cNvPr id="182" name="TextBox 181">
+            <a:extLst>
+              <a:ext uri="{FF2B5EF4-FFF2-40B4-BE49-F238E27FC236}">
+                <a16:creationId xmlns:a16="http://schemas.microsoft.com/office/drawing/2014/main" id="{83CB147D-F902-CBF4-67AB-7E2119792F6F}"/>
+              </a:ext>
+            </a:extLst>
+          </p:cNvPr>
+          <p:cNvSpPr txBox="1"/>
+          <p:nvPr/>
+        </p:nvSpPr>
+        <p:spPr>
+          <a:xfrm>
+            <a:off x="629663" y="5589370"/>
+            <a:ext cx="1470852" cy="276999"/>
+          </a:xfrm>
+          <a:prstGeom prst="rect">
+            <a:avLst/>
+          </a:prstGeom>
+          <a:noFill/>
+        </p:spPr>
+        <p:txBody>
+          <a:bodyPr wrap="square" rtlCol="0">
+            <a:spAutoFit/>
+          </a:bodyPr>
+          <a:lstStyle/>
+          <a:p>
+            <a:pPr algn="ctr"/>
+            <a:r>
+              <a:rPr lang="en-CA" sz="1200" dirty="0"/>
+              <a:t>Input/ Output node</a:t>
+            </a:r>
+          </a:p>
+        </p:txBody>
+      </p:sp>
+      <p:sp>
+        <p:nvSpPr>
+          <p:cNvPr id="183" name="TextBox 182">
+            <a:extLst>
+              <a:ext uri="{FF2B5EF4-FFF2-40B4-BE49-F238E27FC236}">
+                <a16:creationId xmlns:a16="http://schemas.microsoft.com/office/drawing/2014/main" id="{1A3F73B2-CAA6-B09C-A9B5-9788FF286FD3}"/>
+              </a:ext>
+            </a:extLst>
+          </p:cNvPr>
+          <p:cNvSpPr txBox="1"/>
+          <p:nvPr/>
+        </p:nvSpPr>
+        <p:spPr>
+          <a:xfrm>
+            <a:off x="638096" y="4939590"/>
+            <a:ext cx="896362" cy="276999"/>
+          </a:xfrm>
+          <a:prstGeom prst="rect">
+            <a:avLst/>
+          </a:prstGeom>
+          <a:noFill/>
+        </p:spPr>
+        <p:txBody>
+          <a:bodyPr wrap="square" rtlCol="0">
+            <a:spAutoFit/>
+          </a:bodyPr>
+          <a:lstStyle/>
+          <a:p>
+            <a:pPr algn="ctr"/>
+            <a:r>
+              <a:rPr lang="en-CA" sz="1200" dirty="0"/>
+              <a:t>LLM node</a:t>
+            </a:r>
+          </a:p>
+        </p:txBody>
+      </p:sp>
+      <p:cxnSp>
+        <p:nvCxnSpPr>
+          <p:cNvPr id="16" name="Connector: Elbow 15">
+            <a:extLst>
+              <a:ext uri="{FF2B5EF4-FFF2-40B4-BE49-F238E27FC236}">
+                <a16:creationId xmlns:a16="http://schemas.microsoft.com/office/drawing/2014/main" id="{DCC325E0-E065-5DED-AA11-9063920B739A}"/>
+              </a:ext>
+            </a:extLst>
+          </p:cNvPr>
+          <p:cNvCxnSpPr>
+            <a:cxnSpLocks/>
+            <a:stCxn id="120" idx="2"/>
+            <a:endCxn id="103" idx="2"/>
+          </p:cNvCxnSpPr>
+          <p:nvPr/>
+        </p:nvCxnSpPr>
+        <p:spPr>
+          <a:xfrm rot="10800000">
+            <a:off x="8909194" y="3370490"/>
+            <a:ext cx="709068" cy="726927"/>
+          </a:xfrm>
+          <a:prstGeom prst="bentConnector3">
+            <a:avLst>
+              <a:gd name="adj1" fmla="val 160222"/>
+            </a:avLst>
+          </a:prstGeom>
+          <a:ln>
+            <a:tailEnd type="triangle"/>
+          </a:ln>
+        </p:spPr>
+        <p:style>
+          <a:lnRef idx="2">
+            <a:schemeClr val="accent1"/>
+          </a:lnRef>
+          <a:fillRef idx="0">
+            <a:schemeClr val="accent1"/>
+          </a:fillRef>
+          <a:effectRef idx="1">
+            <a:schemeClr val="accent1"/>
+          </a:effectRef>
+          <a:fontRef idx="minor">
+            <a:schemeClr val="tx1"/>
+          </a:fontRef>
+        </p:style>
+      </p:cxnSp>
+      <p:cxnSp>
+        <p:nvCxnSpPr>
+          <p:cNvPr id="2" name="Straight Arrow Connector 1">
+            <a:extLst>
+              <a:ext uri="{FF2B5EF4-FFF2-40B4-BE49-F238E27FC236}">
+                <a16:creationId xmlns:a16="http://schemas.microsoft.com/office/drawing/2014/main" id="{23D528CE-85F6-9B71-EA7D-EDC410158456}"/>
+              </a:ext>
+            </a:extLst>
+          </p:cNvPr>
+          <p:cNvCxnSpPr>
+            <a:cxnSpLocks/>
+            <a:stCxn id="8" idx="2"/>
+            <a:endCxn id="9" idx="0"/>
+          </p:cNvCxnSpPr>
+          <p:nvPr/>
+        </p:nvCxnSpPr>
+        <p:spPr>
+          <a:xfrm>
+            <a:off x="1556224" y="2595657"/>
+            <a:ext cx="843" cy="647875"/>
+          </a:xfrm>
+          <a:prstGeom prst="straightConnector1">
+            <a:avLst/>
+          </a:prstGeom>
+          <a:ln>
+            <a:tailEnd type="triangle"/>
+          </a:ln>
+        </p:spPr>
+        <p:style>
+          <a:lnRef idx="2">
+            <a:schemeClr val="accent1"/>
+          </a:lnRef>
+          <a:fillRef idx="0">
+            <a:schemeClr val="accent1"/>
+          </a:fillRef>
+          <a:effectRef idx="1">
+            <a:schemeClr val="accent1"/>
+          </a:effectRef>
+          <a:fontRef idx="minor">
+            <a:schemeClr val="tx1"/>
+          </a:fontRef>
+        </p:style>
+      </p:cxnSp>
+      <p:sp>
+        <p:nvSpPr>
+          <p:cNvPr id="35" name="Oval 34">
+            <a:extLst>
+              <a:ext uri="{FF2B5EF4-FFF2-40B4-BE49-F238E27FC236}">
+                <a16:creationId xmlns:a16="http://schemas.microsoft.com/office/drawing/2014/main" id="{04829FE3-98B8-C5AA-DA22-BEC61960272C}"/>
+              </a:ext>
+            </a:extLst>
+          </p:cNvPr>
+          <p:cNvSpPr/>
+          <p:nvPr/>
+        </p:nvSpPr>
+        <p:spPr>
+          <a:xfrm>
+            <a:off x="3548025" y="3248569"/>
+            <a:ext cx="362309" cy="370936"/>
+          </a:xfrm>
+          <a:prstGeom prst="ellipse">
+            <a:avLst/>
+          </a:prstGeom>
+        </p:spPr>
+        <p:style>
+          <a:lnRef idx="2">
+            <a:schemeClr val="accent1">
+              <a:shade val="15000"/>
+            </a:schemeClr>
+          </a:lnRef>
+          <a:fillRef idx="1">
+            <a:schemeClr val="accent1"/>
+          </a:fillRef>
+          <a:effectRef idx="0">
+            <a:schemeClr val="accent1"/>
+          </a:effectRef>
+          <a:fontRef idx="minor">
+            <a:schemeClr val="lt1"/>
+          </a:fontRef>
+        </p:style>
+        <p:txBody>
+          <a:bodyPr rtlCol="0" anchor="ctr"/>
+          <a:lstStyle/>
+          <a:p>
+            <a:pPr algn="ctr"/>
+            <a:endParaRPr lang="en-CA"/>
+          </a:p>
+        </p:txBody>
+      </p:sp>
+      <p:sp>
+        <p:nvSpPr>
+          <p:cNvPr id="39" name="TextBox 38">
+            <a:extLst>
+              <a:ext uri="{FF2B5EF4-FFF2-40B4-BE49-F238E27FC236}">
+                <a16:creationId xmlns:a16="http://schemas.microsoft.com/office/drawing/2014/main" id="{C131C9A1-04A3-97C7-67B6-C653418C2E3B}"/>
+              </a:ext>
+            </a:extLst>
+          </p:cNvPr>
+          <p:cNvSpPr txBox="1"/>
+          <p:nvPr/>
+        </p:nvSpPr>
+        <p:spPr>
+          <a:xfrm>
+            <a:off x="3243934" y="3582554"/>
+            <a:ext cx="1022227" cy="461665"/>
+          </a:xfrm>
+          <a:prstGeom prst="rect">
+            <a:avLst/>
+          </a:prstGeom>
+          <a:noFill/>
+        </p:spPr>
+        <p:txBody>
+          <a:bodyPr wrap="square" rtlCol="0">
+            <a:spAutoFit/>
+          </a:bodyPr>
+          <a:lstStyle/>
+          <a:p>
+            <a:pPr algn="ctr"/>
+            <a:r>
+              <a:rPr lang="en-CA" sz="1200" dirty="0"/>
+              <a:t>Data source selection</a:t>
+            </a:r>
+          </a:p>
+        </p:txBody>
+      </p:sp>
+      <p:cxnSp>
+        <p:nvCxnSpPr>
+          <p:cNvPr id="45" name="Straight Arrow Connector 44">
+            <a:extLst>
+              <a:ext uri="{FF2B5EF4-FFF2-40B4-BE49-F238E27FC236}">
+                <a16:creationId xmlns:a16="http://schemas.microsoft.com/office/drawing/2014/main" id="{0E3C4C65-4A8C-B246-E3AF-147E86F778DF}"/>
+              </a:ext>
+            </a:extLst>
+          </p:cNvPr>
+          <p:cNvCxnSpPr>
+            <a:cxnSpLocks/>
+            <a:stCxn id="35" idx="6"/>
+            <a:endCxn id="42" idx="2"/>
+          </p:cNvCxnSpPr>
+          <p:nvPr/>
+        </p:nvCxnSpPr>
+        <p:spPr>
+          <a:xfrm flipV="1">
+            <a:off x="3910334" y="3429000"/>
+            <a:ext cx="339652" cy="5037"/>
+          </a:xfrm>
+          <a:prstGeom prst="straightConnector1">
+            <a:avLst/>
+          </a:prstGeom>
+          <a:ln>
+            <a:tailEnd type="triangle"/>
+          </a:ln>
+        </p:spPr>
+        <p:style>
+          <a:lnRef idx="2">
+            <a:schemeClr val="accent1"/>
+          </a:lnRef>
+          <a:fillRef idx="0">
+            <a:schemeClr val="accent1"/>
+          </a:fillRef>
+          <a:effectRef idx="1">
+            <a:schemeClr val="accent1"/>
+          </a:effectRef>
+          <a:fontRef idx="minor">
+            <a:schemeClr val="tx1"/>
+          </a:fontRef>
+        </p:style>
+      </p:cxnSp>
+      <p:pic>
+        <p:nvPicPr>
+          <p:cNvPr id="49" name="Graphic 48" descr="Database outline">
+            <a:extLst>
+              <a:ext uri="{FF2B5EF4-FFF2-40B4-BE49-F238E27FC236}">
+                <a16:creationId xmlns:a16="http://schemas.microsoft.com/office/drawing/2014/main" id="{ABDD9D52-74D7-6ACB-963E-8605BC3C139B}"/>
+              </a:ext>
+            </a:extLst>
+          </p:cNvPr>
+          <p:cNvPicPr>
+            <a:picLocks noChangeAspect="1"/>
+          </p:cNvPicPr>
+          <p:nvPr/>
+        </p:nvPicPr>
+        <p:blipFill>
+          <a:blip r:embed="rId2">
+            <a:extLst>
+              <a:ext uri="{28A0092B-C50C-407E-A947-70E740481C1C}">
+                <a14:useLocalDpi xmlns:a14="http://schemas.microsoft.com/office/drawing/2010/main" val="0"/>
+              </a:ext>
+              <a:ext uri="{96DAC541-7B7A-43D3-8B79-37D633B846F1}">
+                <asvg:svgBlip xmlns:asvg="http://schemas.microsoft.com/office/drawing/2016/SVG/main" r:embed="rId3"/>
+              </a:ext>
+            </a:extLst>
+          </a:blip>
+          <a:stretch>
+            <a:fillRect/>
+          </a:stretch>
+        </p:blipFill>
+        <p:spPr>
+          <a:xfrm>
+            <a:off x="3726983" y="976064"/>
+            <a:ext cx="618226" cy="618226"/>
+          </a:xfrm>
+          <a:prstGeom prst="rect">
+            <a:avLst/>
+          </a:prstGeom>
+        </p:spPr>
+      </p:pic>
+      <p:sp>
+        <p:nvSpPr>
+          <p:cNvPr id="53" name="TextBox 52">
+            <a:extLst>
+              <a:ext uri="{FF2B5EF4-FFF2-40B4-BE49-F238E27FC236}">
+                <a16:creationId xmlns:a16="http://schemas.microsoft.com/office/drawing/2014/main" id="{C683FC53-5212-8784-C229-4B7499904EB2}"/>
+              </a:ext>
+            </a:extLst>
+          </p:cNvPr>
+          <p:cNvSpPr txBox="1"/>
+          <p:nvPr/>
+        </p:nvSpPr>
+        <p:spPr>
+          <a:xfrm>
+            <a:off x="3369654" y="254206"/>
+            <a:ext cx="1321280" cy="830997"/>
+          </a:xfrm>
+          <a:prstGeom prst="rect">
+            <a:avLst/>
+          </a:prstGeom>
+          <a:noFill/>
+        </p:spPr>
+        <p:txBody>
+          <a:bodyPr wrap="square" rtlCol="0">
+            <a:spAutoFit/>
+          </a:bodyPr>
+          <a:lstStyle/>
+          <a:p>
+            <a:pPr algn="ctr"/>
+            <a:r>
+              <a:rPr lang="en-CA" sz="1200" dirty="0"/>
+              <a:t>Project specific database:</a:t>
+            </a:r>
+          </a:p>
+          <a:p>
+            <a:pPr algn="ctr"/>
+            <a:r>
+              <a:rPr lang="en-CA" sz="1200" dirty="0"/>
+              <a:t>Device datasheets, </a:t>
+            </a:r>
+            <a:r>
+              <a:rPr lang="en-CA" sz="1200" dirty="0" err="1"/>
+              <a:t>etc</a:t>
+            </a:r>
+            <a:endParaRPr lang="en-CA" sz="1200" dirty="0"/>
+          </a:p>
+        </p:txBody>
+      </p:sp>
+      <p:cxnSp>
+        <p:nvCxnSpPr>
+          <p:cNvPr id="55" name="Straight Arrow Connector 54">
+            <a:extLst>
+              <a:ext uri="{FF2B5EF4-FFF2-40B4-BE49-F238E27FC236}">
+                <a16:creationId xmlns:a16="http://schemas.microsoft.com/office/drawing/2014/main" id="{96D6B9CE-0413-5956-C3B6-E8AA980DD55C}"/>
+              </a:ext>
+            </a:extLst>
+          </p:cNvPr>
+          <p:cNvCxnSpPr>
+            <a:cxnSpLocks/>
+            <a:stCxn id="13" idx="2"/>
+            <a:endCxn id="31" idx="0"/>
+          </p:cNvCxnSpPr>
+          <p:nvPr/>
+        </p:nvCxnSpPr>
+        <p:spPr>
+          <a:xfrm>
+            <a:off x="5308740" y="1698690"/>
+            <a:ext cx="0" cy="968310"/>
+          </a:xfrm>
+          <a:prstGeom prst="straightConnector1">
+            <a:avLst/>
+          </a:prstGeom>
+          <a:ln>
+            <a:tailEnd type="triangle"/>
+          </a:ln>
+        </p:spPr>
+        <p:style>
+          <a:lnRef idx="2">
+            <a:schemeClr val="accent1"/>
+          </a:lnRef>
+          <a:fillRef idx="0">
+            <a:schemeClr val="accent1"/>
+          </a:fillRef>
+          <a:effectRef idx="1">
+            <a:schemeClr val="accent1"/>
+          </a:effectRef>
+          <a:fontRef idx="minor">
+            <a:schemeClr val="tx1"/>
+          </a:fontRef>
+        </p:style>
+      </p:cxnSp>
+      <p:sp>
+        <p:nvSpPr>
+          <p:cNvPr id="69" name="TextBox 68">
+            <a:extLst>
+              <a:ext uri="{FF2B5EF4-FFF2-40B4-BE49-F238E27FC236}">
+                <a16:creationId xmlns:a16="http://schemas.microsoft.com/office/drawing/2014/main" id="{C3C7C8E0-B633-6148-0456-AD96A5558697}"/>
+              </a:ext>
+            </a:extLst>
+          </p:cNvPr>
+          <p:cNvSpPr txBox="1"/>
+          <p:nvPr/>
+        </p:nvSpPr>
+        <p:spPr>
+          <a:xfrm>
+            <a:off x="9346448" y="4982145"/>
+            <a:ext cx="941507" cy="830997"/>
+          </a:xfrm>
+          <a:prstGeom prst="rect">
+            <a:avLst/>
+          </a:prstGeom>
+          <a:noFill/>
+        </p:spPr>
+        <p:txBody>
+          <a:bodyPr wrap="square" rtlCol="0">
+            <a:spAutoFit/>
+          </a:bodyPr>
+          <a:lstStyle/>
+          <a:p>
+            <a:pPr algn="ctr"/>
+            <a:r>
+              <a:rPr lang="en-CA" sz="1200" dirty="0"/>
+              <a:t>Single module design loop</a:t>
+            </a:r>
+          </a:p>
+        </p:txBody>
+      </p:sp>
+      <p:cxnSp>
+        <p:nvCxnSpPr>
+          <p:cNvPr id="75" name="Connector: Elbow 74">
+            <a:extLst>
+              <a:ext uri="{FF2B5EF4-FFF2-40B4-BE49-F238E27FC236}">
+                <a16:creationId xmlns:a16="http://schemas.microsoft.com/office/drawing/2014/main" id="{FE3BE531-27FF-1279-C69D-B641C3D61EFE}"/>
+              </a:ext>
+            </a:extLst>
+          </p:cNvPr>
+          <p:cNvCxnSpPr>
+            <a:cxnSpLocks/>
+            <a:stCxn id="64" idx="2"/>
+            <a:endCxn id="66" idx="0"/>
+          </p:cNvCxnSpPr>
+          <p:nvPr/>
+        </p:nvCxnSpPr>
+        <p:spPr>
+          <a:xfrm rot="16200000" flipH="1">
+            <a:off x="10047052" y="1988884"/>
+            <a:ext cx="1210878" cy="729072"/>
+          </a:xfrm>
+          <a:prstGeom prst="bentConnector3">
+            <a:avLst>
+              <a:gd name="adj1" fmla="val 50000"/>
+            </a:avLst>
+          </a:prstGeom>
+          <a:ln>
+            <a:tailEnd type="triangle"/>
+          </a:ln>
+        </p:spPr>
+        <p:style>
+          <a:lnRef idx="2">
+            <a:schemeClr val="accent1"/>
+          </a:lnRef>
+          <a:fillRef idx="0">
+            <a:schemeClr val="accent1"/>
+          </a:fillRef>
+          <a:effectRef idx="1">
+            <a:schemeClr val="accent1"/>
+          </a:effectRef>
+          <a:fontRef idx="minor">
+            <a:schemeClr val="tx1"/>
+          </a:fontRef>
+        </p:style>
+      </p:cxnSp>
+    </p:spTree>
+    <p:extLst>
+      <p:ext uri="{BB962C8B-B14F-4D97-AF65-F5344CB8AC3E}">
+        <p14:creationId xmlns:p14="http://schemas.microsoft.com/office/powerpoint/2010/main" val="4167909607"/>
       </p:ext>
     </p:extLst>
   </p:cSld>

</xml_diff>

<commit_message>
module design and system design evaluators integrted
</commit_message>
<xml_diff>
--- a/FPGA_AGI_v2.pptx
+++ b/FPGA_AGI_v2.pptx
@@ -7,6 +7,8 @@
   <p:sldIdLst>
     <p:sldId id="256" r:id="rId2"/>
     <p:sldId id="257" r:id="rId3"/>
+    <p:sldId id="260" r:id="rId4"/>
+    <p:sldId id="261" r:id="rId5"/>
   </p:sldIdLst>
   <p:sldSz cx="12192000" cy="6858000"/>
   <p:notesSz cx="6858000" cy="9144000"/>
@@ -262,7 +264,7 @@
           <a:p>
             <a:fld id="{8FF62803-A023-4C1F-8117-2FD5501C70F4}" type="datetimeFigureOut">
               <a:rPr lang="en-CA" smtClean="0"/>
-              <a:t>2024-04-20</a:t>
+              <a:t>2024-04-28</a:t>
             </a:fld>
             <a:endParaRPr lang="en-CA"/>
           </a:p>
@@ -462,7 +464,7 @@
           <a:p>
             <a:fld id="{8FF62803-A023-4C1F-8117-2FD5501C70F4}" type="datetimeFigureOut">
               <a:rPr lang="en-CA" smtClean="0"/>
-              <a:t>2024-04-20</a:t>
+              <a:t>2024-04-28</a:t>
             </a:fld>
             <a:endParaRPr lang="en-CA"/>
           </a:p>
@@ -672,7 +674,7 @@
           <a:p>
             <a:fld id="{8FF62803-A023-4C1F-8117-2FD5501C70F4}" type="datetimeFigureOut">
               <a:rPr lang="en-CA" smtClean="0"/>
-              <a:t>2024-04-20</a:t>
+              <a:t>2024-04-28</a:t>
             </a:fld>
             <a:endParaRPr lang="en-CA"/>
           </a:p>
@@ -872,7 +874,7 @@
           <a:p>
             <a:fld id="{8FF62803-A023-4C1F-8117-2FD5501C70F4}" type="datetimeFigureOut">
               <a:rPr lang="en-CA" smtClean="0"/>
-              <a:t>2024-04-20</a:t>
+              <a:t>2024-04-28</a:t>
             </a:fld>
             <a:endParaRPr lang="en-CA"/>
           </a:p>
@@ -1148,7 +1150,7 @@
           <a:p>
             <a:fld id="{8FF62803-A023-4C1F-8117-2FD5501C70F4}" type="datetimeFigureOut">
               <a:rPr lang="en-CA" smtClean="0"/>
-              <a:t>2024-04-20</a:t>
+              <a:t>2024-04-28</a:t>
             </a:fld>
             <a:endParaRPr lang="en-CA"/>
           </a:p>
@@ -1416,7 +1418,7 @@
           <a:p>
             <a:fld id="{8FF62803-A023-4C1F-8117-2FD5501C70F4}" type="datetimeFigureOut">
               <a:rPr lang="en-CA" smtClean="0"/>
-              <a:t>2024-04-20</a:t>
+              <a:t>2024-04-28</a:t>
             </a:fld>
             <a:endParaRPr lang="en-CA"/>
           </a:p>
@@ -1831,7 +1833,7 @@
           <a:p>
             <a:fld id="{8FF62803-A023-4C1F-8117-2FD5501C70F4}" type="datetimeFigureOut">
               <a:rPr lang="en-CA" smtClean="0"/>
-              <a:t>2024-04-20</a:t>
+              <a:t>2024-04-28</a:t>
             </a:fld>
             <a:endParaRPr lang="en-CA"/>
           </a:p>
@@ -1973,7 +1975,7 @@
           <a:p>
             <a:fld id="{8FF62803-A023-4C1F-8117-2FD5501C70F4}" type="datetimeFigureOut">
               <a:rPr lang="en-CA" smtClean="0"/>
-              <a:t>2024-04-20</a:t>
+              <a:t>2024-04-28</a:t>
             </a:fld>
             <a:endParaRPr lang="en-CA"/>
           </a:p>
@@ -2086,7 +2088,7 @@
           <a:p>
             <a:fld id="{8FF62803-A023-4C1F-8117-2FD5501C70F4}" type="datetimeFigureOut">
               <a:rPr lang="en-CA" smtClean="0"/>
-              <a:t>2024-04-20</a:t>
+              <a:t>2024-04-28</a:t>
             </a:fld>
             <a:endParaRPr lang="en-CA"/>
           </a:p>
@@ -2399,7 +2401,7 @@
           <a:p>
             <a:fld id="{8FF62803-A023-4C1F-8117-2FD5501C70F4}" type="datetimeFigureOut">
               <a:rPr lang="en-CA" smtClean="0"/>
-              <a:t>2024-04-20</a:t>
+              <a:t>2024-04-28</a:t>
             </a:fld>
             <a:endParaRPr lang="en-CA"/>
           </a:p>
@@ -2688,7 +2690,7 @@
           <a:p>
             <a:fld id="{8FF62803-A023-4C1F-8117-2FD5501C70F4}" type="datetimeFigureOut">
               <a:rPr lang="en-CA" smtClean="0"/>
-              <a:t>2024-04-20</a:t>
+              <a:t>2024-04-28</a:t>
             </a:fld>
             <a:endParaRPr lang="en-CA"/>
           </a:p>
@@ -2931,7 +2933,7 @@
           <a:p>
             <a:fld id="{8FF62803-A023-4C1F-8117-2FD5501C70F4}" type="datetimeFigureOut">
               <a:rPr lang="en-CA" smtClean="0"/>
-              <a:t>2024-04-20</a:t>
+              <a:t>2024-04-28</a:t>
             </a:fld>
             <a:endParaRPr lang="en-CA"/>
           </a:p>
@@ -9654,6 +9656,4244 @@
     <p:extLst>
       <p:ext uri="{BB962C8B-B14F-4D97-AF65-F5344CB8AC3E}">
         <p14:creationId xmlns:p14="http://schemas.microsoft.com/office/powerpoint/2010/main" val="4167909607"/>
+      </p:ext>
+    </p:extLst>
+  </p:cSld>
+  <p:clrMapOvr>
+    <a:masterClrMapping/>
+  </p:clrMapOvr>
+</p:sld>
+</file>
+
+<file path=ppt/slides/slide3.xml><?xml version="1.0" encoding="utf-8"?>
+<p:sld xmlns:a="http://schemas.openxmlformats.org/drawingml/2006/main" xmlns:r="http://schemas.openxmlformats.org/officeDocument/2006/relationships" xmlns:p="http://schemas.openxmlformats.org/presentationml/2006/main">
+  <p:cSld>
+    <p:spTree>
+      <p:nvGrpSpPr>
+        <p:cNvPr id="1" name=""/>
+        <p:cNvGrpSpPr/>
+        <p:nvPr/>
+      </p:nvGrpSpPr>
+      <p:grpSpPr>
+        <a:xfrm>
+          <a:off x="0" y="0"/>
+          <a:ext cx="0" cy="0"/>
+          <a:chOff x="0" y="0"/>
+          <a:chExt cx="0" cy="0"/>
+        </a:xfrm>
+      </p:grpSpPr>
+      <p:sp>
+        <p:nvSpPr>
+          <p:cNvPr id="13" name="Rectangle 12">
+            <a:extLst>
+              <a:ext uri="{FF2B5EF4-FFF2-40B4-BE49-F238E27FC236}">
+                <a16:creationId xmlns:a16="http://schemas.microsoft.com/office/drawing/2014/main" id="{F6216BF4-A2CA-76C6-859D-DD4C5617C1E7}"/>
+              </a:ext>
+            </a:extLst>
+          </p:cNvPr>
+          <p:cNvSpPr/>
+          <p:nvPr/>
+        </p:nvSpPr>
+        <p:spPr>
+          <a:xfrm>
+            <a:off x="5251802" y="268857"/>
+            <a:ext cx="3961247" cy="1429833"/>
+          </a:xfrm>
+          <a:prstGeom prst="rect">
+            <a:avLst/>
+          </a:prstGeom>
+        </p:spPr>
+        <p:style>
+          <a:lnRef idx="2">
+            <a:schemeClr val="accent1"/>
+          </a:lnRef>
+          <a:fillRef idx="1">
+            <a:schemeClr val="lt1"/>
+          </a:fillRef>
+          <a:effectRef idx="0">
+            <a:schemeClr val="accent1"/>
+          </a:effectRef>
+          <a:fontRef idx="minor">
+            <a:schemeClr val="dk1"/>
+          </a:fontRef>
+        </p:style>
+        <p:txBody>
+          <a:bodyPr rtlCol="0" anchor="ctr"/>
+          <a:lstStyle/>
+          <a:p>
+            <a:pPr algn="ctr"/>
+            <a:endParaRPr lang="en-CA"/>
+          </a:p>
+        </p:txBody>
+      </p:sp>
+      <p:sp>
+        <p:nvSpPr>
+          <p:cNvPr id="4" name="Oval 3">
+            <a:extLst>
+              <a:ext uri="{FF2B5EF4-FFF2-40B4-BE49-F238E27FC236}">
+                <a16:creationId xmlns:a16="http://schemas.microsoft.com/office/drawing/2014/main" id="{05012E47-DD13-FA48-EC02-C04C2C3EF92F}"/>
+              </a:ext>
+            </a:extLst>
+          </p:cNvPr>
+          <p:cNvSpPr/>
+          <p:nvPr/>
+        </p:nvSpPr>
+        <p:spPr>
+          <a:xfrm>
+            <a:off x="334271" y="5234453"/>
+            <a:ext cx="362309" cy="370936"/>
+          </a:xfrm>
+          <a:prstGeom prst="ellipse">
+            <a:avLst/>
+          </a:prstGeom>
+          <a:solidFill>
+            <a:srgbClr val="FFFF00"/>
+          </a:solidFill>
+          <a:ln>
+            <a:solidFill>
+              <a:srgbClr val="FFC000"/>
+            </a:solidFill>
+          </a:ln>
+        </p:spPr>
+        <p:style>
+          <a:lnRef idx="2">
+            <a:schemeClr val="accent2">
+              <a:shade val="15000"/>
+            </a:schemeClr>
+          </a:lnRef>
+          <a:fillRef idx="1">
+            <a:schemeClr val="accent2"/>
+          </a:fillRef>
+          <a:effectRef idx="0">
+            <a:schemeClr val="accent2"/>
+          </a:effectRef>
+          <a:fontRef idx="minor">
+            <a:schemeClr val="lt1"/>
+          </a:fontRef>
+        </p:style>
+        <p:txBody>
+          <a:bodyPr rtlCol="0" anchor="ctr"/>
+          <a:lstStyle/>
+          <a:p>
+            <a:pPr algn="ctr"/>
+            <a:endParaRPr lang="en-CA"/>
+          </a:p>
+        </p:txBody>
+      </p:sp>
+      <p:sp>
+        <p:nvSpPr>
+          <p:cNvPr id="5" name="Oval 4">
+            <a:extLst>
+              <a:ext uri="{FF2B5EF4-FFF2-40B4-BE49-F238E27FC236}">
+                <a16:creationId xmlns:a16="http://schemas.microsoft.com/office/drawing/2014/main" id="{B3C8729B-B255-B27D-7AB4-9ABBA5F5A75E}"/>
+              </a:ext>
+            </a:extLst>
+          </p:cNvPr>
+          <p:cNvSpPr/>
+          <p:nvPr/>
+        </p:nvSpPr>
+        <p:spPr>
+          <a:xfrm>
+            <a:off x="331397" y="4741822"/>
+            <a:ext cx="362309" cy="370936"/>
+          </a:xfrm>
+          <a:prstGeom prst="ellipse">
+            <a:avLst/>
+          </a:prstGeom>
+        </p:spPr>
+        <p:style>
+          <a:lnRef idx="2">
+            <a:schemeClr val="accent1">
+              <a:shade val="15000"/>
+            </a:schemeClr>
+          </a:lnRef>
+          <a:fillRef idx="1">
+            <a:schemeClr val="accent1"/>
+          </a:fillRef>
+          <a:effectRef idx="0">
+            <a:schemeClr val="accent1"/>
+          </a:effectRef>
+          <a:fontRef idx="minor">
+            <a:schemeClr val="lt1"/>
+          </a:fontRef>
+        </p:style>
+        <p:txBody>
+          <a:bodyPr rtlCol="0" anchor="ctr"/>
+          <a:lstStyle/>
+          <a:p>
+            <a:pPr algn="ctr"/>
+            <a:endParaRPr lang="en-CA"/>
+          </a:p>
+        </p:txBody>
+      </p:sp>
+      <p:pic>
+        <p:nvPicPr>
+          <p:cNvPr id="7" name="Graphic 6" descr="Database outline">
+            <a:extLst>
+              <a:ext uri="{FF2B5EF4-FFF2-40B4-BE49-F238E27FC236}">
+                <a16:creationId xmlns:a16="http://schemas.microsoft.com/office/drawing/2014/main" id="{0E824BB0-A48D-F347-0E22-17B7DF1A6177}"/>
+              </a:ext>
+            </a:extLst>
+          </p:cNvPr>
+          <p:cNvPicPr>
+            <a:picLocks noChangeAspect="1"/>
+          </p:cNvPicPr>
+          <p:nvPr/>
+        </p:nvPicPr>
+        <p:blipFill>
+          <a:blip r:embed="rId2">
+            <a:extLst>
+              <a:ext uri="{28A0092B-C50C-407E-A947-70E740481C1C}">
+                <a14:useLocalDpi xmlns:a14="http://schemas.microsoft.com/office/drawing/2010/main" val="0"/>
+              </a:ext>
+              <a:ext uri="{96DAC541-7B7A-43D3-8B79-37D633B846F1}">
+                <asvg:svgBlip xmlns:asvg="http://schemas.microsoft.com/office/drawing/2016/SVG/main" r:embed="rId3"/>
+              </a:ext>
+            </a:extLst>
+          </a:blip>
+          <a:stretch>
+            <a:fillRect/>
+          </a:stretch>
+        </p:blipFill>
+        <p:spPr>
+          <a:xfrm>
+            <a:off x="6878492" y="970308"/>
+            <a:ext cx="618226" cy="618226"/>
+          </a:xfrm>
+          <a:prstGeom prst="rect">
+            <a:avLst/>
+          </a:prstGeom>
+        </p:spPr>
+      </p:pic>
+      <p:pic>
+        <p:nvPicPr>
+          <p:cNvPr id="8" name="Graphic 7" descr="Database outline">
+            <a:extLst>
+              <a:ext uri="{FF2B5EF4-FFF2-40B4-BE49-F238E27FC236}">
+                <a16:creationId xmlns:a16="http://schemas.microsoft.com/office/drawing/2014/main" id="{C72B8ED9-24F6-31A4-39BB-B0C511B4EF5C}"/>
+              </a:ext>
+            </a:extLst>
+          </p:cNvPr>
+          <p:cNvPicPr>
+            <a:picLocks noChangeAspect="1"/>
+          </p:cNvPicPr>
+          <p:nvPr/>
+        </p:nvPicPr>
+        <p:blipFill>
+          <a:blip r:embed="rId4">
+            <a:extLst>
+              <a:ext uri="{28A0092B-C50C-407E-A947-70E740481C1C}">
+                <a14:useLocalDpi xmlns:a14="http://schemas.microsoft.com/office/drawing/2010/main" val="0"/>
+              </a:ext>
+              <a:ext uri="{96DAC541-7B7A-43D3-8B79-37D633B846F1}">
+                <asvg:svgBlip xmlns:asvg="http://schemas.microsoft.com/office/drawing/2016/SVG/main" r:embed="rId5"/>
+              </a:ext>
+            </a:extLst>
+          </a:blip>
+          <a:stretch>
+            <a:fillRect/>
+          </a:stretch>
+        </p:blipFill>
+        <p:spPr>
+          <a:xfrm>
+            <a:off x="3170797" y="1977431"/>
+            <a:ext cx="618226" cy="618226"/>
+          </a:xfrm>
+          <a:prstGeom prst="rect">
+            <a:avLst/>
+          </a:prstGeom>
+        </p:spPr>
+      </p:pic>
+      <p:sp>
+        <p:nvSpPr>
+          <p:cNvPr id="9" name="Oval 8">
+            <a:extLst>
+              <a:ext uri="{FF2B5EF4-FFF2-40B4-BE49-F238E27FC236}">
+                <a16:creationId xmlns:a16="http://schemas.microsoft.com/office/drawing/2014/main" id="{C66D25F2-D0EB-8A26-239E-A7155E4AB268}"/>
+              </a:ext>
+            </a:extLst>
+          </p:cNvPr>
+          <p:cNvSpPr/>
+          <p:nvPr/>
+        </p:nvSpPr>
+        <p:spPr>
+          <a:xfrm>
+            <a:off x="3299598" y="3243532"/>
+            <a:ext cx="362309" cy="370936"/>
+          </a:xfrm>
+          <a:prstGeom prst="ellipse">
+            <a:avLst/>
+          </a:prstGeom>
+          <a:solidFill>
+            <a:srgbClr val="FFFF00"/>
+          </a:solidFill>
+          <a:ln>
+            <a:solidFill>
+              <a:srgbClr val="FFC000"/>
+            </a:solidFill>
+          </a:ln>
+        </p:spPr>
+        <p:style>
+          <a:lnRef idx="2">
+            <a:schemeClr val="accent2">
+              <a:shade val="15000"/>
+            </a:schemeClr>
+          </a:lnRef>
+          <a:fillRef idx="1">
+            <a:schemeClr val="accent2"/>
+          </a:fillRef>
+          <a:effectRef idx="0">
+            <a:schemeClr val="accent2"/>
+          </a:effectRef>
+          <a:fontRef idx="minor">
+            <a:schemeClr val="lt1"/>
+          </a:fontRef>
+        </p:style>
+        <p:txBody>
+          <a:bodyPr rtlCol="0" anchor="ctr"/>
+          <a:lstStyle/>
+          <a:p>
+            <a:pPr algn="ctr"/>
+            <a:endParaRPr lang="en-CA" dirty="0"/>
+          </a:p>
+        </p:txBody>
+      </p:sp>
+      <p:sp>
+        <p:nvSpPr>
+          <p:cNvPr id="10" name="TextBox 9">
+            <a:extLst>
+              <a:ext uri="{FF2B5EF4-FFF2-40B4-BE49-F238E27FC236}">
+                <a16:creationId xmlns:a16="http://schemas.microsoft.com/office/drawing/2014/main" id="{2EA0943F-B351-42A6-78F5-8F93693A814A}"/>
+              </a:ext>
+            </a:extLst>
+          </p:cNvPr>
+          <p:cNvSpPr txBox="1"/>
+          <p:nvPr/>
+        </p:nvSpPr>
+        <p:spPr>
+          <a:xfrm>
+            <a:off x="2954204" y="3614468"/>
+            <a:ext cx="941717" cy="461665"/>
+          </a:xfrm>
+          <a:prstGeom prst="rect">
+            <a:avLst/>
+          </a:prstGeom>
+          <a:noFill/>
+        </p:spPr>
+        <p:txBody>
+          <a:bodyPr wrap="square" rtlCol="0">
+            <a:spAutoFit/>
+          </a:bodyPr>
+          <a:lstStyle/>
+          <a:p>
+            <a:pPr algn="ctr"/>
+            <a:r>
+              <a:rPr lang="en-CA" sz="1200" dirty="0"/>
+              <a:t>Input prompt</a:t>
+            </a:r>
+          </a:p>
+        </p:txBody>
+      </p:sp>
+      <p:sp>
+        <p:nvSpPr>
+          <p:cNvPr id="11" name="Diamond 10">
+            <a:extLst>
+              <a:ext uri="{FF2B5EF4-FFF2-40B4-BE49-F238E27FC236}">
+                <a16:creationId xmlns:a16="http://schemas.microsoft.com/office/drawing/2014/main" id="{908F9936-EFCC-88C6-87C4-ECA5A6FAB862}"/>
+              </a:ext>
+            </a:extLst>
+          </p:cNvPr>
+          <p:cNvSpPr/>
+          <p:nvPr/>
+        </p:nvSpPr>
+        <p:spPr>
+          <a:xfrm>
+            <a:off x="381717" y="6202606"/>
+            <a:ext cx="267419" cy="253917"/>
+          </a:xfrm>
+          <a:prstGeom prst="diamond">
+            <a:avLst/>
+          </a:prstGeom>
+        </p:spPr>
+        <p:style>
+          <a:lnRef idx="1">
+            <a:schemeClr val="accent5"/>
+          </a:lnRef>
+          <a:fillRef idx="2">
+            <a:schemeClr val="accent5"/>
+          </a:fillRef>
+          <a:effectRef idx="1">
+            <a:schemeClr val="accent5"/>
+          </a:effectRef>
+          <a:fontRef idx="minor">
+            <a:schemeClr val="dk1"/>
+          </a:fontRef>
+        </p:style>
+        <p:txBody>
+          <a:bodyPr rtlCol="0" anchor="ctr"/>
+          <a:lstStyle/>
+          <a:p>
+            <a:pPr algn="ctr"/>
+            <a:endParaRPr lang="en-CA"/>
+          </a:p>
+        </p:txBody>
+      </p:sp>
+      <p:sp>
+        <p:nvSpPr>
+          <p:cNvPr id="17" name="TextBox 16">
+            <a:extLst>
+              <a:ext uri="{FF2B5EF4-FFF2-40B4-BE49-F238E27FC236}">
+                <a16:creationId xmlns:a16="http://schemas.microsoft.com/office/drawing/2014/main" id="{B07D9BD7-3933-A831-4E31-CC96B4159E88}"/>
+              </a:ext>
+            </a:extLst>
+          </p:cNvPr>
+          <p:cNvSpPr txBox="1"/>
+          <p:nvPr/>
+        </p:nvSpPr>
+        <p:spPr>
+          <a:xfrm>
+            <a:off x="6552409" y="526336"/>
+            <a:ext cx="1321280" cy="461665"/>
+          </a:xfrm>
+          <a:prstGeom prst="rect">
+            <a:avLst/>
+          </a:prstGeom>
+          <a:noFill/>
+        </p:spPr>
+        <p:txBody>
+          <a:bodyPr wrap="square" rtlCol="0">
+            <a:spAutoFit/>
+          </a:bodyPr>
+          <a:lstStyle/>
+          <a:p>
+            <a:pPr algn="ctr"/>
+            <a:r>
+              <a:rPr lang="en-CA" sz="1200" dirty="0"/>
+              <a:t>Generic Knowledge-base</a:t>
+            </a:r>
+          </a:p>
+        </p:txBody>
+      </p:sp>
+      <p:sp>
+        <p:nvSpPr>
+          <p:cNvPr id="19" name="TextBox 18">
+            <a:extLst>
+              <a:ext uri="{FF2B5EF4-FFF2-40B4-BE49-F238E27FC236}">
+                <a16:creationId xmlns:a16="http://schemas.microsoft.com/office/drawing/2014/main" id="{E30BDC8E-1629-D442-EEE0-125BA3128E25}"/>
+              </a:ext>
+            </a:extLst>
+          </p:cNvPr>
+          <p:cNvSpPr txBox="1"/>
+          <p:nvPr/>
+        </p:nvSpPr>
+        <p:spPr>
+          <a:xfrm>
+            <a:off x="3009051" y="1446357"/>
+            <a:ext cx="941717" cy="646331"/>
+          </a:xfrm>
+          <a:prstGeom prst="rect">
+            <a:avLst/>
+          </a:prstGeom>
+          <a:noFill/>
+        </p:spPr>
+        <p:txBody>
+          <a:bodyPr wrap="square" rtlCol="0">
+            <a:spAutoFit/>
+          </a:bodyPr>
+          <a:lstStyle/>
+          <a:p>
+            <a:pPr algn="ctr"/>
+            <a:r>
+              <a:rPr lang="en-CA" sz="1200" dirty="0"/>
+              <a:t>Project specific context</a:t>
+            </a:r>
+          </a:p>
+        </p:txBody>
+      </p:sp>
+      <p:cxnSp>
+        <p:nvCxnSpPr>
+          <p:cNvPr id="20" name="Straight Arrow Connector 19">
+            <a:extLst>
+              <a:ext uri="{FF2B5EF4-FFF2-40B4-BE49-F238E27FC236}">
+                <a16:creationId xmlns:a16="http://schemas.microsoft.com/office/drawing/2014/main" id="{0B52063A-6704-4123-0C36-AE0DFACD4B12}"/>
+              </a:ext>
+            </a:extLst>
+          </p:cNvPr>
+          <p:cNvCxnSpPr>
+            <a:cxnSpLocks/>
+            <a:endCxn id="9" idx="2"/>
+          </p:cNvCxnSpPr>
+          <p:nvPr/>
+        </p:nvCxnSpPr>
+        <p:spPr>
+          <a:xfrm>
+            <a:off x="2915724" y="3429000"/>
+            <a:ext cx="383874" cy="0"/>
+          </a:xfrm>
+          <a:prstGeom prst="straightConnector1">
+            <a:avLst/>
+          </a:prstGeom>
+          <a:ln>
+            <a:tailEnd type="triangle"/>
+          </a:ln>
+        </p:spPr>
+        <p:style>
+          <a:lnRef idx="2">
+            <a:schemeClr val="accent1"/>
+          </a:lnRef>
+          <a:fillRef idx="0">
+            <a:schemeClr val="accent1"/>
+          </a:fillRef>
+          <a:effectRef idx="1">
+            <a:schemeClr val="accent1"/>
+          </a:effectRef>
+          <a:fontRef idx="minor">
+            <a:schemeClr val="tx1"/>
+          </a:fontRef>
+        </p:style>
+      </p:cxnSp>
+      <p:sp>
+        <p:nvSpPr>
+          <p:cNvPr id="23" name="TextBox 22">
+            <a:extLst>
+              <a:ext uri="{FF2B5EF4-FFF2-40B4-BE49-F238E27FC236}">
+                <a16:creationId xmlns:a16="http://schemas.microsoft.com/office/drawing/2014/main" id="{73B3FDCA-09E4-C2D8-1EAE-F5C45C01E04C}"/>
+              </a:ext>
+            </a:extLst>
+          </p:cNvPr>
+          <p:cNvSpPr txBox="1"/>
+          <p:nvPr/>
+        </p:nvSpPr>
+        <p:spPr>
+          <a:xfrm>
+            <a:off x="2101964" y="3302042"/>
+            <a:ext cx="941717" cy="276999"/>
+          </a:xfrm>
+          <a:prstGeom prst="rect">
+            <a:avLst/>
+          </a:prstGeom>
+          <a:noFill/>
+        </p:spPr>
+        <p:txBody>
+          <a:bodyPr wrap="square" rtlCol="0">
+            <a:spAutoFit/>
+          </a:bodyPr>
+          <a:lstStyle/>
+          <a:p>
+            <a:pPr algn="ctr"/>
+            <a:r>
+              <a:rPr lang="en-CA" sz="1200" dirty="0"/>
+              <a:t>Objective</a:t>
+            </a:r>
+          </a:p>
+        </p:txBody>
+      </p:sp>
+      <p:sp>
+        <p:nvSpPr>
+          <p:cNvPr id="24" name="Oval 23">
+            <a:extLst>
+              <a:ext uri="{FF2B5EF4-FFF2-40B4-BE49-F238E27FC236}">
+                <a16:creationId xmlns:a16="http://schemas.microsoft.com/office/drawing/2014/main" id="{5178E12F-11DC-6F13-93AC-9CE6156DCB16}"/>
+              </a:ext>
+            </a:extLst>
+          </p:cNvPr>
+          <p:cNvSpPr/>
+          <p:nvPr/>
+        </p:nvSpPr>
+        <p:spPr>
+          <a:xfrm>
+            <a:off x="4258229" y="3243532"/>
+            <a:ext cx="362309" cy="370936"/>
+          </a:xfrm>
+          <a:prstGeom prst="ellipse">
+            <a:avLst/>
+          </a:prstGeom>
+        </p:spPr>
+        <p:style>
+          <a:lnRef idx="2">
+            <a:schemeClr val="accent1">
+              <a:shade val="15000"/>
+            </a:schemeClr>
+          </a:lnRef>
+          <a:fillRef idx="1">
+            <a:schemeClr val="accent1"/>
+          </a:fillRef>
+          <a:effectRef idx="0">
+            <a:schemeClr val="accent1"/>
+          </a:effectRef>
+          <a:fontRef idx="minor">
+            <a:schemeClr val="lt1"/>
+          </a:fontRef>
+        </p:style>
+        <p:txBody>
+          <a:bodyPr rtlCol="0" anchor="ctr"/>
+          <a:lstStyle/>
+          <a:p>
+            <a:pPr algn="ctr"/>
+            <a:endParaRPr lang="en-CA"/>
+          </a:p>
+        </p:txBody>
+      </p:sp>
+      <p:cxnSp>
+        <p:nvCxnSpPr>
+          <p:cNvPr id="25" name="Straight Arrow Connector 24">
+            <a:extLst>
+              <a:ext uri="{FF2B5EF4-FFF2-40B4-BE49-F238E27FC236}">
+                <a16:creationId xmlns:a16="http://schemas.microsoft.com/office/drawing/2014/main" id="{E646251F-54B7-C4D5-F40B-174FFE23C6A1}"/>
+              </a:ext>
+            </a:extLst>
+          </p:cNvPr>
+          <p:cNvCxnSpPr>
+            <a:cxnSpLocks/>
+            <a:stCxn id="9" idx="6"/>
+            <a:endCxn id="24" idx="2"/>
+          </p:cNvCxnSpPr>
+          <p:nvPr/>
+        </p:nvCxnSpPr>
+        <p:spPr>
+          <a:xfrm>
+            <a:off x="3661907" y="3429000"/>
+            <a:ext cx="596322" cy="0"/>
+          </a:xfrm>
+          <a:prstGeom prst="straightConnector1">
+            <a:avLst/>
+          </a:prstGeom>
+          <a:ln>
+            <a:tailEnd type="triangle"/>
+          </a:ln>
+        </p:spPr>
+        <p:style>
+          <a:lnRef idx="2">
+            <a:schemeClr val="accent1"/>
+          </a:lnRef>
+          <a:fillRef idx="0">
+            <a:schemeClr val="accent1"/>
+          </a:fillRef>
+          <a:effectRef idx="1">
+            <a:schemeClr val="accent1"/>
+          </a:effectRef>
+          <a:fontRef idx="minor">
+            <a:schemeClr val="tx1"/>
+          </a:fontRef>
+        </p:style>
+      </p:cxnSp>
+      <p:sp>
+        <p:nvSpPr>
+          <p:cNvPr id="29" name="TextBox 28">
+            <a:extLst>
+              <a:ext uri="{FF2B5EF4-FFF2-40B4-BE49-F238E27FC236}">
+                <a16:creationId xmlns:a16="http://schemas.microsoft.com/office/drawing/2014/main" id="{6479010A-4A4B-F713-A765-5AD753FFD1C3}"/>
+              </a:ext>
+            </a:extLst>
+          </p:cNvPr>
+          <p:cNvSpPr txBox="1"/>
+          <p:nvPr/>
+        </p:nvSpPr>
+        <p:spPr>
+          <a:xfrm>
+            <a:off x="3917824" y="3609447"/>
+            <a:ext cx="1022227" cy="830997"/>
+          </a:xfrm>
+          <a:prstGeom prst="rect">
+            <a:avLst/>
+          </a:prstGeom>
+          <a:noFill/>
+        </p:spPr>
+        <p:txBody>
+          <a:bodyPr wrap="square" rtlCol="0">
+            <a:spAutoFit/>
+          </a:bodyPr>
+          <a:lstStyle/>
+          <a:p>
+            <a:pPr algn="ctr"/>
+            <a:r>
+              <a:rPr lang="en-CA" sz="1200" dirty="0"/>
+              <a:t>Generate literature review questions</a:t>
+            </a:r>
+          </a:p>
+        </p:txBody>
+      </p:sp>
+      <p:sp>
+        <p:nvSpPr>
+          <p:cNvPr id="31" name="Rectangle 30">
+            <a:extLst>
+              <a:ext uri="{FF2B5EF4-FFF2-40B4-BE49-F238E27FC236}">
+                <a16:creationId xmlns:a16="http://schemas.microsoft.com/office/drawing/2014/main" id="{A7631CBF-E114-EB31-6FB1-020DE8AA0B6D}"/>
+              </a:ext>
+            </a:extLst>
+          </p:cNvPr>
+          <p:cNvSpPr/>
+          <p:nvPr/>
+        </p:nvSpPr>
+        <p:spPr>
+          <a:xfrm>
+            <a:off x="5251802" y="2667000"/>
+            <a:ext cx="3961247" cy="1614488"/>
+          </a:xfrm>
+          <a:prstGeom prst="rect">
+            <a:avLst/>
+          </a:prstGeom>
+          <a:ln>
+            <a:prstDash val="sysDash"/>
+          </a:ln>
+        </p:spPr>
+        <p:style>
+          <a:lnRef idx="2">
+            <a:schemeClr val="dk1"/>
+          </a:lnRef>
+          <a:fillRef idx="1">
+            <a:schemeClr val="lt1"/>
+          </a:fillRef>
+          <a:effectRef idx="0">
+            <a:schemeClr val="dk1"/>
+          </a:effectRef>
+          <a:fontRef idx="minor">
+            <a:schemeClr val="dk1"/>
+          </a:fontRef>
+        </p:style>
+        <p:txBody>
+          <a:bodyPr rtlCol="0" anchor="ctr"/>
+          <a:lstStyle/>
+          <a:p>
+            <a:pPr algn="ctr"/>
+            <a:endParaRPr lang="en-CA"/>
+          </a:p>
+        </p:txBody>
+      </p:sp>
+      <p:sp>
+        <p:nvSpPr>
+          <p:cNvPr id="37" name="TextBox 36">
+            <a:extLst>
+              <a:ext uri="{FF2B5EF4-FFF2-40B4-BE49-F238E27FC236}">
+                <a16:creationId xmlns:a16="http://schemas.microsoft.com/office/drawing/2014/main" id="{9DD61443-34FA-0DA6-FC41-29C5D9673726}"/>
+              </a:ext>
+            </a:extLst>
+          </p:cNvPr>
+          <p:cNvSpPr txBox="1"/>
+          <p:nvPr/>
+        </p:nvSpPr>
+        <p:spPr>
+          <a:xfrm>
+            <a:off x="6319310" y="4320623"/>
+            <a:ext cx="2290763" cy="461665"/>
+          </a:xfrm>
+          <a:prstGeom prst="rect">
+            <a:avLst/>
+          </a:prstGeom>
+          <a:noFill/>
+        </p:spPr>
+        <p:txBody>
+          <a:bodyPr wrap="square" rtlCol="0">
+            <a:spAutoFit/>
+          </a:bodyPr>
+          <a:lstStyle/>
+          <a:p>
+            <a:pPr algn="ctr"/>
+            <a:r>
+              <a:rPr lang="en-CA" sz="1200" dirty="0"/>
+              <a:t>Augmenting the requirements with more knowledge</a:t>
+            </a:r>
+          </a:p>
+        </p:txBody>
+      </p:sp>
+      <p:pic>
+        <p:nvPicPr>
+          <p:cNvPr id="40" name="Graphic 39" descr="Internet Of Things outline">
+            <a:extLst>
+              <a:ext uri="{FF2B5EF4-FFF2-40B4-BE49-F238E27FC236}">
+                <a16:creationId xmlns:a16="http://schemas.microsoft.com/office/drawing/2014/main" id="{648270A1-0D83-89B3-B3A3-DBB57A505603}"/>
+              </a:ext>
+            </a:extLst>
+          </p:cNvPr>
+          <p:cNvPicPr>
+            <a:picLocks noChangeAspect="1"/>
+          </p:cNvPicPr>
+          <p:nvPr/>
+        </p:nvPicPr>
+        <p:blipFill>
+          <a:blip r:embed="rId6">
+            <a:extLst>
+              <a:ext uri="{28A0092B-C50C-407E-A947-70E740481C1C}">
+                <a14:useLocalDpi xmlns:a14="http://schemas.microsoft.com/office/drawing/2010/main" val="0"/>
+              </a:ext>
+              <a:ext uri="{96DAC541-7B7A-43D3-8B79-37D633B846F1}">
+                <asvg:svgBlip xmlns:asvg="http://schemas.microsoft.com/office/drawing/2016/SVG/main" r:embed="rId7"/>
+              </a:ext>
+            </a:extLst>
+          </a:blip>
+          <a:stretch>
+            <a:fillRect/>
+          </a:stretch>
+        </p:blipFill>
+        <p:spPr>
+          <a:xfrm>
+            <a:off x="8238113" y="989548"/>
+            <a:ext cx="618226" cy="618226"/>
+          </a:xfrm>
+          <a:prstGeom prst="rect">
+            <a:avLst/>
+          </a:prstGeom>
+        </p:spPr>
+      </p:pic>
+      <p:sp>
+        <p:nvSpPr>
+          <p:cNvPr id="41" name="TextBox 40">
+            <a:extLst>
+              <a:ext uri="{FF2B5EF4-FFF2-40B4-BE49-F238E27FC236}">
+                <a16:creationId xmlns:a16="http://schemas.microsoft.com/office/drawing/2014/main" id="{A1635085-F802-EF3B-791A-69A10C04ECAD}"/>
+              </a:ext>
+            </a:extLst>
+          </p:cNvPr>
+          <p:cNvSpPr txBox="1"/>
+          <p:nvPr/>
+        </p:nvSpPr>
+        <p:spPr>
+          <a:xfrm>
+            <a:off x="7877086" y="693930"/>
+            <a:ext cx="1321280" cy="276999"/>
+          </a:xfrm>
+          <a:prstGeom prst="rect">
+            <a:avLst/>
+          </a:prstGeom>
+          <a:noFill/>
+        </p:spPr>
+        <p:txBody>
+          <a:bodyPr wrap="square" rtlCol="0">
+            <a:spAutoFit/>
+          </a:bodyPr>
+          <a:lstStyle/>
+          <a:p>
+            <a:pPr algn="ctr"/>
+            <a:r>
+              <a:rPr lang="en-CA" sz="1200" dirty="0"/>
+              <a:t>Internet search</a:t>
+            </a:r>
+          </a:p>
+        </p:txBody>
+      </p:sp>
+      <p:sp>
+        <p:nvSpPr>
+          <p:cNvPr id="42" name="Oval 41">
+            <a:extLst>
+              <a:ext uri="{FF2B5EF4-FFF2-40B4-BE49-F238E27FC236}">
+                <a16:creationId xmlns:a16="http://schemas.microsoft.com/office/drawing/2014/main" id="{1D272201-1478-F78D-1689-64CFC692BEFA}"/>
+              </a:ext>
+            </a:extLst>
+          </p:cNvPr>
+          <p:cNvSpPr/>
+          <p:nvPr/>
+        </p:nvSpPr>
+        <p:spPr>
+          <a:xfrm>
+            <a:off x="6173672" y="3243532"/>
+            <a:ext cx="362309" cy="370936"/>
+          </a:xfrm>
+          <a:prstGeom prst="ellipse">
+            <a:avLst/>
+          </a:prstGeom>
+        </p:spPr>
+        <p:style>
+          <a:lnRef idx="2">
+            <a:schemeClr val="accent1">
+              <a:shade val="15000"/>
+            </a:schemeClr>
+          </a:lnRef>
+          <a:fillRef idx="1">
+            <a:schemeClr val="accent1"/>
+          </a:fillRef>
+          <a:effectRef idx="0">
+            <a:schemeClr val="accent1"/>
+          </a:effectRef>
+          <a:fontRef idx="minor">
+            <a:schemeClr val="lt1"/>
+          </a:fontRef>
+        </p:style>
+        <p:txBody>
+          <a:bodyPr rtlCol="0" anchor="ctr"/>
+          <a:lstStyle/>
+          <a:p>
+            <a:pPr algn="ctr"/>
+            <a:endParaRPr lang="en-CA"/>
+          </a:p>
+        </p:txBody>
+      </p:sp>
+      <p:sp>
+        <p:nvSpPr>
+          <p:cNvPr id="43" name="Oval 42">
+            <a:extLst>
+              <a:ext uri="{FF2B5EF4-FFF2-40B4-BE49-F238E27FC236}">
+                <a16:creationId xmlns:a16="http://schemas.microsoft.com/office/drawing/2014/main" id="{28C4886B-A097-DB45-95E5-5716F729823D}"/>
+              </a:ext>
+            </a:extLst>
+          </p:cNvPr>
+          <p:cNvSpPr/>
+          <p:nvPr/>
+        </p:nvSpPr>
+        <p:spPr>
+          <a:xfrm>
+            <a:off x="6891061" y="3248569"/>
+            <a:ext cx="362309" cy="370936"/>
+          </a:xfrm>
+          <a:prstGeom prst="ellipse">
+            <a:avLst/>
+          </a:prstGeom>
+        </p:spPr>
+        <p:style>
+          <a:lnRef idx="2">
+            <a:schemeClr val="accent1">
+              <a:shade val="15000"/>
+            </a:schemeClr>
+          </a:lnRef>
+          <a:fillRef idx="1">
+            <a:schemeClr val="accent1"/>
+          </a:fillRef>
+          <a:effectRef idx="0">
+            <a:schemeClr val="accent1"/>
+          </a:effectRef>
+          <a:fontRef idx="minor">
+            <a:schemeClr val="lt1"/>
+          </a:fontRef>
+        </p:style>
+        <p:txBody>
+          <a:bodyPr rtlCol="0" anchor="ctr"/>
+          <a:lstStyle/>
+          <a:p>
+            <a:pPr algn="ctr"/>
+            <a:endParaRPr lang="en-CA"/>
+          </a:p>
+        </p:txBody>
+      </p:sp>
+      <p:sp>
+        <p:nvSpPr>
+          <p:cNvPr id="44" name="Oval 43">
+            <a:extLst>
+              <a:ext uri="{FF2B5EF4-FFF2-40B4-BE49-F238E27FC236}">
+                <a16:creationId xmlns:a16="http://schemas.microsoft.com/office/drawing/2014/main" id="{98D5D6D5-7638-D4FD-7452-F254A7FAFAE2}"/>
+              </a:ext>
+            </a:extLst>
+          </p:cNvPr>
+          <p:cNvSpPr/>
+          <p:nvPr/>
+        </p:nvSpPr>
+        <p:spPr>
+          <a:xfrm>
+            <a:off x="8428919" y="2877633"/>
+            <a:ext cx="362309" cy="370936"/>
+          </a:xfrm>
+          <a:prstGeom prst="ellipse">
+            <a:avLst/>
+          </a:prstGeom>
+        </p:spPr>
+        <p:style>
+          <a:lnRef idx="2">
+            <a:schemeClr val="accent1">
+              <a:shade val="15000"/>
+            </a:schemeClr>
+          </a:lnRef>
+          <a:fillRef idx="1">
+            <a:schemeClr val="accent1"/>
+          </a:fillRef>
+          <a:effectRef idx="0">
+            <a:schemeClr val="accent1"/>
+          </a:effectRef>
+          <a:fontRef idx="minor">
+            <a:schemeClr val="lt1"/>
+          </a:fontRef>
+        </p:style>
+        <p:txBody>
+          <a:bodyPr rtlCol="0" anchor="ctr"/>
+          <a:lstStyle/>
+          <a:p>
+            <a:pPr algn="ctr"/>
+            <a:endParaRPr lang="en-CA"/>
+          </a:p>
+        </p:txBody>
+      </p:sp>
+      <p:cxnSp>
+        <p:nvCxnSpPr>
+          <p:cNvPr id="50" name="Straight Arrow Connector 49">
+            <a:extLst>
+              <a:ext uri="{FF2B5EF4-FFF2-40B4-BE49-F238E27FC236}">
+                <a16:creationId xmlns:a16="http://schemas.microsoft.com/office/drawing/2014/main" id="{6C8B0291-816F-E506-556E-561F86737079}"/>
+              </a:ext>
+            </a:extLst>
+          </p:cNvPr>
+          <p:cNvCxnSpPr>
+            <a:cxnSpLocks/>
+            <a:stCxn id="24" idx="6"/>
+            <a:endCxn id="35" idx="2"/>
+          </p:cNvCxnSpPr>
+          <p:nvPr/>
+        </p:nvCxnSpPr>
+        <p:spPr>
+          <a:xfrm>
+            <a:off x="4620538" y="3429000"/>
+            <a:ext cx="851173" cy="5037"/>
+          </a:xfrm>
+          <a:prstGeom prst="straightConnector1">
+            <a:avLst/>
+          </a:prstGeom>
+          <a:ln>
+            <a:tailEnd type="triangle"/>
+          </a:ln>
+        </p:spPr>
+        <p:style>
+          <a:lnRef idx="2">
+            <a:schemeClr val="accent1"/>
+          </a:lnRef>
+          <a:fillRef idx="0">
+            <a:schemeClr val="accent1"/>
+          </a:fillRef>
+          <a:effectRef idx="1">
+            <a:schemeClr val="accent1"/>
+          </a:effectRef>
+          <a:fontRef idx="minor">
+            <a:schemeClr val="tx1"/>
+          </a:fontRef>
+        </p:style>
+      </p:cxnSp>
+      <p:sp>
+        <p:nvSpPr>
+          <p:cNvPr id="51" name="TextBox 50">
+            <a:extLst>
+              <a:ext uri="{FF2B5EF4-FFF2-40B4-BE49-F238E27FC236}">
+                <a16:creationId xmlns:a16="http://schemas.microsoft.com/office/drawing/2014/main" id="{9C864CD8-7017-44D7-6DA2-6018CD7F51B6}"/>
+              </a:ext>
+            </a:extLst>
+          </p:cNvPr>
+          <p:cNvSpPr txBox="1"/>
+          <p:nvPr/>
+        </p:nvSpPr>
+        <p:spPr>
+          <a:xfrm>
+            <a:off x="5853830" y="3619061"/>
+            <a:ext cx="1022227" cy="276999"/>
+          </a:xfrm>
+          <a:prstGeom prst="rect">
+            <a:avLst/>
+          </a:prstGeom>
+          <a:noFill/>
+        </p:spPr>
+        <p:txBody>
+          <a:bodyPr wrap="square" rtlCol="0">
+            <a:spAutoFit/>
+          </a:bodyPr>
+          <a:lstStyle/>
+          <a:p>
+            <a:pPr algn="ctr"/>
+            <a:r>
+              <a:rPr lang="en-CA" sz="1200" dirty="0"/>
+              <a:t>RAG</a:t>
+            </a:r>
+          </a:p>
+        </p:txBody>
+      </p:sp>
+      <p:sp>
+        <p:nvSpPr>
+          <p:cNvPr id="52" name="TextBox 51">
+            <a:extLst>
+              <a:ext uri="{FF2B5EF4-FFF2-40B4-BE49-F238E27FC236}">
+                <a16:creationId xmlns:a16="http://schemas.microsoft.com/office/drawing/2014/main" id="{58CB7EDF-1973-1863-AC47-8A0361FB19F6}"/>
+              </a:ext>
+            </a:extLst>
+          </p:cNvPr>
+          <p:cNvSpPr txBox="1"/>
+          <p:nvPr/>
+        </p:nvSpPr>
+        <p:spPr>
+          <a:xfrm>
+            <a:off x="6561101" y="3624098"/>
+            <a:ext cx="1022227" cy="276999"/>
+          </a:xfrm>
+          <a:prstGeom prst="rect">
+            <a:avLst/>
+          </a:prstGeom>
+          <a:noFill/>
+        </p:spPr>
+        <p:txBody>
+          <a:bodyPr wrap="square" rtlCol="0">
+            <a:spAutoFit/>
+          </a:bodyPr>
+          <a:lstStyle/>
+          <a:p>
+            <a:pPr algn="ctr"/>
+            <a:r>
+              <a:rPr lang="en-CA" sz="1200" dirty="0"/>
+              <a:t>Evaluator</a:t>
+            </a:r>
+          </a:p>
+        </p:txBody>
+      </p:sp>
+      <p:cxnSp>
+        <p:nvCxnSpPr>
+          <p:cNvPr id="54" name="Straight Arrow Connector 53">
+            <a:extLst>
+              <a:ext uri="{FF2B5EF4-FFF2-40B4-BE49-F238E27FC236}">
+                <a16:creationId xmlns:a16="http://schemas.microsoft.com/office/drawing/2014/main" id="{93D5DF48-025F-0514-2737-8816372E9EBF}"/>
+              </a:ext>
+            </a:extLst>
+          </p:cNvPr>
+          <p:cNvCxnSpPr>
+            <a:stCxn id="42" idx="6"/>
+            <a:endCxn id="43" idx="2"/>
+          </p:cNvCxnSpPr>
+          <p:nvPr/>
+        </p:nvCxnSpPr>
+        <p:spPr>
+          <a:xfrm>
+            <a:off x="6535981" y="3429000"/>
+            <a:ext cx="355080" cy="5037"/>
+          </a:xfrm>
+          <a:prstGeom prst="straightConnector1">
+            <a:avLst/>
+          </a:prstGeom>
+          <a:ln>
+            <a:tailEnd type="triangle"/>
+          </a:ln>
+        </p:spPr>
+        <p:style>
+          <a:lnRef idx="2">
+            <a:schemeClr val="accent1"/>
+          </a:lnRef>
+          <a:fillRef idx="0">
+            <a:schemeClr val="accent1"/>
+          </a:fillRef>
+          <a:effectRef idx="1">
+            <a:schemeClr val="accent1"/>
+          </a:effectRef>
+          <a:fontRef idx="minor">
+            <a:schemeClr val="tx1"/>
+          </a:fontRef>
+        </p:style>
+      </p:cxnSp>
+      <p:sp>
+        <p:nvSpPr>
+          <p:cNvPr id="57" name="Diamond 56">
+            <a:extLst>
+              <a:ext uri="{FF2B5EF4-FFF2-40B4-BE49-F238E27FC236}">
+                <a16:creationId xmlns:a16="http://schemas.microsoft.com/office/drawing/2014/main" id="{0C4ADE68-66C5-2F3F-EC4D-D855CC2B4BB2}"/>
+              </a:ext>
+            </a:extLst>
+          </p:cNvPr>
+          <p:cNvSpPr/>
+          <p:nvPr/>
+        </p:nvSpPr>
+        <p:spPr>
+          <a:xfrm>
+            <a:off x="7707435" y="3309658"/>
+            <a:ext cx="267419" cy="253917"/>
+          </a:xfrm>
+          <a:prstGeom prst="diamond">
+            <a:avLst/>
+          </a:prstGeom>
+        </p:spPr>
+        <p:style>
+          <a:lnRef idx="1">
+            <a:schemeClr val="accent5"/>
+          </a:lnRef>
+          <a:fillRef idx="2">
+            <a:schemeClr val="accent5"/>
+          </a:fillRef>
+          <a:effectRef idx="1">
+            <a:schemeClr val="accent5"/>
+          </a:effectRef>
+          <a:fontRef idx="minor">
+            <a:schemeClr val="dk1"/>
+          </a:fontRef>
+        </p:style>
+        <p:txBody>
+          <a:bodyPr rtlCol="0" anchor="ctr"/>
+          <a:lstStyle/>
+          <a:p>
+            <a:pPr algn="ctr"/>
+            <a:endParaRPr lang="en-CA"/>
+          </a:p>
+        </p:txBody>
+      </p:sp>
+      <p:cxnSp>
+        <p:nvCxnSpPr>
+          <p:cNvPr id="61" name="Straight Arrow Connector 60">
+            <a:extLst>
+              <a:ext uri="{FF2B5EF4-FFF2-40B4-BE49-F238E27FC236}">
+                <a16:creationId xmlns:a16="http://schemas.microsoft.com/office/drawing/2014/main" id="{26AB39C8-EEAF-7156-34A1-B67846B0EDBA}"/>
+              </a:ext>
+            </a:extLst>
+          </p:cNvPr>
+          <p:cNvCxnSpPr>
+            <a:stCxn id="43" idx="6"/>
+            <a:endCxn id="57" idx="1"/>
+          </p:cNvCxnSpPr>
+          <p:nvPr/>
+        </p:nvCxnSpPr>
+        <p:spPr>
+          <a:xfrm>
+            <a:off x="7253370" y="3434037"/>
+            <a:ext cx="454065" cy="2580"/>
+          </a:xfrm>
+          <a:prstGeom prst="straightConnector1">
+            <a:avLst/>
+          </a:prstGeom>
+          <a:ln>
+            <a:tailEnd type="triangle"/>
+          </a:ln>
+        </p:spPr>
+        <p:style>
+          <a:lnRef idx="2">
+            <a:schemeClr val="accent1"/>
+          </a:lnRef>
+          <a:fillRef idx="0">
+            <a:schemeClr val="accent1"/>
+          </a:fillRef>
+          <a:effectRef idx="1">
+            <a:schemeClr val="accent1"/>
+          </a:effectRef>
+          <a:fontRef idx="minor">
+            <a:schemeClr val="tx1"/>
+          </a:fontRef>
+        </p:style>
+      </p:cxnSp>
+      <p:cxnSp>
+        <p:nvCxnSpPr>
+          <p:cNvPr id="65" name="Connector: Elbow 64">
+            <a:extLst>
+              <a:ext uri="{FF2B5EF4-FFF2-40B4-BE49-F238E27FC236}">
+                <a16:creationId xmlns:a16="http://schemas.microsoft.com/office/drawing/2014/main" id="{FE7144D1-F3BD-1D62-8030-79228BD4A1F6}"/>
+              </a:ext>
+            </a:extLst>
+          </p:cNvPr>
+          <p:cNvCxnSpPr>
+            <a:stCxn id="57" idx="0"/>
+            <a:endCxn id="44" idx="2"/>
+          </p:cNvCxnSpPr>
+          <p:nvPr/>
+        </p:nvCxnSpPr>
+        <p:spPr>
+          <a:xfrm rot="5400000" flipH="1" flipV="1">
+            <a:off x="8011754" y="2892493"/>
+            <a:ext cx="246557" cy="587774"/>
+          </a:xfrm>
+          <a:prstGeom prst="bentConnector2">
+            <a:avLst/>
+          </a:prstGeom>
+          <a:ln>
+            <a:tailEnd type="triangle"/>
+          </a:ln>
+        </p:spPr>
+        <p:style>
+          <a:lnRef idx="2">
+            <a:schemeClr val="accent1"/>
+          </a:lnRef>
+          <a:fillRef idx="0">
+            <a:schemeClr val="accent1"/>
+          </a:fillRef>
+          <a:effectRef idx="1">
+            <a:schemeClr val="accent1"/>
+          </a:effectRef>
+          <a:fontRef idx="minor">
+            <a:schemeClr val="tx1"/>
+          </a:fontRef>
+        </p:style>
+      </p:cxnSp>
+      <p:sp>
+        <p:nvSpPr>
+          <p:cNvPr id="68" name="TextBox 67">
+            <a:extLst>
+              <a:ext uri="{FF2B5EF4-FFF2-40B4-BE49-F238E27FC236}">
+                <a16:creationId xmlns:a16="http://schemas.microsoft.com/office/drawing/2014/main" id="{32151224-5FFA-131B-4E55-2EF58798F8E3}"/>
+              </a:ext>
+            </a:extLst>
+          </p:cNvPr>
+          <p:cNvSpPr txBox="1"/>
+          <p:nvPr/>
+        </p:nvSpPr>
+        <p:spPr>
+          <a:xfrm>
+            <a:off x="8098960" y="3186495"/>
+            <a:ext cx="1022227" cy="276999"/>
+          </a:xfrm>
+          <a:prstGeom prst="rect">
+            <a:avLst/>
+          </a:prstGeom>
+          <a:noFill/>
+        </p:spPr>
+        <p:txBody>
+          <a:bodyPr wrap="square" rtlCol="0">
+            <a:spAutoFit/>
+          </a:bodyPr>
+          <a:lstStyle/>
+          <a:p>
+            <a:pPr algn="ctr"/>
+            <a:r>
+              <a:rPr lang="en-CA" sz="1200" dirty="0"/>
+              <a:t>Web search</a:t>
+            </a:r>
+          </a:p>
+        </p:txBody>
+      </p:sp>
+      <p:cxnSp>
+        <p:nvCxnSpPr>
+          <p:cNvPr id="93" name="Connector: Elbow 92">
+            <a:extLst>
+              <a:ext uri="{FF2B5EF4-FFF2-40B4-BE49-F238E27FC236}">
+                <a16:creationId xmlns:a16="http://schemas.microsoft.com/office/drawing/2014/main" id="{9089C421-0CFD-2AC1-4F6D-95D71F7CC4B5}"/>
+              </a:ext>
+            </a:extLst>
+          </p:cNvPr>
+          <p:cNvCxnSpPr>
+            <a:cxnSpLocks/>
+            <a:stCxn id="44" idx="6"/>
+            <a:endCxn id="43" idx="0"/>
+          </p:cNvCxnSpPr>
+          <p:nvPr/>
+        </p:nvCxnSpPr>
+        <p:spPr>
+          <a:xfrm flipH="1">
+            <a:off x="7072216" y="3063101"/>
+            <a:ext cx="1719012" cy="185468"/>
+          </a:xfrm>
+          <a:prstGeom prst="bentConnector4">
+            <a:avLst>
+              <a:gd name="adj1" fmla="val -13298"/>
+              <a:gd name="adj2" fmla="val -158139"/>
+            </a:avLst>
+          </a:prstGeom>
+          <a:ln>
+            <a:tailEnd type="triangle"/>
+          </a:ln>
+        </p:spPr>
+        <p:style>
+          <a:lnRef idx="2">
+            <a:schemeClr val="accent1"/>
+          </a:lnRef>
+          <a:fillRef idx="0">
+            <a:schemeClr val="accent1"/>
+          </a:fillRef>
+          <a:effectRef idx="1">
+            <a:schemeClr val="accent1"/>
+          </a:effectRef>
+          <a:fontRef idx="minor">
+            <a:schemeClr val="tx1"/>
+          </a:fontRef>
+        </p:style>
+      </p:cxnSp>
+      <p:sp>
+        <p:nvSpPr>
+          <p:cNvPr id="141" name="Oval 140">
+            <a:extLst>
+              <a:ext uri="{FF2B5EF4-FFF2-40B4-BE49-F238E27FC236}">
+                <a16:creationId xmlns:a16="http://schemas.microsoft.com/office/drawing/2014/main" id="{1786C034-5956-D40F-FAED-065932303AB9}"/>
+              </a:ext>
+            </a:extLst>
+          </p:cNvPr>
+          <p:cNvSpPr/>
+          <p:nvPr/>
+        </p:nvSpPr>
+        <p:spPr>
+          <a:xfrm>
+            <a:off x="9663158" y="3579041"/>
+            <a:ext cx="362309" cy="370936"/>
+          </a:xfrm>
+          <a:prstGeom prst="ellipse">
+            <a:avLst/>
+          </a:prstGeom>
+          <a:solidFill>
+            <a:srgbClr val="FFFF00"/>
+          </a:solidFill>
+          <a:ln>
+            <a:solidFill>
+              <a:srgbClr val="FFC000"/>
+            </a:solidFill>
+          </a:ln>
+        </p:spPr>
+        <p:style>
+          <a:lnRef idx="2">
+            <a:schemeClr val="accent2">
+              <a:shade val="15000"/>
+            </a:schemeClr>
+          </a:lnRef>
+          <a:fillRef idx="1">
+            <a:schemeClr val="accent2"/>
+          </a:fillRef>
+          <a:effectRef idx="0">
+            <a:schemeClr val="accent2"/>
+          </a:effectRef>
+          <a:fontRef idx="minor">
+            <a:schemeClr val="lt1"/>
+          </a:fontRef>
+        </p:style>
+        <p:txBody>
+          <a:bodyPr rtlCol="0" anchor="ctr"/>
+          <a:lstStyle/>
+          <a:p>
+            <a:pPr algn="ctr"/>
+            <a:endParaRPr lang="en-CA" dirty="0"/>
+          </a:p>
+        </p:txBody>
+      </p:sp>
+      <p:sp>
+        <p:nvSpPr>
+          <p:cNvPr id="142" name="TextBox 141">
+            <a:extLst>
+              <a:ext uri="{FF2B5EF4-FFF2-40B4-BE49-F238E27FC236}">
+                <a16:creationId xmlns:a16="http://schemas.microsoft.com/office/drawing/2014/main" id="{095A5798-74DA-A90D-F202-9B1089374FA3}"/>
+              </a:ext>
+            </a:extLst>
+          </p:cNvPr>
+          <p:cNvSpPr txBox="1"/>
+          <p:nvPr/>
+        </p:nvSpPr>
+        <p:spPr>
+          <a:xfrm>
+            <a:off x="9367100" y="3945049"/>
+            <a:ext cx="941717" cy="276999"/>
+          </a:xfrm>
+          <a:prstGeom prst="rect">
+            <a:avLst/>
+          </a:prstGeom>
+          <a:noFill/>
+        </p:spPr>
+        <p:txBody>
+          <a:bodyPr wrap="square" rtlCol="0">
+            <a:spAutoFit/>
+          </a:bodyPr>
+          <a:lstStyle/>
+          <a:p>
+            <a:pPr algn="ctr"/>
+            <a:r>
+              <a:rPr lang="en-CA" sz="1200" dirty="0"/>
+              <a:t>To file</a:t>
+            </a:r>
+          </a:p>
+        </p:txBody>
+      </p:sp>
+      <p:sp>
+        <p:nvSpPr>
+          <p:cNvPr id="181" name="TextBox 180">
+            <a:extLst>
+              <a:ext uri="{FF2B5EF4-FFF2-40B4-BE49-F238E27FC236}">
+                <a16:creationId xmlns:a16="http://schemas.microsoft.com/office/drawing/2014/main" id="{3C409BA8-5B9A-40B5-A6F6-966FF9A9C1E1}"/>
+              </a:ext>
+            </a:extLst>
+          </p:cNvPr>
+          <p:cNvSpPr txBox="1"/>
+          <p:nvPr/>
+        </p:nvSpPr>
+        <p:spPr>
+          <a:xfrm>
+            <a:off x="558555" y="6199287"/>
+            <a:ext cx="1407542" cy="276999"/>
+          </a:xfrm>
+          <a:prstGeom prst="rect">
+            <a:avLst/>
+          </a:prstGeom>
+          <a:noFill/>
+        </p:spPr>
+        <p:txBody>
+          <a:bodyPr wrap="square" rtlCol="0">
+            <a:spAutoFit/>
+          </a:bodyPr>
+          <a:lstStyle/>
+          <a:p>
+            <a:pPr algn="ctr"/>
+            <a:r>
+              <a:rPr lang="en-CA" sz="1200" dirty="0"/>
+              <a:t>Decision junction</a:t>
+            </a:r>
+          </a:p>
+        </p:txBody>
+      </p:sp>
+      <p:sp>
+        <p:nvSpPr>
+          <p:cNvPr id="182" name="TextBox 181">
+            <a:extLst>
+              <a:ext uri="{FF2B5EF4-FFF2-40B4-BE49-F238E27FC236}">
+                <a16:creationId xmlns:a16="http://schemas.microsoft.com/office/drawing/2014/main" id="{83CB147D-F902-CBF4-67AB-7E2119792F6F}"/>
+              </a:ext>
+            </a:extLst>
+          </p:cNvPr>
+          <p:cNvSpPr txBox="1"/>
+          <p:nvPr/>
+        </p:nvSpPr>
+        <p:spPr>
+          <a:xfrm>
+            <a:off x="629663" y="5296082"/>
+            <a:ext cx="1470852" cy="276999"/>
+          </a:xfrm>
+          <a:prstGeom prst="rect">
+            <a:avLst/>
+          </a:prstGeom>
+          <a:noFill/>
+        </p:spPr>
+        <p:txBody>
+          <a:bodyPr wrap="square" rtlCol="0">
+            <a:spAutoFit/>
+          </a:bodyPr>
+          <a:lstStyle/>
+          <a:p>
+            <a:pPr algn="ctr"/>
+            <a:r>
+              <a:rPr lang="en-CA" sz="1200" dirty="0"/>
+              <a:t>Input/ Output node</a:t>
+            </a:r>
+          </a:p>
+        </p:txBody>
+      </p:sp>
+      <p:sp>
+        <p:nvSpPr>
+          <p:cNvPr id="183" name="TextBox 182">
+            <a:extLst>
+              <a:ext uri="{FF2B5EF4-FFF2-40B4-BE49-F238E27FC236}">
+                <a16:creationId xmlns:a16="http://schemas.microsoft.com/office/drawing/2014/main" id="{1A3F73B2-CAA6-B09C-A9B5-9788FF286FD3}"/>
+              </a:ext>
+            </a:extLst>
+          </p:cNvPr>
+          <p:cNvSpPr txBox="1"/>
+          <p:nvPr/>
+        </p:nvSpPr>
+        <p:spPr>
+          <a:xfrm>
+            <a:off x="638096" y="4818822"/>
+            <a:ext cx="896362" cy="276999"/>
+          </a:xfrm>
+          <a:prstGeom prst="rect">
+            <a:avLst/>
+          </a:prstGeom>
+          <a:noFill/>
+        </p:spPr>
+        <p:txBody>
+          <a:bodyPr wrap="square" rtlCol="0">
+            <a:spAutoFit/>
+          </a:bodyPr>
+          <a:lstStyle/>
+          <a:p>
+            <a:pPr algn="ctr"/>
+            <a:r>
+              <a:rPr lang="en-CA" sz="1200" dirty="0"/>
+              <a:t>LLM node</a:t>
+            </a:r>
+          </a:p>
+        </p:txBody>
+      </p:sp>
+      <p:cxnSp>
+        <p:nvCxnSpPr>
+          <p:cNvPr id="2" name="Straight Arrow Connector 1">
+            <a:extLst>
+              <a:ext uri="{FF2B5EF4-FFF2-40B4-BE49-F238E27FC236}">
+                <a16:creationId xmlns:a16="http://schemas.microsoft.com/office/drawing/2014/main" id="{23D528CE-85F6-9B71-EA7D-EDC410158456}"/>
+              </a:ext>
+            </a:extLst>
+          </p:cNvPr>
+          <p:cNvCxnSpPr>
+            <a:cxnSpLocks/>
+            <a:stCxn id="8" idx="2"/>
+            <a:endCxn id="9" idx="0"/>
+          </p:cNvCxnSpPr>
+          <p:nvPr/>
+        </p:nvCxnSpPr>
+        <p:spPr>
+          <a:xfrm>
+            <a:off x="3479910" y="2595657"/>
+            <a:ext cx="843" cy="647875"/>
+          </a:xfrm>
+          <a:prstGeom prst="straightConnector1">
+            <a:avLst/>
+          </a:prstGeom>
+          <a:ln>
+            <a:tailEnd type="triangle"/>
+          </a:ln>
+        </p:spPr>
+        <p:style>
+          <a:lnRef idx="2">
+            <a:schemeClr val="accent1"/>
+          </a:lnRef>
+          <a:fillRef idx="0">
+            <a:schemeClr val="accent1"/>
+          </a:fillRef>
+          <a:effectRef idx="1">
+            <a:schemeClr val="accent1"/>
+          </a:effectRef>
+          <a:fontRef idx="minor">
+            <a:schemeClr val="tx1"/>
+          </a:fontRef>
+        </p:style>
+      </p:cxnSp>
+      <p:sp>
+        <p:nvSpPr>
+          <p:cNvPr id="35" name="Oval 34">
+            <a:extLst>
+              <a:ext uri="{FF2B5EF4-FFF2-40B4-BE49-F238E27FC236}">
+                <a16:creationId xmlns:a16="http://schemas.microsoft.com/office/drawing/2014/main" id="{04829FE3-98B8-C5AA-DA22-BEC61960272C}"/>
+              </a:ext>
+            </a:extLst>
+          </p:cNvPr>
+          <p:cNvSpPr/>
+          <p:nvPr/>
+        </p:nvSpPr>
+        <p:spPr>
+          <a:xfrm>
+            <a:off x="5471711" y="3248569"/>
+            <a:ext cx="362309" cy="370936"/>
+          </a:xfrm>
+          <a:prstGeom prst="ellipse">
+            <a:avLst/>
+          </a:prstGeom>
+        </p:spPr>
+        <p:style>
+          <a:lnRef idx="2">
+            <a:schemeClr val="accent1">
+              <a:shade val="15000"/>
+            </a:schemeClr>
+          </a:lnRef>
+          <a:fillRef idx="1">
+            <a:schemeClr val="accent1"/>
+          </a:fillRef>
+          <a:effectRef idx="0">
+            <a:schemeClr val="accent1"/>
+          </a:effectRef>
+          <a:fontRef idx="minor">
+            <a:schemeClr val="lt1"/>
+          </a:fontRef>
+        </p:style>
+        <p:txBody>
+          <a:bodyPr rtlCol="0" anchor="ctr"/>
+          <a:lstStyle/>
+          <a:p>
+            <a:pPr algn="ctr"/>
+            <a:endParaRPr lang="en-CA"/>
+          </a:p>
+        </p:txBody>
+      </p:sp>
+      <p:sp>
+        <p:nvSpPr>
+          <p:cNvPr id="39" name="TextBox 38">
+            <a:extLst>
+              <a:ext uri="{FF2B5EF4-FFF2-40B4-BE49-F238E27FC236}">
+                <a16:creationId xmlns:a16="http://schemas.microsoft.com/office/drawing/2014/main" id="{C131C9A1-04A3-97C7-67B6-C653418C2E3B}"/>
+              </a:ext>
+            </a:extLst>
+          </p:cNvPr>
+          <p:cNvSpPr txBox="1"/>
+          <p:nvPr/>
+        </p:nvSpPr>
+        <p:spPr>
+          <a:xfrm>
+            <a:off x="5167620" y="3582554"/>
+            <a:ext cx="1022227" cy="461665"/>
+          </a:xfrm>
+          <a:prstGeom prst="rect">
+            <a:avLst/>
+          </a:prstGeom>
+          <a:noFill/>
+        </p:spPr>
+        <p:txBody>
+          <a:bodyPr wrap="square" rtlCol="0">
+            <a:spAutoFit/>
+          </a:bodyPr>
+          <a:lstStyle/>
+          <a:p>
+            <a:pPr algn="ctr"/>
+            <a:r>
+              <a:rPr lang="en-CA" sz="1200" dirty="0"/>
+              <a:t>Data source selection</a:t>
+            </a:r>
+          </a:p>
+        </p:txBody>
+      </p:sp>
+      <p:cxnSp>
+        <p:nvCxnSpPr>
+          <p:cNvPr id="45" name="Straight Arrow Connector 44">
+            <a:extLst>
+              <a:ext uri="{FF2B5EF4-FFF2-40B4-BE49-F238E27FC236}">
+                <a16:creationId xmlns:a16="http://schemas.microsoft.com/office/drawing/2014/main" id="{0E3C4C65-4A8C-B246-E3AF-147E86F778DF}"/>
+              </a:ext>
+            </a:extLst>
+          </p:cNvPr>
+          <p:cNvCxnSpPr>
+            <a:cxnSpLocks/>
+            <a:stCxn id="35" idx="6"/>
+            <a:endCxn id="42" idx="2"/>
+          </p:cNvCxnSpPr>
+          <p:nvPr/>
+        </p:nvCxnSpPr>
+        <p:spPr>
+          <a:xfrm flipV="1">
+            <a:off x="5834020" y="3429000"/>
+            <a:ext cx="339652" cy="5037"/>
+          </a:xfrm>
+          <a:prstGeom prst="straightConnector1">
+            <a:avLst/>
+          </a:prstGeom>
+          <a:ln>
+            <a:tailEnd type="triangle"/>
+          </a:ln>
+        </p:spPr>
+        <p:style>
+          <a:lnRef idx="2">
+            <a:schemeClr val="accent1"/>
+          </a:lnRef>
+          <a:fillRef idx="0">
+            <a:schemeClr val="accent1"/>
+          </a:fillRef>
+          <a:effectRef idx="1">
+            <a:schemeClr val="accent1"/>
+          </a:effectRef>
+          <a:fontRef idx="minor">
+            <a:schemeClr val="tx1"/>
+          </a:fontRef>
+        </p:style>
+      </p:cxnSp>
+      <p:pic>
+        <p:nvPicPr>
+          <p:cNvPr id="49" name="Graphic 48" descr="Database outline">
+            <a:extLst>
+              <a:ext uri="{FF2B5EF4-FFF2-40B4-BE49-F238E27FC236}">
+                <a16:creationId xmlns:a16="http://schemas.microsoft.com/office/drawing/2014/main" id="{ABDD9D52-74D7-6ACB-963E-8605BC3C139B}"/>
+              </a:ext>
+            </a:extLst>
+          </p:cNvPr>
+          <p:cNvPicPr>
+            <a:picLocks noChangeAspect="1"/>
+          </p:cNvPicPr>
+          <p:nvPr/>
+        </p:nvPicPr>
+        <p:blipFill>
+          <a:blip r:embed="rId2">
+            <a:extLst>
+              <a:ext uri="{28A0092B-C50C-407E-A947-70E740481C1C}">
+                <a14:useLocalDpi xmlns:a14="http://schemas.microsoft.com/office/drawing/2010/main" val="0"/>
+              </a:ext>
+              <a:ext uri="{96DAC541-7B7A-43D3-8B79-37D633B846F1}">
+                <asvg:svgBlip xmlns:asvg="http://schemas.microsoft.com/office/drawing/2016/SVG/main" r:embed="rId3"/>
+              </a:ext>
+            </a:extLst>
+          </a:blip>
+          <a:stretch>
+            <a:fillRect/>
+          </a:stretch>
+        </p:blipFill>
+        <p:spPr>
+          <a:xfrm>
+            <a:off x="5650669" y="976064"/>
+            <a:ext cx="618226" cy="618226"/>
+          </a:xfrm>
+          <a:prstGeom prst="rect">
+            <a:avLst/>
+          </a:prstGeom>
+        </p:spPr>
+      </p:pic>
+      <p:sp>
+        <p:nvSpPr>
+          <p:cNvPr id="53" name="TextBox 52">
+            <a:extLst>
+              <a:ext uri="{FF2B5EF4-FFF2-40B4-BE49-F238E27FC236}">
+                <a16:creationId xmlns:a16="http://schemas.microsoft.com/office/drawing/2014/main" id="{C683FC53-5212-8784-C229-4B7499904EB2}"/>
+              </a:ext>
+            </a:extLst>
+          </p:cNvPr>
+          <p:cNvSpPr txBox="1"/>
+          <p:nvPr/>
+        </p:nvSpPr>
+        <p:spPr>
+          <a:xfrm>
+            <a:off x="5293340" y="254206"/>
+            <a:ext cx="1321280" cy="830997"/>
+          </a:xfrm>
+          <a:prstGeom prst="rect">
+            <a:avLst/>
+          </a:prstGeom>
+          <a:noFill/>
+        </p:spPr>
+        <p:txBody>
+          <a:bodyPr wrap="square" rtlCol="0">
+            <a:spAutoFit/>
+          </a:bodyPr>
+          <a:lstStyle/>
+          <a:p>
+            <a:pPr algn="ctr"/>
+            <a:r>
+              <a:rPr lang="en-CA" sz="1200" dirty="0"/>
+              <a:t>Project specific database:</a:t>
+            </a:r>
+          </a:p>
+          <a:p>
+            <a:pPr algn="ctr"/>
+            <a:r>
+              <a:rPr lang="en-CA" sz="1200" dirty="0"/>
+              <a:t>Device datasheets, </a:t>
+            </a:r>
+            <a:r>
+              <a:rPr lang="en-CA" sz="1200" dirty="0" err="1"/>
+              <a:t>etc</a:t>
+            </a:r>
+            <a:endParaRPr lang="en-CA" sz="1200" dirty="0"/>
+          </a:p>
+        </p:txBody>
+      </p:sp>
+      <p:cxnSp>
+        <p:nvCxnSpPr>
+          <p:cNvPr id="55" name="Straight Arrow Connector 54">
+            <a:extLst>
+              <a:ext uri="{FF2B5EF4-FFF2-40B4-BE49-F238E27FC236}">
+                <a16:creationId xmlns:a16="http://schemas.microsoft.com/office/drawing/2014/main" id="{96D6B9CE-0413-5956-C3B6-E8AA980DD55C}"/>
+              </a:ext>
+            </a:extLst>
+          </p:cNvPr>
+          <p:cNvCxnSpPr>
+            <a:cxnSpLocks/>
+            <a:stCxn id="13" idx="2"/>
+            <a:endCxn id="31" idx="0"/>
+          </p:cNvCxnSpPr>
+          <p:nvPr/>
+        </p:nvCxnSpPr>
+        <p:spPr>
+          <a:xfrm>
+            <a:off x="7232426" y="1698690"/>
+            <a:ext cx="0" cy="968310"/>
+          </a:xfrm>
+          <a:prstGeom prst="straightConnector1">
+            <a:avLst/>
+          </a:prstGeom>
+          <a:ln>
+            <a:tailEnd type="triangle"/>
+          </a:ln>
+        </p:spPr>
+        <p:style>
+          <a:lnRef idx="2">
+            <a:schemeClr val="accent1"/>
+          </a:lnRef>
+          <a:fillRef idx="0">
+            <a:schemeClr val="accent1"/>
+          </a:fillRef>
+          <a:effectRef idx="1">
+            <a:schemeClr val="accent1"/>
+          </a:effectRef>
+          <a:fontRef idx="minor">
+            <a:schemeClr val="tx1"/>
+          </a:fontRef>
+        </p:style>
+      </p:cxnSp>
+      <p:cxnSp>
+        <p:nvCxnSpPr>
+          <p:cNvPr id="28" name="Connector: Elbow 27">
+            <a:extLst>
+              <a:ext uri="{FF2B5EF4-FFF2-40B4-BE49-F238E27FC236}">
+                <a16:creationId xmlns:a16="http://schemas.microsoft.com/office/drawing/2014/main" id="{A6E1E7A9-3EC1-EA28-3F31-E05C981E6A49}"/>
+              </a:ext>
+            </a:extLst>
+          </p:cNvPr>
+          <p:cNvCxnSpPr>
+            <a:cxnSpLocks/>
+            <a:stCxn id="57" idx="2"/>
+            <a:endCxn id="12" idx="2"/>
+          </p:cNvCxnSpPr>
+          <p:nvPr/>
+        </p:nvCxnSpPr>
+        <p:spPr>
+          <a:xfrm rot="16200000" flipH="1">
+            <a:off x="8027274" y="3377446"/>
+            <a:ext cx="221267" cy="593524"/>
+          </a:xfrm>
+          <a:prstGeom prst="bentConnector2">
+            <a:avLst/>
+          </a:prstGeom>
+          <a:ln>
+            <a:tailEnd type="triangle"/>
+          </a:ln>
+        </p:spPr>
+        <p:style>
+          <a:lnRef idx="2">
+            <a:schemeClr val="accent1"/>
+          </a:lnRef>
+          <a:fillRef idx="0">
+            <a:schemeClr val="accent1"/>
+          </a:fillRef>
+          <a:effectRef idx="1">
+            <a:schemeClr val="accent1"/>
+          </a:effectRef>
+          <a:fontRef idx="minor">
+            <a:schemeClr val="tx1"/>
+          </a:fontRef>
+        </p:style>
+      </p:cxnSp>
+      <p:sp>
+        <p:nvSpPr>
+          <p:cNvPr id="38" name="Oval 37">
+            <a:extLst>
+              <a:ext uri="{FF2B5EF4-FFF2-40B4-BE49-F238E27FC236}">
+                <a16:creationId xmlns:a16="http://schemas.microsoft.com/office/drawing/2014/main" id="{B7C51A95-94DE-69B8-E2DB-8AAFFB029C78}"/>
+              </a:ext>
+            </a:extLst>
+          </p:cNvPr>
+          <p:cNvSpPr/>
+          <p:nvPr/>
+        </p:nvSpPr>
+        <p:spPr>
+          <a:xfrm>
+            <a:off x="331397" y="5723283"/>
+            <a:ext cx="362309" cy="370936"/>
+          </a:xfrm>
+          <a:prstGeom prst="ellipse">
+            <a:avLst/>
+          </a:prstGeom>
+          <a:ln/>
+        </p:spPr>
+        <p:style>
+          <a:lnRef idx="1">
+            <a:schemeClr val="accent6"/>
+          </a:lnRef>
+          <a:fillRef idx="2">
+            <a:schemeClr val="accent6"/>
+          </a:fillRef>
+          <a:effectRef idx="1">
+            <a:schemeClr val="accent6"/>
+          </a:effectRef>
+          <a:fontRef idx="minor">
+            <a:schemeClr val="dk1"/>
+          </a:fontRef>
+        </p:style>
+        <p:txBody>
+          <a:bodyPr rtlCol="0" anchor="ctr"/>
+          <a:lstStyle/>
+          <a:p>
+            <a:pPr algn="ctr"/>
+            <a:endParaRPr lang="en-CA"/>
+          </a:p>
+        </p:txBody>
+      </p:sp>
+      <p:sp>
+        <p:nvSpPr>
+          <p:cNvPr id="46" name="TextBox 45">
+            <a:extLst>
+              <a:ext uri="{FF2B5EF4-FFF2-40B4-BE49-F238E27FC236}">
+                <a16:creationId xmlns:a16="http://schemas.microsoft.com/office/drawing/2014/main" id="{120B6119-5F4E-A620-F3F4-1730B1D45DBE}"/>
+              </a:ext>
+            </a:extLst>
+          </p:cNvPr>
+          <p:cNvSpPr txBox="1"/>
+          <p:nvPr/>
+        </p:nvSpPr>
+        <p:spPr>
+          <a:xfrm>
+            <a:off x="626789" y="5784912"/>
+            <a:ext cx="1707754" cy="276999"/>
+          </a:xfrm>
+          <a:prstGeom prst="rect">
+            <a:avLst/>
+          </a:prstGeom>
+          <a:noFill/>
+        </p:spPr>
+        <p:txBody>
+          <a:bodyPr wrap="square" rtlCol="0">
+            <a:spAutoFit/>
+          </a:bodyPr>
+          <a:lstStyle/>
+          <a:p>
+            <a:pPr algn="ctr"/>
+            <a:r>
+              <a:rPr lang="en-CA" sz="1200" dirty="0"/>
+              <a:t>Conventional compute</a:t>
+            </a:r>
+          </a:p>
+        </p:txBody>
+      </p:sp>
+      <p:sp>
+        <p:nvSpPr>
+          <p:cNvPr id="12" name="Oval 11">
+            <a:extLst>
+              <a:ext uri="{FF2B5EF4-FFF2-40B4-BE49-F238E27FC236}">
+                <a16:creationId xmlns:a16="http://schemas.microsoft.com/office/drawing/2014/main" id="{2F1C83E1-717B-CDD4-D9FB-9BC67C87B080}"/>
+              </a:ext>
+            </a:extLst>
+          </p:cNvPr>
+          <p:cNvSpPr/>
+          <p:nvPr/>
+        </p:nvSpPr>
+        <p:spPr>
+          <a:xfrm>
+            <a:off x="8434669" y="3599374"/>
+            <a:ext cx="362309" cy="370936"/>
+          </a:xfrm>
+          <a:prstGeom prst="ellipse">
+            <a:avLst/>
+          </a:prstGeom>
+        </p:spPr>
+        <p:style>
+          <a:lnRef idx="2">
+            <a:schemeClr val="accent1">
+              <a:shade val="15000"/>
+            </a:schemeClr>
+          </a:lnRef>
+          <a:fillRef idx="1">
+            <a:schemeClr val="accent1"/>
+          </a:fillRef>
+          <a:effectRef idx="0">
+            <a:schemeClr val="accent1"/>
+          </a:effectRef>
+          <a:fontRef idx="minor">
+            <a:schemeClr val="lt1"/>
+          </a:fontRef>
+        </p:style>
+        <p:txBody>
+          <a:bodyPr rtlCol="0" anchor="ctr"/>
+          <a:lstStyle/>
+          <a:p>
+            <a:pPr algn="ctr"/>
+            <a:endParaRPr lang="en-CA"/>
+          </a:p>
+        </p:txBody>
+      </p:sp>
+      <p:sp>
+        <p:nvSpPr>
+          <p:cNvPr id="14" name="TextBox 13">
+            <a:extLst>
+              <a:ext uri="{FF2B5EF4-FFF2-40B4-BE49-F238E27FC236}">
+                <a16:creationId xmlns:a16="http://schemas.microsoft.com/office/drawing/2014/main" id="{068EEE75-87B3-7D5A-0D81-E51A3A68E2D4}"/>
+              </a:ext>
+            </a:extLst>
+          </p:cNvPr>
+          <p:cNvSpPr txBox="1"/>
+          <p:nvPr/>
+        </p:nvSpPr>
+        <p:spPr>
+          <a:xfrm>
+            <a:off x="7926044" y="3908827"/>
+            <a:ext cx="1347195" cy="276999"/>
+          </a:xfrm>
+          <a:prstGeom prst="rect">
+            <a:avLst/>
+          </a:prstGeom>
+          <a:noFill/>
+        </p:spPr>
+        <p:txBody>
+          <a:bodyPr wrap="square" rtlCol="0">
+            <a:spAutoFit/>
+          </a:bodyPr>
+          <a:lstStyle/>
+          <a:p>
+            <a:pPr algn="ctr"/>
+            <a:r>
+              <a:rPr lang="en-CA" sz="1200" dirty="0"/>
+              <a:t>Literature review</a:t>
+            </a:r>
+          </a:p>
+        </p:txBody>
+      </p:sp>
+      <p:cxnSp>
+        <p:nvCxnSpPr>
+          <p:cNvPr id="16" name="Straight Arrow Connector 15">
+            <a:extLst>
+              <a:ext uri="{FF2B5EF4-FFF2-40B4-BE49-F238E27FC236}">
+                <a16:creationId xmlns:a16="http://schemas.microsoft.com/office/drawing/2014/main" id="{66C83A62-0C8B-1983-0E23-CC4D60D9DFF7}"/>
+              </a:ext>
+            </a:extLst>
+          </p:cNvPr>
+          <p:cNvCxnSpPr>
+            <a:cxnSpLocks/>
+            <a:stCxn id="12" idx="6"/>
+            <a:endCxn id="141" idx="2"/>
+          </p:cNvCxnSpPr>
+          <p:nvPr/>
+        </p:nvCxnSpPr>
+        <p:spPr>
+          <a:xfrm flipV="1">
+            <a:off x="8796978" y="3764509"/>
+            <a:ext cx="866180" cy="20333"/>
+          </a:xfrm>
+          <a:prstGeom prst="straightConnector1">
+            <a:avLst/>
+          </a:prstGeom>
+          <a:ln>
+            <a:tailEnd type="triangle"/>
+          </a:ln>
+        </p:spPr>
+        <p:style>
+          <a:lnRef idx="2">
+            <a:schemeClr val="accent1"/>
+          </a:lnRef>
+          <a:fillRef idx="0">
+            <a:schemeClr val="accent1"/>
+          </a:fillRef>
+          <a:effectRef idx="1">
+            <a:schemeClr val="accent1"/>
+          </a:effectRef>
+          <a:fontRef idx="minor">
+            <a:schemeClr val="tx1"/>
+          </a:fontRef>
+        </p:style>
+      </p:cxnSp>
+    </p:spTree>
+    <p:extLst>
+      <p:ext uri="{BB962C8B-B14F-4D97-AF65-F5344CB8AC3E}">
+        <p14:creationId xmlns:p14="http://schemas.microsoft.com/office/powerpoint/2010/main" val="3937684880"/>
+      </p:ext>
+    </p:extLst>
+  </p:cSld>
+  <p:clrMapOvr>
+    <a:masterClrMapping/>
+  </p:clrMapOvr>
+</p:sld>
+</file>
+
+<file path=ppt/slides/slide4.xml><?xml version="1.0" encoding="utf-8"?>
+<p:sld xmlns:a="http://schemas.openxmlformats.org/drawingml/2006/main" xmlns:r="http://schemas.openxmlformats.org/officeDocument/2006/relationships" xmlns:p="http://schemas.openxmlformats.org/presentationml/2006/main">
+  <p:cSld>
+    <p:spTree>
+      <p:nvGrpSpPr>
+        <p:cNvPr id="1" name=""/>
+        <p:cNvGrpSpPr/>
+        <p:nvPr/>
+      </p:nvGrpSpPr>
+      <p:grpSpPr>
+        <a:xfrm>
+          <a:off x="0" y="0"/>
+          <a:ext cx="0" cy="0"/>
+          <a:chOff x="0" y="0"/>
+          <a:chExt cx="0" cy="0"/>
+        </a:xfrm>
+      </p:grpSpPr>
+      <p:sp>
+        <p:nvSpPr>
+          <p:cNvPr id="66" name="Rectangle 65">
+            <a:extLst>
+              <a:ext uri="{FF2B5EF4-FFF2-40B4-BE49-F238E27FC236}">
+                <a16:creationId xmlns:a16="http://schemas.microsoft.com/office/drawing/2014/main" id="{4C8F35AB-B81B-8390-7AE7-D57E917AFAC6}"/>
+              </a:ext>
+            </a:extLst>
+          </p:cNvPr>
+          <p:cNvSpPr/>
+          <p:nvPr/>
+        </p:nvSpPr>
+        <p:spPr>
+          <a:xfrm>
+            <a:off x="6657566" y="2867642"/>
+            <a:ext cx="2262172" cy="1422798"/>
+          </a:xfrm>
+          <a:prstGeom prst="rect">
+            <a:avLst/>
+          </a:prstGeom>
+          <a:ln>
+            <a:prstDash val="sysDash"/>
+          </a:ln>
+        </p:spPr>
+        <p:style>
+          <a:lnRef idx="2">
+            <a:schemeClr val="dk1"/>
+          </a:lnRef>
+          <a:fillRef idx="1">
+            <a:schemeClr val="lt1"/>
+          </a:fillRef>
+          <a:effectRef idx="0">
+            <a:schemeClr val="dk1"/>
+          </a:effectRef>
+          <a:fontRef idx="minor">
+            <a:schemeClr val="dk1"/>
+          </a:fontRef>
+        </p:style>
+        <p:txBody>
+          <a:bodyPr rtlCol="0" anchor="ctr"/>
+          <a:lstStyle/>
+          <a:p>
+            <a:pPr algn="ctr"/>
+            <a:endParaRPr lang="en-CA"/>
+          </a:p>
+        </p:txBody>
+      </p:sp>
+      <p:sp>
+        <p:nvSpPr>
+          <p:cNvPr id="64" name="Rectangle 63">
+            <a:extLst>
+              <a:ext uri="{FF2B5EF4-FFF2-40B4-BE49-F238E27FC236}">
+                <a16:creationId xmlns:a16="http://schemas.microsoft.com/office/drawing/2014/main" id="{DA6D15B7-3060-4AD6-9064-075D2C606C4B}"/>
+              </a:ext>
+            </a:extLst>
+          </p:cNvPr>
+          <p:cNvSpPr/>
+          <p:nvPr/>
+        </p:nvSpPr>
+        <p:spPr>
+          <a:xfrm>
+            <a:off x="6668242" y="1117411"/>
+            <a:ext cx="2251495" cy="1429833"/>
+          </a:xfrm>
+          <a:prstGeom prst="rect">
+            <a:avLst/>
+          </a:prstGeom>
+        </p:spPr>
+        <p:style>
+          <a:lnRef idx="2">
+            <a:schemeClr val="accent1"/>
+          </a:lnRef>
+          <a:fillRef idx="1">
+            <a:schemeClr val="lt1"/>
+          </a:fillRef>
+          <a:effectRef idx="0">
+            <a:schemeClr val="accent1"/>
+          </a:effectRef>
+          <a:fontRef idx="minor">
+            <a:schemeClr val="dk1"/>
+          </a:fontRef>
+        </p:style>
+        <p:txBody>
+          <a:bodyPr rtlCol="0" anchor="ctr"/>
+          <a:lstStyle/>
+          <a:p>
+            <a:pPr algn="ctr"/>
+            <a:endParaRPr lang="en-CA"/>
+          </a:p>
+        </p:txBody>
+      </p:sp>
+      <p:sp>
+        <p:nvSpPr>
+          <p:cNvPr id="9" name="Oval 8">
+            <a:extLst>
+              <a:ext uri="{FF2B5EF4-FFF2-40B4-BE49-F238E27FC236}">
+                <a16:creationId xmlns:a16="http://schemas.microsoft.com/office/drawing/2014/main" id="{C66D25F2-D0EB-8A26-239E-A7155E4AB268}"/>
+              </a:ext>
+            </a:extLst>
+          </p:cNvPr>
+          <p:cNvSpPr/>
+          <p:nvPr/>
+        </p:nvSpPr>
+        <p:spPr>
+          <a:xfrm>
+            <a:off x="1548458" y="3183147"/>
+            <a:ext cx="362309" cy="370936"/>
+          </a:xfrm>
+          <a:prstGeom prst="ellipse">
+            <a:avLst/>
+          </a:prstGeom>
+          <a:solidFill>
+            <a:srgbClr val="FFFF00"/>
+          </a:solidFill>
+          <a:ln>
+            <a:solidFill>
+              <a:srgbClr val="FFC000"/>
+            </a:solidFill>
+          </a:ln>
+        </p:spPr>
+        <p:style>
+          <a:lnRef idx="2">
+            <a:schemeClr val="accent2">
+              <a:shade val="15000"/>
+            </a:schemeClr>
+          </a:lnRef>
+          <a:fillRef idx="1">
+            <a:schemeClr val="accent2"/>
+          </a:fillRef>
+          <a:effectRef idx="0">
+            <a:schemeClr val="accent2"/>
+          </a:effectRef>
+          <a:fontRef idx="minor">
+            <a:schemeClr val="lt1"/>
+          </a:fontRef>
+        </p:style>
+        <p:txBody>
+          <a:bodyPr rtlCol="0" anchor="ctr"/>
+          <a:lstStyle/>
+          <a:p>
+            <a:pPr algn="ctr"/>
+            <a:endParaRPr lang="en-CA" dirty="0"/>
+          </a:p>
+        </p:txBody>
+      </p:sp>
+      <p:sp>
+        <p:nvSpPr>
+          <p:cNvPr id="10" name="TextBox 9">
+            <a:extLst>
+              <a:ext uri="{FF2B5EF4-FFF2-40B4-BE49-F238E27FC236}">
+                <a16:creationId xmlns:a16="http://schemas.microsoft.com/office/drawing/2014/main" id="{2EA0943F-B351-42A6-78F5-8F93693A814A}"/>
+              </a:ext>
+            </a:extLst>
+          </p:cNvPr>
+          <p:cNvSpPr txBox="1"/>
+          <p:nvPr/>
+        </p:nvSpPr>
+        <p:spPr>
+          <a:xfrm>
+            <a:off x="1203064" y="3554083"/>
+            <a:ext cx="941717" cy="461665"/>
+          </a:xfrm>
+          <a:prstGeom prst="rect">
+            <a:avLst/>
+          </a:prstGeom>
+          <a:noFill/>
+        </p:spPr>
+        <p:txBody>
+          <a:bodyPr wrap="square" rtlCol="0">
+            <a:spAutoFit/>
+          </a:bodyPr>
+          <a:lstStyle/>
+          <a:p>
+            <a:pPr algn="ctr"/>
+            <a:r>
+              <a:rPr lang="en-CA" sz="1200" dirty="0"/>
+              <a:t>Input prompt</a:t>
+            </a:r>
+          </a:p>
+        </p:txBody>
+      </p:sp>
+      <p:sp>
+        <p:nvSpPr>
+          <p:cNvPr id="19" name="TextBox 18">
+            <a:extLst>
+              <a:ext uri="{FF2B5EF4-FFF2-40B4-BE49-F238E27FC236}">
+                <a16:creationId xmlns:a16="http://schemas.microsoft.com/office/drawing/2014/main" id="{E30BDC8E-1629-D442-EEE0-125BA3128E25}"/>
+              </a:ext>
+            </a:extLst>
+          </p:cNvPr>
+          <p:cNvSpPr txBox="1"/>
+          <p:nvPr/>
+        </p:nvSpPr>
+        <p:spPr>
+          <a:xfrm>
+            <a:off x="1258753" y="2292753"/>
+            <a:ext cx="941717" cy="461665"/>
+          </a:xfrm>
+          <a:prstGeom prst="rect">
+            <a:avLst/>
+          </a:prstGeom>
+          <a:noFill/>
+        </p:spPr>
+        <p:txBody>
+          <a:bodyPr wrap="square" rtlCol="0">
+            <a:spAutoFit/>
+          </a:bodyPr>
+          <a:lstStyle/>
+          <a:p>
+            <a:pPr algn="ctr"/>
+            <a:r>
+              <a:rPr lang="en-CA" sz="1200" dirty="0"/>
+              <a:t>Literature review</a:t>
+            </a:r>
+          </a:p>
+        </p:txBody>
+      </p:sp>
+      <p:cxnSp>
+        <p:nvCxnSpPr>
+          <p:cNvPr id="20" name="Straight Arrow Connector 19">
+            <a:extLst>
+              <a:ext uri="{FF2B5EF4-FFF2-40B4-BE49-F238E27FC236}">
+                <a16:creationId xmlns:a16="http://schemas.microsoft.com/office/drawing/2014/main" id="{0B52063A-6704-4123-0C36-AE0DFACD4B12}"/>
+              </a:ext>
+            </a:extLst>
+          </p:cNvPr>
+          <p:cNvCxnSpPr>
+            <a:cxnSpLocks/>
+            <a:endCxn id="9" idx="2"/>
+          </p:cNvCxnSpPr>
+          <p:nvPr/>
+        </p:nvCxnSpPr>
+        <p:spPr>
+          <a:xfrm>
+            <a:off x="1164584" y="3368615"/>
+            <a:ext cx="383874" cy="0"/>
+          </a:xfrm>
+          <a:prstGeom prst="straightConnector1">
+            <a:avLst/>
+          </a:prstGeom>
+          <a:ln>
+            <a:tailEnd type="triangle"/>
+          </a:ln>
+        </p:spPr>
+        <p:style>
+          <a:lnRef idx="2">
+            <a:schemeClr val="accent1"/>
+          </a:lnRef>
+          <a:fillRef idx="0">
+            <a:schemeClr val="accent1"/>
+          </a:fillRef>
+          <a:effectRef idx="1">
+            <a:schemeClr val="accent1"/>
+          </a:effectRef>
+          <a:fontRef idx="minor">
+            <a:schemeClr val="tx1"/>
+          </a:fontRef>
+        </p:style>
+      </p:cxnSp>
+      <p:sp>
+        <p:nvSpPr>
+          <p:cNvPr id="23" name="TextBox 22">
+            <a:extLst>
+              <a:ext uri="{FF2B5EF4-FFF2-40B4-BE49-F238E27FC236}">
+                <a16:creationId xmlns:a16="http://schemas.microsoft.com/office/drawing/2014/main" id="{73B3FDCA-09E4-C2D8-1EAE-F5C45C01E04C}"/>
+              </a:ext>
+            </a:extLst>
+          </p:cNvPr>
+          <p:cNvSpPr txBox="1"/>
+          <p:nvPr/>
+        </p:nvSpPr>
+        <p:spPr>
+          <a:xfrm>
+            <a:off x="350824" y="3241657"/>
+            <a:ext cx="941717" cy="276999"/>
+          </a:xfrm>
+          <a:prstGeom prst="rect">
+            <a:avLst/>
+          </a:prstGeom>
+          <a:noFill/>
+        </p:spPr>
+        <p:txBody>
+          <a:bodyPr wrap="square" rtlCol="0">
+            <a:spAutoFit/>
+          </a:bodyPr>
+          <a:lstStyle/>
+          <a:p>
+            <a:pPr algn="ctr"/>
+            <a:r>
+              <a:rPr lang="en-CA" sz="1200" dirty="0"/>
+              <a:t>Objective</a:t>
+            </a:r>
+          </a:p>
+        </p:txBody>
+      </p:sp>
+      <p:cxnSp>
+        <p:nvCxnSpPr>
+          <p:cNvPr id="25" name="Straight Arrow Connector 24">
+            <a:extLst>
+              <a:ext uri="{FF2B5EF4-FFF2-40B4-BE49-F238E27FC236}">
+                <a16:creationId xmlns:a16="http://schemas.microsoft.com/office/drawing/2014/main" id="{E646251F-54B7-C4D5-F40B-174FFE23C6A1}"/>
+              </a:ext>
+            </a:extLst>
+          </p:cNvPr>
+          <p:cNvCxnSpPr>
+            <a:cxnSpLocks/>
+            <a:stCxn id="9" idx="6"/>
+            <a:endCxn id="87" idx="2"/>
+          </p:cNvCxnSpPr>
+          <p:nvPr/>
+        </p:nvCxnSpPr>
+        <p:spPr>
+          <a:xfrm>
+            <a:off x="1910767" y="3368615"/>
+            <a:ext cx="826267" cy="1874"/>
+          </a:xfrm>
+          <a:prstGeom prst="straightConnector1">
+            <a:avLst/>
+          </a:prstGeom>
+          <a:ln>
+            <a:tailEnd type="triangle"/>
+          </a:ln>
+        </p:spPr>
+        <p:style>
+          <a:lnRef idx="2">
+            <a:schemeClr val="accent1"/>
+          </a:lnRef>
+          <a:fillRef idx="0">
+            <a:schemeClr val="accent1"/>
+          </a:fillRef>
+          <a:effectRef idx="1">
+            <a:schemeClr val="accent1"/>
+          </a:effectRef>
+          <a:fontRef idx="minor">
+            <a:schemeClr val="tx1"/>
+          </a:fontRef>
+        </p:style>
+      </p:cxnSp>
+      <p:sp>
+        <p:nvSpPr>
+          <p:cNvPr id="87" name="Oval 86">
+            <a:extLst>
+              <a:ext uri="{FF2B5EF4-FFF2-40B4-BE49-F238E27FC236}">
+                <a16:creationId xmlns:a16="http://schemas.microsoft.com/office/drawing/2014/main" id="{A9292609-78E6-6DE3-5AD7-06C2C70B1F24}"/>
+              </a:ext>
+            </a:extLst>
+          </p:cNvPr>
+          <p:cNvSpPr/>
+          <p:nvPr/>
+        </p:nvSpPr>
+        <p:spPr>
+          <a:xfrm>
+            <a:off x="2737034" y="3185021"/>
+            <a:ext cx="362309" cy="370936"/>
+          </a:xfrm>
+          <a:prstGeom prst="ellipse">
+            <a:avLst/>
+          </a:prstGeom>
+        </p:spPr>
+        <p:style>
+          <a:lnRef idx="2">
+            <a:schemeClr val="accent1">
+              <a:shade val="15000"/>
+            </a:schemeClr>
+          </a:lnRef>
+          <a:fillRef idx="1">
+            <a:schemeClr val="accent1"/>
+          </a:fillRef>
+          <a:effectRef idx="0">
+            <a:schemeClr val="accent1"/>
+          </a:effectRef>
+          <a:fontRef idx="minor">
+            <a:schemeClr val="lt1"/>
+          </a:fontRef>
+        </p:style>
+        <p:txBody>
+          <a:bodyPr rtlCol="0" anchor="ctr"/>
+          <a:lstStyle/>
+          <a:p>
+            <a:pPr algn="ctr"/>
+            <a:endParaRPr lang="en-CA"/>
+          </a:p>
+        </p:txBody>
+      </p:sp>
+      <p:sp>
+        <p:nvSpPr>
+          <p:cNvPr id="88" name="TextBox 87">
+            <a:extLst>
+              <a:ext uri="{FF2B5EF4-FFF2-40B4-BE49-F238E27FC236}">
+                <a16:creationId xmlns:a16="http://schemas.microsoft.com/office/drawing/2014/main" id="{19E26E08-F8E7-57D6-000E-91C0D78634F9}"/>
+              </a:ext>
+            </a:extLst>
+          </p:cNvPr>
+          <p:cNvSpPr txBox="1"/>
+          <p:nvPr/>
+        </p:nvSpPr>
+        <p:spPr>
+          <a:xfrm>
+            <a:off x="2382357" y="3535839"/>
+            <a:ext cx="1022227" cy="461665"/>
+          </a:xfrm>
+          <a:prstGeom prst="rect">
+            <a:avLst/>
+          </a:prstGeom>
+          <a:noFill/>
+        </p:spPr>
+        <p:txBody>
+          <a:bodyPr wrap="square" rtlCol="0">
+            <a:spAutoFit/>
+          </a:bodyPr>
+          <a:lstStyle/>
+          <a:p>
+            <a:pPr algn="ctr"/>
+            <a:r>
+              <a:rPr lang="en-CA" sz="1200" dirty="0"/>
+              <a:t>System design</a:t>
+            </a:r>
+          </a:p>
+        </p:txBody>
+      </p:sp>
+      <p:sp>
+        <p:nvSpPr>
+          <p:cNvPr id="103" name="Oval 102">
+            <a:extLst>
+              <a:ext uri="{FF2B5EF4-FFF2-40B4-BE49-F238E27FC236}">
+                <a16:creationId xmlns:a16="http://schemas.microsoft.com/office/drawing/2014/main" id="{61E0AD75-9A38-F780-6CFF-1AFD1387F4FB}"/>
+              </a:ext>
+            </a:extLst>
+          </p:cNvPr>
+          <p:cNvSpPr/>
+          <p:nvPr/>
+        </p:nvSpPr>
+        <p:spPr>
+          <a:xfrm>
+            <a:off x="3759259" y="3185021"/>
+            <a:ext cx="362309" cy="370936"/>
+          </a:xfrm>
+          <a:prstGeom prst="ellipse">
+            <a:avLst/>
+          </a:prstGeom>
+        </p:spPr>
+        <p:style>
+          <a:lnRef idx="2">
+            <a:schemeClr val="accent1">
+              <a:shade val="15000"/>
+            </a:schemeClr>
+          </a:lnRef>
+          <a:fillRef idx="1">
+            <a:schemeClr val="accent1"/>
+          </a:fillRef>
+          <a:effectRef idx="0">
+            <a:schemeClr val="accent1"/>
+          </a:effectRef>
+          <a:fontRef idx="minor">
+            <a:schemeClr val="lt1"/>
+          </a:fontRef>
+        </p:style>
+        <p:txBody>
+          <a:bodyPr rtlCol="0" anchor="ctr"/>
+          <a:lstStyle/>
+          <a:p>
+            <a:pPr algn="ctr"/>
+            <a:endParaRPr lang="en-CA"/>
+          </a:p>
+        </p:txBody>
+      </p:sp>
+      <p:sp>
+        <p:nvSpPr>
+          <p:cNvPr id="104" name="TextBox 103">
+            <a:extLst>
+              <a:ext uri="{FF2B5EF4-FFF2-40B4-BE49-F238E27FC236}">
+                <a16:creationId xmlns:a16="http://schemas.microsoft.com/office/drawing/2014/main" id="{59D42B88-0651-3E2D-20F9-2DA9A5A9BD28}"/>
+              </a:ext>
+            </a:extLst>
+          </p:cNvPr>
+          <p:cNvSpPr txBox="1"/>
+          <p:nvPr/>
+        </p:nvSpPr>
+        <p:spPr>
+          <a:xfrm>
+            <a:off x="3468571" y="3534108"/>
+            <a:ext cx="1022227" cy="461665"/>
+          </a:xfrm>
+          <a:prstGeom prst="rect">
+            <a:avLst/>
+          </a:prstGeom>
+          <a:noFill/>
+        </p:spPr>
+        <p:txBody>
+          <a:bodyPr wrap="square" rtlCol="0">
+            <a:spAutoFit/>
+          </a:bodyPr>
+          <a:lstStyle/>
+          <a:p>
+            <a:pPr algn="ctr"/>
+            <a:r>
+              <a:rPr lang="en-CA" sz="1200" dirty="0"/>
+              <a:t>Design evaluation</a:t>
+            </a:r>
+          </a:p>
+        </p:txBody>
+      </p:sp>
+      <p:cxnSp>
+        <p:nvCxnSpPr>
+          <p:cNvPr id="106" name="Straight Arrow Connector 105">
+            <a:extLst>
+              <a:ext uri="{FF2B5EF4-FFF2-40B4-BE49-F238E27FC236}">
+                <a16:creationId xmlns:a16="http://schemas.microsoft.com/office/drawing/2014/main" id="{C676D56E-184A-25C2-508C-2976E45F4EA6}"/>
+              </a:ext>
+            </a:extLst>
+          </p:cNvPr>
+          <p:cNvCxnSpPr>
+            <a:stCxn id="87" idx="6"/>
+            <a:endCxn id="103" idx="2"/>
+          </p:cNvCxnSpPr>
+          <p:nvPr/>
+        </p:nvCxnSpPr>
+        <p:spPr>
+          <a:xfrm>
+            <a:off x="3099343" y="3370489"/>
+            <a:ext cx="659916" cy="0"/>
+          </a:xfrm>
+          <a:prstGeom prst="straightConnector1">
+            <a:avLst/>
+          </a:prstGeom>
+          <a:ln>
+            <a:tailEnd type="triangle"/>
+          </a:ln>
+        </p:spPr>
+        <p:style>
+          <a:lnRef idx="2">
+            <a:schemeClr val="accent1"/>
+          </a:lnRef>
+          <a:fillRef idx="0">
+            <a:schemeClr val="accent1"/>
+          </a:fillRef>
+          <a:effectRef idx="1">
+            <a:schemeClr val="accent1"/>
+          </a:effectRef>
+          <a:fontRef idx="minor">
+            <a:schemeClr val="tx1"/>
+          </a:fontRef>
+        </p:style>
+      </p:cxnSp>
+      <p:sp>
+        <p:nvSpPr>
+          <p:cNvPr id="119" name="Diamond 118">
+            <a:extLst>
+              <a:ext uri="{FF2B5EF4-FFF2-40B4-BE49-F238E27FC236}">
+                <a16:creationId xmlns:a16="http://schemas.microsoft.com/office/drawing/2014/main" id="{05BECCD7-860C-3801-B059-7F35718156C2}"/>
+              </a:ext>
+            </a:extLst>
+          </p:cNvPr>
+          <p:cNvSpPr/>
+          <p:nvPr/>
+        </p:nvSpPr>
+        <p:spPr>
+          <a:xfrm>
+            <a:off x="4515773" y="3243529"/>
+            <a:ext cx="267419" cy="253917"/>
+          </a:xfrm>
+          <a:prstGeom prst="diamond">
+            <a:avLst/>
+          </a:prstGeom>
+        </p:spPr>
+        <p:style>
+          <a:lnRef idx="1">
+            <a:schemeClr val="accent5"/>
+          </a:lnRef>
+          <a:fillRef idx="2">
+            <a:schemeClr val="accent5"/>
+          </a:fillRef>
+          <a:effectRef idx="1">
+            <a:schemeClr val="accent5"/>
+          </a:effectRef>
+          <a:fontRef idx="minor">
+            <a:schemeClr val="dk1"/>
+          </a:fontRef>
+        </p:style>
+        <p:txBody>
+          <a:bodyPr rtlCol="0" anchor="ctr"/>
+          <a:lstStyle/>
+          <a:p>
+            <a:pPr algn="ctr"/>
+            <a:endParaRPr lang="en-CA"/>
+          </a:p>
+        </p:txBody>
+      </p:sp>
+      <p:sp>
+        <p:nvSpPr>
+          <p:cNvPr id="120" name="Oval 119">
+            <a:extLst>
+              <a:ext uri="{FF2B5EF4-FFF2-40B4-BE49-F238E27FC236}">
+                <a16:creationId xmlns:a16="http://schemas.microsoft.com/office/drawing/2014/main" id="{6A5D3AB7-5530-A697-77A8-ECF4BCC19BED}"/>
+              </a:ext>
+            </a:extLst>
+          </p:cNvPr>
+          <p:cNvSpPr/>
+          <p:nvPr/>
+        </p:nvSpPr>
+        <p:spPr>
+          <a:xfrm>
+            <a:off x="4468327" y="3911948"/>
+            <a:ext cx="362309" cy="370936"/>
+          </a:xfrm>
+          <a:prstGeom prst="ellipse">
+            <a:avLst/>
+          </a:prstGeom>
+        </p:spPr>
+        <p:style>
+          <a:lnRef idx="2">
+            <a:schemeClr val="accent1">
+              <a:shade val="15000"/>
+            </a:schemeClr>
+          </a:lnRef>
+          <a:fillRef idx="1">
+            <a:schemeClr val="accent1"/>
+          </a:fillRef>
+          <a:effectRef idx="0">
+            <a:schemeClr val="accent1"/>
+          </a:effectRef>
+          <a:fontRef idx="minor">
+            <a:schemeClr val="lt1"/>
+          </a:fontRef>
+        </p:style>
+        <p:txBody>
+          <a:bodyPr rtlCol="0" anchor="ctr"/>
+          <a:lstStyle/>
+          <a:p>
+            <a:pPr algn="ctr"/>
+            <a:endParaRPr lang="en-CA"/>
+          </a:p>
+        </p:txBody>
+      </p:sp>
+      <p:sp>
+        <p:nvSpPr>
+          <p:cNvPr id="121" name="TextBox 120">
+            <a:extLst>
+              <a:ext uri="{FF2B5EF4-FFF2-40B4-BE49-F238E27FC236}">
+                <a16:creationId xmlns:a16="http://schemas.microsoft.com/office/drawing/2014/main" id="{CA37ED72-5D42-21E7-BD7A-ED81B08B714B}"/>
+              </a:ext>
+            </a:extLst>
+          </p:cNvPr>
+          <p:cNvSpPr txBox="1"/>
+          <p:nvPr/>
+        </p:nvSpPr>
+        <p:spPr>
+          <a:xfrm>
+            <a:off x="4156154" y="4269411"/>
+            <a:ext cx="1022227" cy="276999"/>
+          </a:xfrm>
+          <a:prstGeom prst="rect">
+            <a:avLst/>
+          </a:prstGeom>
+          <a:noFill/>
+        </p:spPr>
+        <p:txBody>
+          <a:bodyPr wrap="square" rtlCol="0">
+            <a:spAutoFit/>
+          </a:bodyPr>
+          <a:lstStyle/>
+          <a:p>
+            <a:pPr algn="ctr"/>
+            <a:r>
+              <a:rPr lang="en-CA" sz="1200" dirty="0"/>
+              <a:t>Redesign</a:t>
+            </a:r>
+          </a:p>
+        </p:txBody>
+      </p:sp>
+      <p:cxnSp>
+        <p:nvCxnSpPr>
+          <p:cNvPr id="123" name="Straight Arrow Connector 122">
+            <a:extLst>
+              <a:ext uri="{FF2B5EF4-FFF2-40B4-BE49-F238E27FC236}">
+                <a16:creationId xmlns:a16="http://schemas.microsoft.com/office/drawing/2014/main" id="{4ED590A0-2B1B-9896-A15B-4C65A7485868}"/>
+              </a:ext>
+            </a:extLst>
+          </p:cNvPr>
+          <p:cNvCxnSpPr>
+            <a:stCxn id="119" idx="2"/>
+            <a:endCxn id="120" idx="0"/>
+          </p:cNvCxnSpPr>
+          <p:nvPr/>
+        </p:nvCxnSpPr>
+        <p:spPr>
+          <a:xfrm flipH="1">
+            <a:off x="4649482" y="3497446"/>
+            <a:ext cx="1" cy="414502"/>
+          </a:xfrm>
+          <a:prstGeom prst="straightConnector1">
+            <a:avLst/>
+          </a:prstGeom>
+          <a:ln>
+            <a:tailEnd type="triangle"/>
+          </a:ln>
+        </p:spPr>
+        <p:style>
+          <a:lnRef idx="2">
+            <a:schemeClr val="accent1"/>
+          </a:lnRef>
+          <a:fillRef idx="0">
+            <a:schemeClr val="accent1"/>
+          </a:fillRef>
+          <a:effectRef idx="1">
+            <a:schemeClr val="accent1"/>
+          </a:effectRef>
+          <a:fontRef idx="minor">
+            <a:schemeClr val="tx1"/>
+          </a:fontRef>
+        </p:style>
+      </p:cxnSp>
+      <p:cxnSp>
+        <p:nvCxnSpPr>
+          <p:cNvPr id="126" name="Straight Arrow Connector 125">
+            <a:extLst>
+              <a:ext uri="{FF2B5EF4-FFF2-40B4-BE49-F238E27FC236}">
+                <a16:creationId xmlns:a16="http://schemas.microsoft.com/office/drawing/2014/main" id="{86210747-5D61-1425-64EC-0CEFF3DC29D3}"/>
+              </a:ext>
+            </a:extLst>
+          </p:cNvPr>
+          <p:cNvCxnSpPr>
+            <a:stCxn id="103" idx="6"/>
+            <a:endCxn id="119" idx="1"/>
+          </p:cNvCxnSpPr>
+          <p:nvPr/>
+        </p:nvCxnSpPr>
+        <p:spPr>
+          <a:xfrm flipV="1">
+            <a:off x="4121568" y="3370488"/>
+            <a:ext cx="394205" cy="1"/>
+          </a:xfrm>
+          <a:prstGeom prst="straightConnector1">
+            <a:avLst/>
+          </a:prstGeom>
+          <a:ln>
+            <a:tailEnd type="triangle"/>
+          </a:ln>
+        </p:spPr>
+        <p:style>
+          <a:lnRef idx="2">
+            <a:schemeClr val="accent1"/>
+          </a:lnRef>
+          <a:fillRef idx="0">
+            <a:schemeClr val="accent1"/>
+          </a:fillRef>
+          <a:effectRef idx="1">
+            <a:schemeClr val="accent1"/>
+          </a:effectRef>
+          <a:fontRef idx="minor">
+            <a:schemeClr val="tx1"/>
+          </a:fontRef>
+        </p:style>
+      </p:cxnSp>
+      <p:sp>
+        <p:nvSpPr>
+          <p:cNvPr id="137" name="Oval 136">
+            <a:extLst>
+              <a:ext uri="{FF2B5EF4-FFF2-40B4-BE49-F238E27FC236}">
+                <a16:creationId xmlns:a16="http://schemas.microsoft.com/office/drawing/2014/main" id="{289ADFF2-5B68-B456-0DFE-8460E3064E8E}"/>
+              </a:ext>
+            </a:extLst>
+          </p:cNvPr>
+          <p:cNvSpPr/>
+          <p:nvPr/>
+        </p:nvSpPr>
+        <p:spPr>
+          <a:xfrm>
+            <a:off x="7122643" y="3193504"/>
+            <a:ext cx="362309" cy="370936"/>
+          </a:xfrm>
+          <a:prstGeom prst="ellipse">
+            <a:avLst/>
+          </a:prstGeom>
+        </p:spPr>
+        <p:style>
+          <a:lnRef idx="2">
+            <a:schemeClr val="accent1">
+              <a:shade val="15000"/>
+            </a:schemeClr>
+          </a:lnRef>
+          <a:fillRef idx="1">
+            <a:schemeClr val="accent1"/>
+          </a:fillRef>
+          <a:effectRef idx="0">
+            <a:schemeClr val="accent1"/>
+          </a:effectRef>
+          <a:fontRef idx="minor">
+            <a:schemeClr val="lt1"/>
+          </a:fontRef>
+        </p:style>
+        <p:txBody>
+          <a:bodyPr rtlCol="0" anchor="ctr"/>
+          <a:lstStyle/>
+          <a:p>
+            <a:pPr algn="ctr"/>
+            <a:endParaRPr lang="en-CA"/>
+          </a:p>
+        </p:txBody>
+      </p:sp>
+      <p:sp>
+        <p:nvSpPr>
+          <p:cNvPr id="138" name="TextBox 137">
+            <a:extLst>
+              <a:ext uri="{FF2B5EF4-FFF2-40B4-BE49-F238E27FC236}">
+                <a16:creationId xmlns:a16="http://schemas.microsoft.com/office/drawing/2014/main" id="{00123505-35F6-9F46-29A7-E2ED11C36283}"/>
+              </a:ext>
+            </a:extLst>
+          </p:cNvPr>
+          <p:cNvSpPr txBox="1"/>
+          <p:nvPr/>
+        </p:nvSpPr>
+        <p:spPr>
+          <a:xfrm>
+            <a:off x="6800857" y="3547648"/>
+            <a:ext cx="1022227" cy="646331"/>
+          </a:xfrm>
+          <a:prstGeom prst="rect">
+            <a:avLst/>
+          </a:prstGeom>
+          <a:noFill/>
+        </p:spPr>
+        <p:txBody>
+          <a:bodyPr wrap="square" rtlCol="0">
+            <a:spAutoFit/>
+          </a:bodyPr>
+          <a:lstStyle/>
+          <a:p>
+            <a:pPr algn="ctr"/>
+            <a:r>
+              <a:rPr lang="en-CA" sz="1200" dirty="0"/>
+              <a:t>Single Module design</a:t>
+            </a:r>
+          </a:p>
+        </p:txBody>
+      </p:sp>
+      <p:sp>
+        <p:nvSpPr>
+          <p:cNvPr id="139" name="Oval 138">
+            <a:extLst>
+              <a:ext uri="{FF2B5EF4-FFF2-40B4-BE49-F238E27FC236}">
+                <a16:creationId xmlns:a16="http://schemas.microsoft.com/office/drawing/2014/main" id="{DDBC1417-88DF-8275-70B8-4C9A1DBCBCAE}"/>
+              </a:ext>
+            </a:extLst>
+          </p:cNvPr>
+          <p:cNvSpPr/>
+          <p:nvPr/>
+        </p:nvSpPr>
+        <p:spPr>
+          <a:xfrm>
+            <a:off x="8158412" y="3185021"/>
+            <a:ext cx="362309" cy="370936"/>
+          </a:xfrm>
+          <a:prstGeom prst="ellipse">
+            <a:avLst/>
+          </a:prstGeom>
+        </p:spPr>
+        <p:style>
+          <a:lnRef idx="2">
+            <a:schemeClr val="accent1">
+              <a:shade val="15000"/>
+            </a:schemeClr>
+          </a:lnRef>
+          <a:fillRef idx="1">
+            <a:schemeClr val="accent1"/>
+          </a:fillRef>
+          <a:effectRef idx="0">
+            <a:schemeClr val="accent1"/>
+          </a:effectRef>
+          <a:fontRef idx="minor">
+            <a:schemeClr val="lt1"/>
+          </a:fontRef>
+        </p:style>
+        <p:txBody>
+          <a:bodyPr rtlCol="0" anchor="ctr"/>
+          <a:lstStyle/>
+          <a:p>
+            <a:pPr algn="ctr"/>
+            <a:endParaRPr lang="en-CA"/>
+          </a:p>
+        </p:txBody>
+      </p:sp>
+      <p:sp>
+        <p:nvSpPr>
+          <p:cNvPr id="140" name="TextBox 139">
+            <a:extLst>
+              <a:ext uri="{FF2B5EF4-FFF2-40B4-BE49-F238E27FC236}">
+                <a16:creationId xmlns:a16="http://schemas.microsoft.com/office/drawing/2014/main" id="{9EB03D17-6861-59E9-F1A1-8EE810EABF85}"/>
+              </a:ext>
+            </a:extLst>
+          </p:cNvPr>
+          <p:cNvSpPr txBox="1"/>
+          <p:nvPr/>
+        </p:nvSpPr>
+        <p:spPr>
+          <a:xfrm>
+            <a:off x="7813930" y="3547403"/>
+            <a:ext cx="1022227" cy="646331"/>
+          </a:xfrm>
+          <a:prstGeom prst="rect">
+            <a:avLst/>
+          </a:prstGeom>
+          <a:noFill/>
+        </p:spPr>
+        <p:txBody>
+          <a:bodyPr wrap="square" rtlCol="0">
+            <a:spAutoFit/>
+          </a:bodyPr>
+          <a:lstStyle/>
+          <a:p>
+            <a:pPr algn="ctr"/>
+            <a:r>
+              <a:rPr lang="en-CA" sz="1200" dirty="0"/>
+              <a:t>Single </a:t>
+            </a:r>
+          </a:p>
+          <a:p>
+            <a:pPr algn="ctr"/>
+            <a:r>
+              <a:rPr lang="en-CA" sz="1200" dirty="0"/>
+              <a:t>module evaluation</a:t>
+            </a:r>
+          </a:p>
+        </p:txBody>
+      </p:sp>
+      <p:sp>
+        <p:nvSpPr>
+          <p:cNvPr id="141" name="Oval 140">
+            <a:extLst>
+              <a:ext uri="{FF2B5EF4-FFF2-40B4-BE49-F238E27FC236}">
+                <a16:creationId xmlns:a16="http://schemas.microsoft.com/office/drawing/2014/main" id="{1786C034-5956-D40F-FAED-065932303AB9}"/>
+              </a:ext>
+            </a:extLst>
+          </p:cNvPr>
+          <p:cNvSpPr/>
+          <p:nvPr/>
+        </p:nvSpPr>
+        <p:spPr>
+          <a:xfrm>
+            <a:off x="10554191" y="3193504"/>
+            <a:ext cx="362309" cy="370936"/>
+          </a:xfrm>
+          <a:prstGeom prst="ellipse">
+            <a:avLst/>
+          </a:prstGeom>
+          <a:solidFill>
+            <a:srgbClr val="FFFF00"/>
+          </a:solidFill>
+          <a:ln>
+            <a:solidFill>
+              <a:srgbClr val="FFC000"/>
+            </a:solidFill>
+          </a:ln>
+        </p:spPr>
+        <p:style>
+          <a:lnRef idx="2">
+            <a:schemeClr val="accent2">
+              <a:shade val="15000"/>
+            </a:schemeClr>
+          </a:lnRef>
+          <a:fillRef idx="1">
+            <a:schemeClr val="accent2"/>
+          </a:fillRef>
+          <a:effectRef idx="0">
+            <a:schemeClr val="accent2"/>
+          </a:effectRef>
+          <a:fontRef idx="minor">
+            <a:schemeClr val="lt1"/>
+          </a:fontRef>
+        </p:style>
+        <p:txBody>
+          <a:bodyPr rtlCol="0" anchor="ctr"/>
+          <a:lstStyle/>
+          <a:p>
+            <a:pPr algn="ctr"/>
+            <a:endParaRPr lang="en-CA" dirty="0"/>
+          </a:p>
+        </p:txBody>
+      </p:sp>
+      <p:sp>
+        <p:nvSpPr>
+          <p:cNvPr id="142" name="TextBox 141">
+            <a:extLst>
+              <a:ext uri="{FF2B5EF4-FFF2-40B4-BE49-F238E27FC236}">
+                <a16:creationId xmlns:a16="http://schemas.microsoft.com/office/drawing/2014/main" id="{095A5798-74DA-A90D-F202-9B1089374FA3}"/>
+              </a:ext>
+            </a:extLst>
+          </p:cNvPr>
+          <p:cNvSpPr txBox="1"/>
+          <p:nvPr/>
+        </p:nvSpPr>
+        <p:spPr>
+          <a:xfrm>
+            <a:off x="10256522" y="3626440"/>
+            <a:ext cx="941717" cy="276999"/>
+          </a:xfrm>
+          <a:prstGeom prst="rect">
+            <a:avLst/>
+          </a:prstGeom>
+          <a:noFill/>
+        </p:spPr>
+        <p:txBody>
+          <a:bodyPr wrap="square" rtlCol="0">
+            <a:spAutoFit/>
+          </a:bodyPr>
+          <a:lstStyle/>
+          <a:p>
+            <a:pPr algn="ctr"/>
+            <a:r>
+              <a:rPr lang="en-CA" sz="1200" dirty="0"/>
+              <a:t>To file</a:t>
+            </a:r>
+          </a:p>
+        </p:txBody>
+      </p:sp>
+      <p:cxnSp>
+        <p:nvCxnSpPr>
+          <p:cNvPr id="144" name="Straight Arrow Connector 143">
+            <a:extLst>
+              <a:ext uri="{FF2B5EF4-FFF2-40B4-BE49-F238E27FC236}">
+                <a16:creationId xmlns:a16="http://schemas.microsoft.com/office/drawing/2014/main" id="{CEB794B4-7BFF-F88B-F0B8-3888AAA0066D}"/>
+              </a:ext>
+            </a:extLst>
+          </p:cNvPr>
+          <p:cNvCxnSpPr>
+            <a:cxnSpLocks/>
+            <a:stCxn id="119" idx="3"/>
+            <a:endCxn id="48" idx="2"/>
+          </p:cNvCxnSpPr>
+          <p:nvPr/>
+        </p:nvCxnSpPr>
+        <p:spPr>
+          <a:xfrm flipV="1">
+            <a:off x="4783192" y="3368615"/>
+            <a:ext cx="647892" cy="1873"/>
+          </a:xfrm>
+          <a:prstGeom prst="straightConnector1">
+            <a:avLst/>
+          </a:prstGeom>
+          <a:ln>
+            <a:tailEnd type="triangle"/>
+          </a:ln>
+        </p:spPr>
+        <p:style>
+          <a:lnRef idx="2">
+            <a:schemeClr val="accent1"/>
+          </a:lnRef>
+          <a:fillRef idx="0">
+            <a:schemeClr val="accent1"/>
+          </a:fillRef>
+          <a:effectRef idx="1">
+            <a:schemeClr val="accent1"/>
+          </a:effectRef>
+          <a:fontRef idx="minor">
+            <a:schemeClr val="tx1"/>
+          </a:fontRef>
+        </p:style>
+      </p:cxnSp>
+      <p:pic>
+        <p:nvPicPr>
+          <p:cNvPr id="151" name="Graphic 150" descr="Database outline">
+            <a:extLst>
+              <a:ext uri="{FF2B5EF4-FFF2-40B4-BE49-F238E27FC236}">
+                <a16:creationId xmlns:a16="http://schemas.microsoft.com/office/drawing/2014/main" id="{80C1A3D0-9470-E73D-9EFE-8EBC899C2D6D}"/>
+              </a:ext>
+            </a:extLst>
+          </p:cNvPr>
+          <p:cNvPicPr>
+            <a:picLocks noChangeAspect="1"/>
+          </p:cNvPicPr>
+          <p:nvPr/>
+        </p:nvPicPr>
+        <p:blipFill>
+          <a:blip r:embed="rId2">
+            <a:extLst>
+              <a:ext uri="{28A0092B-C50C-407E-A947-70E740481C1C}">
+                <a14:useLocalDpi xmlns:a14="http://schemas.microsoft.com/office/drawing/2010/main" val="0"/>
+              </a:ext>
+              <a:ext uri="{96DAC541-7B7A-43D3-8B79-37D633B846F1}">
+                <asvg:svgBlip xmlns:asvg="http://schemas.microsoft.com/office/drawing/2016/SVG/main" r:embed="rId3"/>
+              </a:ext>
+            </a:extLst>
+          </a:blip>
+          <a:stretch>
+            <a:fillRect/>
+          </a:stretch>
+        </p:blipFill>
+        <p:spPr>
+          <a:xfrm>
+            <a:off x="8101870" y="1790366"/>
+            <a:ext cx="618226" cy="618226"/>
+          </a:xfrm>
+          <a:prstGeom prst="rect">
+            <a:avLst/>
+          </a:prstGeom>
+        </p:spPr>
+      </p:pic>
+      <p:sp>
+        <p:nvSpPr>
+          <p:cNvPr id="152" name="TextBox 151">
+            <a:extLst>
+              <a:ext uri="{FF2B5EF4-FFF2-40B4-BE49-F238E27FC236}">
+                <a16:creationId xmlns:a16="http://schemas.microsoft.com/office/drawing/2014/main" id="{2861CCA1-C422-30D8-947C-67795005EA93}"/>
+              </a:ext>
+            </a:extLst>
+          </p:cNvPr>
+          <p:cNvSpPr txBox="1"/>
+          <p:nvPr/>
+        </p:nvSpPr>
+        <p:spPr>
+          <a:xfrm>
+            <a:off x="7750343" y="1259677"/>
+            <a:ext cx="1321280" cy="646331"/>
+          </a:xfrm>
+          <a:prstGeom prst="rect">
+            <a:avLst/>
+          </a:prstGeom>
+          <a:noFill/>
+        </p:spPr>
+        <p:txBody>
+          <a:bodyPr wrap="square" rtlCol="0">
+            <a:spAutoFit/>
+          </a:bodyPr>
+          <a:lstStyle/>
+          <a:p>
+            <a:pPr algn="ctr"/>
+            <a:r>
+              <a:rPr lang="en-CA" sz="1200" dirty="0"/>
+              <a:t>Language specific</a:t>
+            </a:r>
+          </a:p>
+          <a:p>
+            <a:pPr algn="ctr"/>
+            <a:r>
+              <a:rPr lang="en-CA" sz="1200" dirty="0"/>
+              <a:t>manuals </a:t>
+            </a:r>
+          </a:p>
+        </p:txBody>
+      </p:sp>
+      <p:pic>
+        <p:nvPicPr>
+          <p:cNvPr id="154" name="Graphic 153" descr="Cmd Terminal outline">
+            <a:extLst>
+              <a:ext uri="{FF2B5EF4-FFF2-40B4-BE49-F238E27FC236}">
+                <a16:creationId xmlns:a16="http://schemas.microsoft.com/office/drawing/2014/main" id="{240A592A-1E66-B601-10FC-190DF79C62AC}"/>
+              </a:ext>
+            </a:extLst>
+          </p:cNvPr>
+          <p:cNvPicPr>
+            <a:picLocks noChangeAspect="1"/>
+          </p:cNvPicPr>
+          <p:nvPr/>
+        </p:nvPicPr>
+        <p:blipFill>
+          <a:blip r:embed="rId4">
+            <a:extLst>
+              <a:ext uri="{28A0092B-C50C-407E-A947-70E740481C1C}">
+                <a14:useLocalDpi xmlns:a14="http://schemas.microsoft.com/office/drawing/2010/main" val="0"/>
+              </a:ext>
+              <a:ext uri="{96DAC541-7B7A-43D3-8B79-37D633B846F1}">
+                <asvg:svgBlip xmlns:asvg="http://schemas.microsoft.com/office/drawing/2016/SVG/main" r:embed="rId5"/>
+              </a:ext>
+            </a:extLst>
+          </a:blip>
+          <a:stretch>
+            <a:fillRect/>
+          </a:stretch>
+        </p:blipFill>
+        <p:spPr>
+          <a:xfrm>
+            <a:off x="6956354" y="1799267"/>
+            <a:ext cx="618226" cy="618226"/>
+          </a:xfrm>
+          <a:prstGeom prst="rect">
+            <a:avLst/>
+          </a:prstGeom>
+        </p:spPr>
+      </p:pic>
+      <p:sp>
+        <p:nvSpPr>
+          <p:cNvPr id="155" name="TextBox 154">
+            <a:extLst>
+              <a:ext uri="{FF2B5EF4-FFF2-40B4-BE49-F238E27FC236}">
+                <a16:creationId xmlns:a16="http://schemas.microsoft.com/office/drawing/2014/main" id="{0A1FE9F1-4468-BC94-3372-4F5FE7842F93}"/>
+              </a:ext>
+            </a:extLst>
+          </p:cNvPr>
+          <p:cNvSpPr txBox="1"/>
+          <p:nvPr/>
+        </p:nvSpPr>
+        <p:spPr>
+          <a:xfrm>
+            <a:off x="6604827" y="1430253"/>
+            <a:ext cx="1321280" cy="461665"/>
+          </a:xfrm>
+          <a:prstGeom prst="rect">
+            <a:avLst/>
+          </a:prstGeom>
+          <a:noFill/>
+        </p:spPr>
+        <p:txBody>
+          <a:bodyPr wrap="square" rtlCol="0">
+            <a:spAutoFit/>
+          </a:bodyPr>
+          <a:lstStyle/>
+          <a:p>
+            <a:pPr algn="ctr"/>
+            <a:r>
+              <a:rPr lang="en-CA" sz="1200" dirty="0"/>
+              <a:t>Computation (python shell)</a:t>
+            </a:r>
+          </a:p>
+        </p:txBody>
+      </p:sp>
+      <p:cxnSp>
+        <p:nvCxnSpPr>
+          <p:cNvPr id="16" name="Connector: Elbow 15">
+            <a:extLst>
+              <a:ext uri="{FF2B5EF4-FFF2-40B4-BE49-F238E27FC236}">
+                <a16:creationId xmlns:a16="http://schemas.microsoft.com/office/drawing/2014/main" id="{DCC325E0-E065-5DED-AA11-9063920B739A}"/>
+              </a:ext>
+            </a:extLst>
+          </p:cNvPr>
+          <p:cNvCxnSpPr>
+            <a:cxnSpLocks/>
+            <a:stCxn id="120" idx="2"/>
+            <a:endCxn id="103" idx="2"/>
+          </p:cNvCxnSpPr>
+          <p:nvPr/>
+        </p:nvCxnSpPr>
+        <p:spPr>
+          <a:xfrm rot="10800000">
+            <a:off x="3759259" y="3370490"/>
+            <a:ext cx="709068" cy="726927"/>
+          </a:xfrm>
+          <a:prstGeom prst="bentConnector3">
+            <a:avLst>
+              <a:gd name="adj1" fmla="val 160222"/>
+            </a:avLst>
+          </a:prstGeom>
+          <a:ln>
+            <a:tailEnd type="triangle"/>
+          </a:ln>
+        </p:spPr>
+        <p:style>
+          <a:lnRef idx="2">
+            <a:schemeClr val="accent1"/>
+          </a:lnRef>
+          <a:fillRef idx="0">
+            <a:schemeClr val="accent1"/>
+          </a:fillRef>
+          <a:effectRef idx="1">
+            <a:schemeClr val="accent1"/>
+          </a:effectRef>
+          <a:fontRef idx="minor">
+            <a:schemeClr val="tx1"/>
+          </a:fontRef>
+        </p:style>
+      </p:cxnSp>
+      <p:cxnSp>
+        <p:nvCxnSpPr>
+          <p:cNvPr id="2" name="Straight Arrow Connector 1">
+            <a:extLst>
+              <a:ext uri="{FF2B5EF4-FFF2-40B4-BE49-F238E27FC236}">
+                <a16:creationId xmlns:a16="http://schemas.microsoft.com/office/drawing/2014/main" id="{23D528CE-85F6-9B71-EA7D-EDC410158456}"/>
+              </a:ext>
+            </a:extLst>
+          </p:cNvPr>
+          <p:cNvCxnSpPr>
+            <a:cxnSpLocks/>
+            <a:stCxn id="19" idx="2"/>
+            <a:endCxn id="9" idx="0"/>
+          </p:cNvCxnSpPr>
+          <p:nvPr/>
+        </p:nvCxnSpPr>
+        <p:spPr>
+          <a:xfrm>
+            <a:off x="1729612" y="2754418"/>
+            <a:ext cx="1" cy="428729"/>
+          </a:xfrm>
+          <a:prstGeom prst="straightConnector1">
+            <a:avLst/>
+          </a:prstGeom>
+          <a:ln>
+            <a:tailEnd type="triangle"/>
+          </a:ln>
+        </p:spPr>
+        <p:style>
+          <a:lnRef idx="2">
+            <a:schemeClr val="accent1"/>
+          </a:lnRef>
+          <a:fillRef idx="0">
+            <a:schemeClr val="accent1"/>
+          </a:fillRef>
+          <a:effectRef idx="1">
+            <a:schemeClr val="accent1"/>
+          </a:effectRef>
+          <a:fontRef idx="minor">
+            <a:schemeClr val="tx1"/>
+          </a:fontRef>
+        </p:style>
+      </p:cxnSp>
+      <p:sp>
+        <p:nvSpPr>
+          <p:cNvPr id="69" name="TextBox 68">
+            <a:extLst>
+              <a:ext uri="{FF2B5EF4-FFF2-40B4-BE49-F238E27FC236}">
+                <a16:creationId xmlns:a16="http://schemas.microsoft.com/office/drawing/2014/main" id="{C3C7C8E0-B633-6148-0456-AD96A5558697}"/>
+              </a:ext>
+            </a:extLst>
+          </p:cNvPr>
+          <p:cNvSpPr txBox="1"/>
+          <p:nvPr/>
+        </p:nvSpPr>
+        <p:spPr>
+          <a:xfrm>
+            <a:off x="7138217" y="4282884"/>
+            <a:ext cx="1484833" cy="461665"/>
+          </a:xfrm>
+          <a:prstGeom prst="rect">
+            <a:avLst/>
+          </a:prstGeom>
+          <a:noFill/>
+        </p:spPr>
+        <p:txBody>
+          <a:bodyPr wrap="square" rtlCol="0">
+            <a:spAutoFit/>
+          </a:bodyPr>
+          <a:lstStyle/>
+          <a:p>
+            <a:pPr algn="ctr"/>
+            <a:r>
+              <a:rPr lang="en-CA" sz="1200" dirty="0"/>
+              <a:t>Single module design loop</a:t>
+            </a:r>
+          </a:p>
+        </p:txBody>
+      </p:sp>
+      <p:sp>
+        <p:nvSpPr>
+          <p:cNvPr id="26" name="Oval 25">
+            <a:extLst>
+              <a:ext uri="{FF2B5EF4-FFF2-40B4-BE49-F238E27FC236}">
+                <a16:creationId xmlns:a16="http://schemas.microsoft.com/office/drawing/2014/main" id="{7F22538E-33A0-578D-FE06-CE6A574F92D1}"/>
+              </a:ext>
+            </a:extLst>
+          </p:cNvPr>
+          <p:cNvSpPr/>
+          <p:nvPr/>
+        </p:nvSpPr>
+        <p:spPr>
+          <a:xfrm>
+            <a:off x="334271" y="5234453"/>
+            <a:ext cx="362309" cy="370936"/>
+          </a:xfrm>
+          <a:prstGeom prst="ellipse">
+            <a:avLst/>
+          </a:prstGeom>
+          <a:solidFill>
+            <a:srgbClr val="FFFF00"/>
+          </a:solidFill>
+          <a:ln>
+            <a:solidFill>
+              <a:srgbClr val="FFC000"/>
+            </a:solidFill>
+          </a:ln>
+        </p:spPr>
+        <p:style>
+          <a:lnRef idx="2">
+            <a:schemeClr val="accent2">
+              <a:shade val="15000"/>
+            </a:schemeClr>
+          </a:lnRef>
+          <a:fillRef idx="1">
+            <a:schemeClr val="accent2"/>
+          </a:fillRef>
+          <a:effectRef idx="0">
+            <a:schemeClr val="accent2"/>
+          </a:effectRef>
+          <a:fontRef idx="minor">
+            <a:schemeClr val="lt1"/>
+          </a:fontRef>
+        </p:style>
+        <p:txBody>
+          <a:bodyPr rtlCol="0" anchor="ctr"/>
+          <a:lstStyle/>
+          <a:p>
+            <a:pPr algn="ctr"/>
+            <a:endParaRPr lang="en-CA"/>
+          </a:p>
+        </p:txBody>
+      </p:sp>
+      <p:sp>
+        <p:nvSpPr>
+          <p:cNvPr id="27" name="Oval 26">
+            <a:extLst>
+              <a:ext uri="{FF2B5EF4-FFF2-40B4-BE49-F238E27FC236}">
+                <a16:creationId xmlns:a16="http://schemas.microsoft.com/office/drawing/2014/main" id="{F5CC71EF-197B-8836-61D2-32907B75D974}"/>
+              </a:ext>
+            </a:extLst>
+          </p:cNvPr>
+          <p:cNvSpPr/>
+          <p:nvPr/>
+        </p:nvSpPr>
+        <p:spPr>
+          <a:xfrm>
+            <a:off x="331397" y="4741822"/>
+            <a:ext cx="362309" cy="370936"/>
+          </a:xfrm>
+          <a:prstGeom prst="ellipse">
+            <a:avLst/>
+          </a:prstGeom>
+        </p:spPr>
+        <p:style>
+          <a:lnRef idx="2">
+            <a:schemeClr val="accent1">
+              <a:shade val="15000"/>
+            </a:schemeClr>
+          </a:lnRef>
+          <a:fillRef idx="1">
+            <a:schemeClr val="accent1"/>
+          </a:fillRef>
+          <a:effectRef idx="0">
+            <a:schemeClr val="accent1"/>
+          </a:effectRef>
+          <a:fontRef idx="minor">
+            <a:schemeClr val="lt1"/>
+          </a:fontRef>
+        </p:style>
+        <p:txBody>
+          <a:bodyPr rtlCol="0" anchor="ctr"/>
+          <a:lstStyle/>
+          <a:p>
+            <a:pPr algn="ctr"/>
+            <a:endParaRPr lang="en-CA"/>
+          </a:p>
+        </p:txBody>
+      </p:sp>
+      <p:sp>
+        <p:nvSpPr>
+          <p:cNvPr id="28" name="Diamond 27">
+            <a:extLst>
+              <a:ext uri="{FF2B5EF4-FFF2-40B4-BE49-F238E27FC236}">
+                <a16:creationId xmlns:a16="http://schemas.microsoft.com/office/drawing/2014/main" id="{EE3FFB30-B657-4982-58DD-BBDF8B62899C}"/>
+              </a:ext>
+            </a:extLst>
+          </p:cNvPr>
+          <p:cNvSpPr/>
+          <p:nvPr/>
+        </p:nvSpPr>
+        <p:spPr>
+          <a:xfrm>
+            <a:off x="381717" y="6202606"/>
+            <a:ext cx="267419" cy="253917"/>
+          </a:xfrm>
+          <a:prstGeom prst="diamond">
+            <a:avLst/>
+          </a:prstGeom>
+        </p:spPr>
+        <p:style>
+          <a:lnRef idx="1">
+            <a:schemeClr val="accent5"/>
+          </a:lnRef>
+          <a:fillRef idx="2">
+            <a:schemeClr val="accent5"/>
+          </a:fillRef>
+          <a:effectRef idx="1">
+            <a:schemeClr val="accent5"/>
+          </a:effectRef>
+          <a:fontRef idx="minor">
+            <a:schemeClr val="dk1"/>
+          </a:fontRef>
+        </p:style>
+        <p:txBody>
+          <a:bodyPr rtlCol="0" anchor="ctr"/>
+          <a:lstStyle/>
+          <a:p>
+            <a:pPr algn="ctr"/>
+            <a:endParaRPr lang="en-CA"/>
+          </a:p>
+        </p:txBody>
+      </p:sp>
+      <p:sp>
+        <p:nvSpPr>
+          <p:cNvPr id="30" name="TextBox 29">
+            <a:extLst>
+              <a:ext uri="{FF2B5EF4-FFF2-40B4-BE49-F238E27FC236}">
+                <a16:creationId xmlns:a16="http://schemas.microsoft.com/office/drawing/2014/main" id="{F0A07CBA-CDEB-A393-50AD-15158DBF2969}"/>
+              </a:ext>
+            </a:extLst>
+          </p:cNvPr>
+          <p:cNvSpPr txBox="1"/>
+          <p:nvPr/>
+        </p:nvSpPr>
+        <p:spPr>
+          <a:xfrm>
+            <a:off x="558555" y="6199287"/>
+            <a:ext cx="1407542" cy="276999"/>
+          </a:xfrm>
+          <a:prstGeom prst="rect">
+            <a:avLst/>
+          </a:prstGeom>
+          <a:noFill/>
+        </p:spPr>
+        <p:txBody>
+          <a:bodyPr wrap="square" rtlCol="0">
+            <a:spAutoFit/>
+          </a:bodyPr>
+          <a:lstStyle/>
+          <a:p>
+            <a:pPr algn="ctr"/>
+            <a:r>
+              <a:rPr lang="en-CA" sz="1200" dirty="0"/>
+              <a:t>Decision junction</a:t>
+            </a:r>
+          </a:p>
+        </p:txBody>
+      </p:sp>
+      <p:sp>
+        <p:nvSpPr>
+          <p:cNvPr id="34" name="TextBox 33">
+            <a:extLst>
+              <a:ext uri="{FF2B5EF4-FFF2-40B4-BE49-F238E27FC236}">
+                <a16:creationId xmlns:a16="http://schemas.microsoft.com/office/drawing/2014/main" id="{98B6094E-066F-5C2F-0547-665F2C32C990}"/>
+              </a:ext>
+            </a:extLst>
+          </p:cNvPr>
+          <p:cNvSpPr txBox="1"/>
+          <p:nvPr/>
+        </p:nvSpPr>
+        <p:spPr>
+          <a:xfrm>
+            <a:off x="629663" y="5296082"/>
+            <a:ext cx="1470852" cy="276999"/>
+          </a:xfrm>
+          <a:prstGeom prst="rect">
+            <a:avLst/>
+          </a:prstGeom>
+          <a:noFill/>
+        </p:spPr>
+        <p:txBody>
+          <a:bodyPr wrap="square" rtlCol="0">
+            <a:spAutoFit/>
+          </a:bodyPr>
+          <a:lstStyle/>
+          <a:p>
+            <a:pPr algn="ctr"/>
+            <a:r>
+              <a:rPr lang="en-CA" sz="1200" dirty="0"/>
+              <a:t>Input/ Output node</a:t>
+            </a:r>
+          </a:p>
+        </p:txBody>
+      </p:sp>
+      <p:sp>
+        <p:nvSpPr>
+          <p:cNvPr id="36" name="TextBox 35">
+            <a:extLst>
+              <a:ext uri="{FF2B5EF4-FFF2-40B4-BE49-F238E27FC236}">
+                <a16:creationId xmlns:a16="http://schemas.microsoft.com/office/drawing/2014/main" id="{10CF69E1-2B26-5864-4785-50BED56AA2BA}"/>
+              </a:ext>
+            </a:extLst>
+          </p:cNvPr>
+          <p:cNvSpPr txBox="1"/>
+          <p:nvPr/>
+        </p:nvSpPr>
+        <p:spPr>
+          <a:xfrm>
+            <a:off x="638096" y="4818822"/>
+            <a:ext cx="896362" cy="276999"/>
+          </a:xfrm>
+          <a:prstGeom prst="rect">
+            <a:avLst/>
+          </a:prstGeom>
+          <a:noFill/>
+        </p:spPr>
+        <p:txBody>
+          <a:bodyPr wrap="square" rtlCol="0">
+            <a:spAutoFit/>
+          </a:bodyPr>
+          <a:lstStyle/>
+          <a:p>
+            <a:pPr algn="ctr"/>
+            <a:r>
+              <a:rPr lang="en-CA" sz="1200" dirty="0"/>
+              <a:t>LLM node</a:t>
+            </a:r>
+          </a:p>
+        </p:txBody>
+      </p:sp>
+      <p:sp>
+        <p:nvSpPr>
+          <p:cNvPr id="38" name="Oval 37">
+            <a:extLst>
+              <a:ext uri="{FF2B5EF4-FFF2-40B4-BE49-F238E27FC236}">
+                <a16:creationId xmlns:a16="http://schemas.microsoft.com/office/drawing/2014/main" id="{271A10B6-DA1B-0C58-1B1D-286CF97E1EF7}"/>
+              </a:ext>
+            </a:extLst>
+          </p:cNvPr>
+          <p:cNvSpPr/>
+          <p:nvPr/>
+        </p:nvSpPr>
+        <p:spPr>
+          <a:xfrm>
+            <a:off x="331397" y="5723283"/>
+            <a:ext cx="362309" cy="370936"/>
+          </a:xfrm>
+          <a:prstGeom prst="ellipse">
+            <a:avLst/>
+          </a:prstGeom>
+          <a:ln/>
+        </p:spPr>
+        <p:style>
+          <a:lnRef idx="1">
+            <a:schemeClr val="accent6"/>
+          </a:lnRef>
+          <a:fillRef idx="2">
+            <a:schemeClr val="accent6"/>
+          </a:fillRef>
+          <a:effectRef idx="1">
+            <a:schemeClr val="accent6"/>
+          </a:effectRef>
+          <a:fontRef idx="minor">
+            <a:schemeClr val="dk1"/>
+          </a:fontRef>
+        </p:style>
+        <p:txBody>
+          <a:bodyPr rtlCol="0" anchor="ctr"/>
+          <a:lstStyle/>
+          <a:p>
+            <a:pPr algn="ctr"/>
+            <a:endParaRPr lang="en-CA"/>
+          </a:p>
+        </p:txBody>
+      </p:sp>
+      <p:sp>
+        <p:nvSpPr>
+          <p:cNvPr id="46" name="TextBox 45">
+            <a:extLst>
+              <a:ext uri="{FF2B5EF4-FFF2-40B4-BE49-F238E27FC236}">
+                <a16:creationId xmlns:a16="http://schemas.microsoft.com/office/drawing/2014/main" id="{2A68657E-D604-3114-A0F0-A2A99FBBEBC2}"/>
+              </a:ext>
+            </a:extLst>
+          </p:cNvPr>
+          <p:cNvSpPr txBox="1"/>
+          <p:nvPr/>
+        </p:nvSpPr>
+        <p:spPr>
+          <a:xfrm>
+            <a:off x="626789" y="5784912"/>
+            <a:ext cx="1707754" cy="276999"/>
+          </a:xfrm>
+          <a:prstGeom prst="rect">
+            <a:avLst/>
+          </a:prstGeom>
+          <a:noFill/>
+        </p:spPr>
+        <p:txBody>
+          <a:bodyPr wrap="square" rtlCol="0">
+            <a:spAutoFit/>
+          </a:bodyPr>
+          <a:lstStyle/>
+          <a:p>
+            <a:pPr algn="ctr"/>
+            <a:r>
+              <a:rPr lang="en-CA" sz="1200" dirty="0"/>
+              <a:t>Conventional compute</a:t>
+            </a:r>
+          </a:p>
+        </p:txBody>
+      </p:sp>
+      <p:sp>
+        <p:nvSpPr>
+          <p:cNvPr id="48" name="Oval 47">
+            <a:extLst>
+              <a:ext uri="{FF2B5EF4-FFF2-40B4-BE49-F238E27FC236}">
+                <a16:creationId xmlns:a16="http://schemas.microsoft.com/office/drawing/2014/main" id="{70FD2AE9-D8AD-B8F0-EB18-D328B5B00230}"/>
+              </a:ext>
+            </a:extLst>
+          </p:cNvPr>
+          <p:cNvSpPr/>
+          <p:nvPr/>
+        </p:nvSpPr>
+        <p:spPr>
+          <a:xfrm>
+            <a:off x="5431084" y="3183147"/>
+            <a:ext cx="362309" cy="370936"/>
+          </a:xfrm>
+          <a:prstGeom prst="ellipse">
+            <a:avLst/>
+          </a:prstGeom>
+          <a:ln/>
+        </p:spPr>
+        <p:style>
+          <a:lnRef idx="1">
+            <a:schemeClr val="accent6"/>
+          </a:lnRef>
+          <a:fillRef idx="2">
+            <a:schemeClr val="accent6"/>
+          </a:fillRef>
+          <a:effectRef idx="1">
+            <a:schemeClr val="accent6"/>
+          </a:effectRef>
+          <a:fontRef idx="minor">
+            <a:schemeClr val="dk1"/>
+          </a:fontRef>
+        </p:style>
+        <p:txBody>
+          <a:bodyPr rtlCol="0" anchor="ctr"/>
+          <a:lstStyle/>
+          <a:p>
+            <a:pPr algn="ctr"/>
+            <a:endParaRPr lang="en-CA" dirty="0"/>
+          </a:p>
+        </p:txBody>
+      </p:sp>
+      <p:sp>
+        <p:nvSpPr>
+          <p:cNvPr id="58" name="TextBox 57">
+            <a:extLst>
+              <a:ext uri="{FF2B5EF4-FFF2-40B4-BE49-F238E27FC236}">
+                <a16:creationId xmlns:a16="http://schemas.microsoft.com/office/drawing/2014/main" id="{212C3056-5280-4C05-F4BD-1F0F91427D4F}"/>
+              </a:ext>
+            </a:extLst>
+          </p:cNvPr>
+          <p:cNvSpPr txBox="1"/>
+          <p:nvPr/>
+        </p:nvSpPr>
+        <p:spPr>
+          <a:xfrm>
+            <a:off x="4978462" y="3568301"/>
+            <a:ext cx="1389400" cy="461665"/>
+          </a:xfrm>
+          <a:prstGeom prst="rect">
+            <a:avLst/>
+          </a:prstGeom>
+          <a:noFill/>
+        </p:spPr>
+        <p:txBody>
+          <a:bodyPr wrap="square" rtlCol="0">
+            <a:spAutoFit/>
+          </a:bodyPr>
+          <a:lstStyle/>
+          <a:p>
+            <a:pPr algn="ctr"/>
+            <a:r>
+              <a:rPr lang="en-CA" sz="1200" dirty="0"/>
+              <a:t>Topological sort (of module graph)</a:t>
+            </a:r>
+          </a:p>
+        </p:txBody>
+      </p:sp>
+      <p:cxnSp>
+        <p:nvCxnSpPr>
+          <p:cNvPr id="59" name="Straight Arrow Connector 58">
+            <a:extLst>
+              <a:ext uri="{FF2B5EF4-FFF2-40B4-BE49-F238E27FC236}">
+                <a16:creationId xmlns:a16="http://schemas.microsoft.com/office/drawing/2014/main" id="{28319744-F85A-7EF1-99EC-F68F749A1319}"/>
+              </a:ext>
+            </a:extLst>
+          </p:cNvPr>
+          <p:cNvCxnSpPr>
+            <a:cxnSpLocks/>
+            <a:stCxn id="48" idx="6"/>
+            <a:endCxn id="137" idx="2"/>
+          </p:cNvCxnSpPr>
+          <p:nvPr/>
+        </p:nvCxnSpPr>
+        <p:spPr>
+          <a:xfrm>
+            <a:off x="5793393" y="3368615"/>
+            <a:ext cx="1329250" cy="10357"/>
+          </a:xfrm>
+          <a:prstGeom prst="straightConnector1">
+            <a:avLst/>
+          </a:prstGeom>
+          <a:ln>
+            <a:tailEnd type="triangle"/>
+          </a:ln>
+        </p:spPr>
+        <p:style>
+          <a:lnRef idx="2">
+            <a:schemeClr val="accent1"/>
+          </a:lnRef>
+          <a:fillRef idx="0">
+            <a:schemeClr val="accent1"/>
+          </a:fillRef>
+          <a:effectRef idx="1">
+            <a:schemeClr val="accent1"/>
+          </a:effectRef>
+          <a:fontRef idx="minor">
+            <a:schemeClr val="tx1"/>
+          </a:fontRef>
+        </p:style>
+      </p:cxnSp>
+      <p:cxnSp>
+        <p:nvCxnSpPr>
+          <p:cNvPr id="63" name="Straight Arrow Connector 62">
+            <a:extLst>
+              <a:ext uri="{FF2B5EF4-FFF2-40B4-BE49-F238E27FC236}">
+                <a16:creationId xmlns:a16="http://schemas.microsoft.com/office/drawing/2014/main" id="{ABF213FE-9D3F-0546-AD20-86E18860BEA8}"/>
+              </a:ext>
+            </a:extLst>
+          </p:cNvPr>
+          <p:cNvCxnSpPr>
+            <a:cxnSpLocks/>
+            <a:stCxn id="137" idx="6"/>
+            <a:endCxn id="139" idx="2"/>
+          </p:cNvCxnSpPr>
+          <p:nvPr/>
+        </p:nvCxnSpPr>
+        <p:spPr>
+          <a:xfrm flipV="1">
+            <a:off x="7484952" y="3370489"/>
+            <a:ext cx="673460" cy="8483"/>
+          </a:xfrm>
+          <a:prstGeom prst="straightConnector1">
+            <a:avLst/>
+          </a:prstGeom>
+          <a:ln>
+            <a:tailEnd type="triangle"/>
+          </a:ln>
+        </p:spPr>
+        <p:style>
+          <a:lnRef idx="2">
+            <a:schemeClr val="accent1"/>
+          </a:lnRef>
+          <a:fillRef idx="0">
+            <a:schemeClr val="accent1"/>
+          </a:fillRef>
+          <a:effectRef idx="1">
+            <a:schemeClr val="accent1"/>
+          </a:effectRef>
+          <a:fontRef idx="minor">
+            <a:schemeClr val="tx1"/>
+          </a:fontRef>
+        </p:style>
+      </p:cxnSp>
+      <p:cxnSp>
+        <p:nvCxnSpPr>
+          <p:cNvPr id="71" name="Straight Arrow Connector 70">
+            <a:extLst>
+              <a:ext uri="{FF2B5EF4-FFF2-40B4-BE49-F238E27FC236}">
+                <a16:creationId xmlns:a16="http://schemas.microsoft.com/office/drawing/2014/main" id="{722CF5DF-F1A9-B445-7F6C-102991E73D55}"/>
+              </a:ext>
+            </a:extLst>
+          </p:cNvPr>
+          <p:cNvCxnSpPr>
+            <a:cxnSpLocks/>
+            <a:stCxn id="139" idx="6"/>
+            <a:endCxn id="6" idx="2"/>
+          </p:cNvCxnSpPr>
+          <p:nvPr/>
+        </p:nvCxnSpPr>
+        <p:spPr>
+          <a:xfrm>
+            <a:off x="8520721" y="3370489"/>
+            <a:ext cx="1015579" cy="13012"/>
+          </a:xfrm>
+          <a:prstGeom prst="straightConnector1">
+            <a:avLst/>
+          </a:prstGeom>
+          <a:ln>
+            <a:tailEnd type="triangle"/>
+          </a:ln>
+        </p:spPr>
+        <p:style>
+          <a:lnRef idx="2">
+            <a:schemeClr val="accent1"/>
+          </a:lnRef>
+          <a:fillRef idx="0">
+            <a:schemeClr val="accent1"/>
+          </a:fillRef>
+          <a:effectRef idx="1">
+            <a:schemeClr val="accent1"/>
+          </a:effectRef>
+          <a:fontRef idx="minor">
+            <a:schemeClr val="tx1"/>
+          </a:fontRef>
+        </p:style>
+      </p:cxnSp>
+      <p:cxnSp>
+        <p:nvCxnSpPr>
+          <p:cNvPr id="85" name="Straight Arrow Connector 84">
+            <a:extLst>
+              <a:ext uri="{FF2B5EF4-FFF2-40B4-BE49-F238E27FC236}">
+                <a16:creationId xmlns:a16="http://schemas.microsoft.com/office/drawing/2014/main" id="{60F926FA-2B55-7470-4C73-A5E0EEA692F7}"/>
+              </a:ext>
+            </a:extLst>
+          </p:cNvPr>
+          <p:cNvCxnSpPr>
+            <a:cxnSpLocks/>
+            <a:stCxn id="64" idx="2"/>
+            <a:endCxn id="66" idx="0"/>
+          </p:cNvCxnSpPr>
+          <p:nvPr/>
+        </p:nvCxnSpPr>
+        <p:spPr>
+          <a:xfrm flipH="1">
+            <a:off x="7788652" y="2547244"/>
+            <a:ext cx="5338" cy="320398"/>
+          </a:xfrm>
+          <a:prstGeom prst="straightConnector1">
+            <a:avLst/>
+          </a:prstGeom>
+          <a:ln>
+            <a:tailEnd type="triangle"/>
+          </a:ln>
+        </p:spPr>
+        <p:style>
+          <a:lnRef idx="2">
+            <a:schemeClr val="accent1"/>
+          </a:lnRef>
+          <a:fillRef idx="0">
+            <a:schemeClr val="accent1"/>
+          </a:fillRef>
+          <a:effectRef idx="1">
+            <a:schemeClr val="accent1"/>
+          </a:effectRef>
+          <a:fontRef idx="minor">
+            <a:schemeClr val="tx1"/>
+          </a:fontRef>
+        </p:style>
+      </p:cxnSp>
+      <p:sp>
+        <p:nvSpPr>
+          <p:cNvPr id="98" name="Rectangle: Rounded Corners 97">
+            <a:extLst>
+              <a:ext uri="{FF2B5EF4-FFF2-40B4-BE49-F238E27FC236}">
+                <a16:creationId xmlns:a16="http://schemas.microsoft.com/office/drawing/2014/main" id="{A147AE88-110E-B0EC-4BE0-3D30C3D42539}"/>
+              </a:ext>
+            </a:extLst>
+          </p:cNvPr>
+          <p:cNvSpPr/>
+          <p:nvPr/>
+        </p:nvSpPr>
+        <p:spPr>
+          <a:xfrm>
+            <a:off x="6367862" y="871268"/>
+            <a:ext cx="2770030" cy="3986252"/>
+          </a:xfrm>
+          <a:prstGeom prst="roundRect">
+            <a:avLst/>
+          </a:prstGeom>
+          <a:noFill/>
+          <a:ln w="9525" cap="flat" cmpd="sng" algn="ctr">
+            <a:solidFill>
+              <a:schemeClr val="dk1"/>
+            </a:solidFill>
+            <a:prstDash val="dash"/>
+            <a:round/>
+            <a:headEnd type="none" w="med" len="med"/>
+            <a:tailEnd type="none" w="med" len="med"/>
+          </a:ln>
+        </p:spPr>
+        <p:style>
+          <a:lnRef idx="0">
+            <a:scrgbClr r="0" g="0" b="0"/>
+          </a:lnRef>
+          <a:fillRef idx="0">
+            <a:scrgbClr r="0" g="0" b="0"/>
+          </a:fillRef>
+          <a:effectRef idx="0">
+            <a:scrgbClr r="0" g="0" b="0"/>
+          </a:effectRef>
+          <a:fontRef idx="minor">
+            <a:schemeClr val="dk1"/>
+          </a:fontRef>
+        </p:style>
+        <p:txBody>
+          <a:bodyPr rtlCol="0" anchor="ctr"/>
+          <a:lstStyle/>
+          <a:p>
+            <a:pPr algn="ctr"/>
+            <a:endParaRPr lang="en-CA"/>
+          </a:p>
+        </p:txBody>
+      </p:sp>
+      <p:sp>
+        <p:nvSpPr>
+          <p:cNvPr id="99" name="TextBox 98">
+            <a:extLst>
+              <a:ext uri="{FF2B5EF4-FFF2-40B4-BE49-F238E27FC236}">
+                <a16:creationId xmlns:a16="http://schemas.microsoft.com/office/drawing/2014/main" id="{2C8AF13C-9D36-EEE0-0BA3-032DBA9D4B62}"/>
+              </a:ext>
+            </a:extLst>
+          </p:cNvPr>
+          <p:cNvSpPr txBox="1"/>
+          <p:nvPr/>
+        </p:nvSpPr>
+        <p:spPr>
+          <a:xfrm>
+            <a:off x="6806118" y="4875825"/>
+            <a:ext cx="2551876" cy="307777"/>
+          </a:xfrm>
+          <a:prstGeom prst="rect">
+            <a:avLst/>
+          </a:prstGeom>
+          <a:noFill/>
+        </p:spPr>
+        <p:txBody>
+          <a:bodyPr wrap="square" rtlCol="0">
+            <a:spAutoFit/>
+          </a:bodyPr>
+          <a:lstStyle/>
+          <a:p>
+            <a:r>
+              <a:rPr lang="en-CA" sz="1400" dirty="0"/>
+              <a:t>Loop over all modules</a:t>
+            </a:r>
+          </a:p>
+        </p:txBody>
+      </p:sp>
+      <p:sp>
+        <p:nvSpPr>
+          <p:cNvPr id="6" name="Oval 5">
+            <a:extLst>
+              <a:ext uri="{FF2B5EF4-FFF2-40B4-BE49-F238E27FC236}">
+                <a16:creationId xmlns:a16="http://schemas.microsoft.com/office/drawing/2014/main" id="{02B00F47-5E67-94A1-576B-1FAC2EE87435}"/>
+              </a:ext>
+            </a:extLst>
+          </p:cNvPr>
+          <p:cNvSpPr/>
+          <p:nvPr/>
+        </p:nvSpPr>
+        <p:spPr>
+          <a:xfrm>
+            <a:off x="9536300" y="3198033"/>
+            <a:ext cx="362309" cy="370936"/>
+          </a:xfrm>
+          <a:prstGeom prst="ellipse">
+            <a:avLst/>
+          </a:prstGeom>
+        </p:spPr>
+        <p:style>
+          <a:lnRef idx="2">
+            <a:schemeClr val="accent1">
+              <a:shade val="15000"/>
+            </a:schemeClr>
+          </a:lnRef>
+          <a:fillRef idx="1">
+            <a:schemeClr val="accent1"/>
+          </a:fillRef>
+          <a:effectRef idx="0">
+            <a:schemeClr val="accent1"/>
+          </a:effectRef>
+          <a:fontRef idx="minor">
+            <a:schemeClr val="lt1"/>
+          </a:fontRef>
+        </p:style>
+        <p:txBody>
+          <a:bodyPr rtlCol="0" anchor="ctr"/>
+          <a:lstStyle/>
+          <a:p>
+            <a:pPr algn="ctr"/>
+            <a:endParaRPr lang="en-CA"/>
+          </a:p>
+        </p:txBody>
+      </p:sp>
+      <p:sp>
+        <p:nvSpPr>
+          <p:cNvPr id="12" name="TextBox 11">
+            <a:extLst>
+              <a:ext uri="{FF2B5EF4-FFF2-40B4-BE49-F238E27FC236}">
+                <a16:creationId xmlns:a16="http://schemas.microsoft.com/office/drawing/2014/main" id="{C5FDDE2F-7761-1576-36F0-CAD96CCC87BA}"/>
+              </a:ext>
+            </a:extLst>
+          </p:cNvPr>
+          <p:cNvSpPr txBox="1"/>
+          <p:nvPr/>
+        </p:nvSpPr>
+        <p:spPr>
+          <a:xfrm>
+            <a:off x="9248716" y="3588782"/>
+            <a:ext cx="941717" cy="646331"/>
+          </a:xfrm>
+          <a:prstGeom prst="rect">
+            <a:avLst/>
+          </a:prstGeom>
+          <a:noFill/>
+        </p:spPr>
+        <p:txBody>
+          <a:bodyPr wrap="square" rtlCol="0">
+            <a:spAutoFit/>
+          </a:bodyPr>
+          <a:lstStyle/>
+          <a:p>
+            <a:pPr algn="ctr"/>
+            <a:r>
+              <a:rPr lang="en-CA" sz="1200" dirty="0"/>
+              <a:t>Final design evaluator</a:t>
+            </a:r>
+          </a:p>
+        </p:txBody>
+      </p:sp>
+      <p:cxnSp>
+        <p:nvCxnSpPr>
+          <p:cNvPr id="13" name="Straight Arrow Connector 12">
+            <a:extLst>
+              <a:ext uri="{FF2B5EF4-FFF2-40B4-BE49-F238E27FC236}">
+                <a16:creationId xmlns:a16="http://schemas.microsoft.com/office/drawing/2014/main" id="{004669FA-EFC2-9976-8F9C-584DB16174CA}"/>
+              </a:ext>
+            </a:extLst>
+          </p:cNvPr>
+          <p:cNvCxnSpPr>
+            <a:cxnSpLocks/>
+            <a:stCxn id="6" idx="6"/>
+            <a:endCxn id="141" idx="2"/>
+          </p:cNvCxnSpPr>
+          <p:nvPr/>
+        </p:nvCxnSpPr>
+        <p:spPr>
+          <a:xfrm flipV="1">
+            <a:off x="9898609" y="3378972"/>
+            <a:ext cx="655582" cy="4529"/>
+          </a:xfrm>
+          <a:prstGeom prst="straightConnector1">
+            <a:avLst/>
+          </a:prstGeom>
+          <a:ln>
+            <a:tailEnd type="triangle"/>
+          </a:ln>
+        </p:spPr>
+        <p:style>
+          <a:lnRef idx="2">
+            <a:schemeClr val="accent1"/>
+          </a:lnRef>
+          <a:fillRef idx="0">
+            <a:schemeClr val="accent1"/>
+          </a:fillRef>
+          <a:effectRef idx="1">
+            <a:schemeClr val="accent1"/>
+          </a:effectRef>
+          <a:fontRef idx="minor">
+            <a:schemeClr val="tx1"/>
+          </a:fontRef>
+        </p:style>
+      </p:cxnSp>
+    </p:spTree>
+    <p:extLst>
+      <p:ext uri="{BB962C8B-B14F-4D97-AF65-F5344CB8AC3E}">
+        <p14:creationId xmlns:p14="http://schemas.microsoft.com/office/powerpoint/2010/main" val="3196700447"/>
       </p:ext>
     </p:extLst>
   </p:cSld>

</xml_diff>